<commit_message>
Update visual assets for diffusion architecture documentation, including new PowerPoint figures and teaser images in black and white.
</commit_message>
<xml_diff>
--- a/assets/img/2026-04-27-diffusion-architecture-evolution/figures.pptx
+++ b/assets/img/2026-04-27-diffusion-architecture-evolution/figures.pptx
@@ -260,7 +260,7 @@
           <a:p>
             <a:fld id="{2382B1A8-8FBB-433B-947F-F52F1C8CEB02}" type="datetimeFigureOut">
               <a:rPr lang="zh-CN" altLang="en-US" smtClean="0"/>
-              <a:t>2025/10/21</a:t>
+              <a:t>2025/11/9</a:t>
             </a:fld>
             <a:endParaRPr lang="zh-CN" altLang="en-US"/>
           </a:p>
@@ -430,7 +430,7 @@
           <a:p>
             <a:fld id="{2382B1A8-8FBB-433B-947F-F52F1C8CEB02}" type="datetimeFigureOut">
               <a:rPr lang="zh-CN" altLang="en-US" smtClean="0"/>
-              <a:t>2025/10/21</a:t>
+              <a:t>2025/11/9</a:t>
             </a:fld>
             <a:endParaRPr lang="zh-CN" altLang="en-US"/>
           </a:p>
@@ -610,7 +610,7 @@
           <a:p>
             <a:fld id="{2382B1A8-8FBB-433B-947F-F52F1C8CEB02}" type="datetimeFigureOut">
               <a:rPr lang="zh-CN" altLang="en-US" smtClean="0"/>
-              <a:t>2025/10/21</a:t>
+              <a:t>2025/11/9</a:t>
             </a:fld>
             <a:endParaRPr lang="zh-CN" altLang="en-US"/>
           </a:p>
@@ -780,7 +780,7 @@
           <a:p>
             <a:fld id="{2382B1A8-8FBB-433B-947F-F52F1C8CEB02}" type="datetimeFigureOut">
               <a:rPr lang="zh-CN" altLang="en-US" smtClean="0"/>
-              <a:t>2025/10/21</a:t>
+              <a:t>2025/11/9</a:t>
             </a:fld>
             <a:endParaRPr lang="zh-CN" altLang="en-US"/>
           </a:p>
@@ -1026,7 +1026,7 @@
           <a:p>
             <a:fld id="{2382B1A8-8FBB-433B-947F-F52F1C8CEB02}" type="datetimeFigureOut">
               <a:rPr lang="zh-CN" altLang="en-US" smtClean="0"/>
-              <a:t>2025/10/21</a:t>
+              <a:t>2025/11/9</a:t>
             </a:fld>
             <a:endParaRPr lang="zh-CN" altLang="en-US"/>
           </a:p>
@@ -1258,7 +1258,7 @@
           <a:p>
             <a:fld id="{2382B1A8-8FBB-433B-947F-F52F1C8CEB02}" type="datetimeFigureOut">
               <a:rPr lang="zh-CN" altLang="en-US" smtClean="0"/>
-              <a:t>2025/10/21</a:t>
+              <a:t>2025/11/9</a:t>
             </a:fld>
             <a:endParaRPr lang="zh-CN" altLang="en-US"/>
           </a:p>
@@ -1625,7 +1625,7 @@
           <a:p>
             <a:fld id="{2382B1A8-8FBB-433B-947F-F52F1C8CEB02}" type="datetimeFigureOut">
               <a:rPr lang="zh-CN" altLang="en-US" smtClean="0"/>
-              <a:t>2025/10/21</a:t>
+              <a:t>2025/11/9</a:t>
             </a:fld>
             <a:endParaRPr lang="zh-CN" altLang="en-US"/>
           </a:p>
@@ -1743,7 +1743,7 @@
           <a:p>
             <a:fld id="{2382B1A8-8FBB-433B-947F-F52F1C8CEB02}" type="datetimeFigureOut">
               <a:rPr lang="zh-CN" altLang="en-US" smtClean="0"/>
-              <a:t>2025/10/21</a:t>
+              <a:t>2025/11/9</a:t>
             </a:fld>
             <a:endParaRPr lang="zh-CN" altLang="en-US"/>
           </a:p>
@@ -1838,7 +1838,7 @@
           <a:p>
             <a:fld id="{2382B1A8-8FBB-433B-947F-F52F1C8CEB02}" type="datetimeFigureOut">
               <a:rPr lang="zh-CN" altLang="en-US" smtClean="0"/>
-              <a:t>2025/10/21</a:t>
+              <a:t>2025/11/9</a:t>
             </a:fld>
             <a:endParaRPr lang="zh-CN" altLang="en-US"/>
           </a:p>
@@ -2115,7 +2115,7 @@
           <a:p>
             <a:fld id="{2382B1A8-8FBB-433B-947F-F52F1C8CEB02}" type="datetimeFigureOut">
               <a:rPr lang="zh-CN" altLang="en-US" smtClean="0"/>
-              <a:t>2025/10/21</a:t>
+              <a:t>2025/11/9</a:t>
             </a:fld>
             <a:endParaRPr lang="zh-CN" altLang="en-US"/>
           </a:p>
@@ -2368,7 +2368,7 @@
           <a:p>
             <a:fld id="{2382B1A8-8FBB-433B-947F-F52F1C8CEB02}" type="datetimeFigureOut">
               <a:rPr lang="zh-CN" altLang="en-US" smtClean="0"/>
-              <a:t>2025/10/21</a:t>
+              <a:t>2025/11/9</a:t>
             </a:fld>
             <a:endParaRPr lang="zh-CN" altLang="en-US"/>
           </a:p>
@@ -2581,7 +2581,7 @@
           <a:p>
             <a:fld id="{2382B1A8-8FBB-433B-947F-F52F1C8CEB02}" type="datetimeFigureOut">
               <a:rPr lang="zh-CN" altLang="en-US" smtClean="0"/>
-              <a:t>2025/10/21</a:t>
+              <a:t>2025/11/9</a:t>
             </a:fld>
             <a:endParaRPr lang="zh-CN" altLang="en-US"/>
           </a:p>
@@ -3880,7 +3880,7 @@
       </p:cxnSp>
       <p:grpSp>
         <p:nvGrpSpPr>
-          <p:cNvPr id="97" name="组合 96"/>
+          <p:cNvPr id="7" name="组合 6"/>
           <p:cNvGrpSpPr/>
           <p:nvPr/>
         </p:nvGrpSpPr>
@@ -3888,34 +3888,34 @@
           <a:xfrm>
             <a:off x="7674532" y="3052814"/>
             <a:ext cx="2879994" cy="2808740"/>
-            <a:chOff x="7674532" y="3079318"/>
+            <a:chOff x="7674532" y="3052814"/>
             <a:chExt cx="2879994" cy="2808740"/>
           </a:xfrm>
         </p:grpSpPr>
         <p:grpSp>
           <p:nvGrpSpPr>
-            <p:cNvPr id="94" name="组合 93"/>
+            <p:cNvPr id="97" name="组合 96"/>
             <p:cNvGrpSpPr/>
             <p:nvPr/>
           </p:nvGrpSpPr>
           <p:grpSpPr>
             <a:xfrm>
-              <a:off x="7674532" y="3558363"/>
-              <a:ext cx="2879994" cy="1893749"/>
-              <a:chOff x="7674531" y="3800950"/>
-              <a:chExt cx="2879994" cy="1323432"/>
+              <a:off x="7674532" y="3052814"/>
+              <a:ext cx="2879994" cy="2808740"/>
+              <a:chOff x="7674532" y="3079318"/>
+              <a:chExt cx="2879994" cy="2808740"/>
             </a:xfrm>
           </p:grpSpPr>
           <p:sp>
             <p:nvSpPr>
-              <p:cNvPr id="33" name="矩形 32"/>
+              <p:cNvPr id="29" name="矩形 28"/>
               <p:cNvSpPr/>
               <p:nvPr/>
             </p:nvSpPr>
             <p:spPr>
-              <a:xfrm rot="10800000">
-                <a:off x="7674531" y="3800950"/>
-                <a:ext cx="2879994" cy="175050"/>
+              <a:xfrm>
+                <a:off x="7674532" y="5006610"/>
+                <a:ext cx="2879994" cy="445501"/>
               </a:xfrm>
               <a:prstGeom prst="rect">
                 <a:avLst/>
@@ -3952,943 +3952,940 @@
               </a:p>
             </p:txBody>
           </p:sp>
-          <p:sp>
-            <p:nvSpPr>
-              <p:cNvPr id="34" name="矩形 33"/>
-              <p:cNvSpPr/>
+          <p:grpSp>
+            <p:nvGrpSpPr>
+              <p:cNvPr id="96" name="组合 95"/>
+              <p:cNvGrpSpPr/>
               <p:nvPr/>
-            </p:nvSpPr>
-            <p:spPr>
-              <a:xfrm rot="10800000">
-                <a:off x="7674531" y="4194503"/>
-                <a:ext cx="2879994" cy="151402"/>
+            </p:nvGrpSpPr>
+            <p:grpSpPr>
+              <a:xfrm>
+                <a:off x="7674532" y="5672058"/>
+                <a:ext cx="2862681" cy="216000"/>
+                <a:chOff x="7687402" y="5621065"/>
+                <a:chExt cx="2862681" cy="216000"/>
               </a:xfrm>
-              <a:prstGeom prst="rect">
-                <a:avLst/>
-              </a:prstGeom>
-              <a:noFill/>
-              <a:ln w="28575">
+            </p:grpSpPr>
+            <p:sp>
+              <p:nvSpPr>
+                <p:cNvPr id="74" name="矩形 73"/>
+                <p:cNvSpPr/>
+                <p:nvPr/>
+              </p:nvSpPr>
+              <p:spPr>
+                <a:xfrm>
+                  <a:off x="7687402" y="5621065"/>
+                  <a:ext cx="216000" cy="216000"/>
+                </a:xfrm>
+                <a:prstGeom prst="rect">
+                  <a:avLst/>
+                </a:prstGeom>
                 <a:solidFill>
                   <a:srgbClr val="A83EA3"/>
                 </a:solidFill>
-              </a:ln>
-            </p:spPr>
-            <p:style>
-              <a:lnRef idx="2">
-                <a:schemeClr val="accent1">
-                  <a:shade val="50000"/>
-                </a:schemeClr>
-              </a:lnRef>
-              <a:fillRef idx="1">
-                <a:schemeClr val="accent1"/>
-              </a:fillRef>
-              <a:effectRef idx="0">
-                <a:schemeClr val="accent1"/>
-              </a:effectRef>
-              <a:fontRef idx="minor">
-                <a:schemeClr val="lt1"/>
-              </a:fontRef>
-            </p:style>
-            <p:txBody>
-              <a:bodyPr rtlCol="0" anchor="ctr"/>
-              <a:lstStyle/>
-              <a:p>
-                <a:pPr algn="ctr"/>
-                <a:endParaRPr lang="zh-CN" altLang="en-US"/>
-              </a:p>
-            </p:txBody>
-          </p:sp>
-          <p:sp>
-            <p:nvSpPr>
-              <p:cNvPr id="29" name="矩形 28"/>
-              <p:cNvSpPr/>
+                <a:ln w="28575">
+                  <a:solidFill>
+                    <a:srgbClr val="A83EA3"/>
+                  </a:solidFill>
+                </a:ln>
+              </p:spPr>
+              <p:style>
+                <a:lnRef idx="2">
+                  <a:schemeClr val="accent1">
+                    <a:shade val="50000"/>
+                  </a:schemeClr>
+                </a:lnRef>
+                <a:fillRef idx="1">
+                  <a:schemeClr val="accent1"/>
+                </a:fillRef>
+                <a:effectRef idx="0">
+                  <a:schemeClr val="accent1"/>
+                </a:effectRef>
+                <a:fontRef idx="minor">
+                  <a:schemeClr val="lt1"/>
+                </a:fontRef>
+              </p:style>
+              <p:txBody>
+                <a:bodyPr rtlCol="0" anchor="ctr"/>
+                <a:lstStyle/>
+                <a:p>
+                  <a:pPr algn="ctr"/>
+                  <a:endParaRPr lang="zh-CN" altLang="en-US" dirty="0"/>
+                </a:p>
+              </p:txBody>
+            </p:sp>
+            <p:sp>
+              <p:nvSpPr>
+                <p:cNvPr id="75" name="矩形 74"/>
+                <p:cNvSpPr/>
+                <p:nvPr/>
+              </p:nvSpPr>
+              <p:spPr>
+                <a:xfrm>
+                  <a:off x="8065499" y="5621065"/>
+                  <a:ext cx="216000" cy="216000"/>
+                </a:xfrm>
+                <a:prstGeom prst="rect">
+                  <a:avLst/>
+                </a:prstGeom>
+                <a:solidFill>
+                  <a:srgbClr val="A83EA3"/>
+                </a:solidFill>
+                <a:ln w="28575">
+                  <a:solidFill>
+                    <a:srgbClr val="A83EA3"/>
+                  </a:solidFill>
+                </a:ln>
+              </p:spPr>
+              <p:style>
+                <a:lnRef idx="2">
+                  <a:schemeClr val="accent1">
+                    <a:shade val="50000"/>
+                  </a:schemeClr>
+                </a:lnRef>
+                <a:fillRef idx="1">
+                  <a:schemeClr val="accent1"/>
+                </a:fillRef>
+                <a:effectRef idx="0">
+                  <a:schemeClr val="accent1"/>
+                </a:effectRef>
+                <a:fontRef idx="minor">
+                  <a:schemeClr val="lt1"/>
+                </a:fontRef>
+              </p:style>
+              <p:txBody>
+                <a:bodyPr rtlCol="0" anchor="ctr"/>
+                <a:lstStyle/>
+                <a:p>
+                  <a:pPr algn="ctr"/>
+                  <a:endParaRPr lang="zh-CN" altLang="en-US" dirty="0"/>
+                </a:p>
+              </p:txBody>
+            </p:sp>
+            <p:sp>
+              <p:nvSpPr>
+                <p:cNvPr id="76" name="矩形 75"/>
+                <p:cNvSpPr/>
+                <p:nvPr/>
+              </p:nvSpPr>
+              <p:spPr>
+                <a:xfrm>
+                  <a:off x="8443596" y="5621065"/>
+                  <a:ext cx="216000" cy="216000"/>
+                </a:xfrm>
+                <a:prstGeom prst="rect">
+                  <a:avLst/>
+                </a:prstGeom>
+                <a:solidFill>
+                  <a:srgbClr val="A83EA3"/>
+                </a:solidFill>
+                <a:ln w="28575">
+                  <a:solidFill>
+                    <a:srgbClr val="A83EA3"/>
+                  </a:solidFill>
+                </a:ln>
+              </p:spPr>
+              <p:style>
+                <a:lnRef idx="2">
+                  <a:schemeClr val="accent1">
+                    <a:shade val="50000"/>
+                  </a:schemeClr>
+                </a:lnRef>
+                <a:fillRef idx="1">
+                  <a:schemeClr val="accent1"/>
+                </a:fillRef>
+                <a:effectRef idx="0">
+                  <a:schemeClr val="accent1"/>
+                </a:effectRef>
+                <a:fontRef idx="minor">
+                  <a:schemeClr val="lt1"/>
+                </a:fontRef>
+              </p:style>
+              <p:txBody>
+                <a:bodyPr rtlCol="0" anchor="ctr"/>
+                <a:lstStyle/>
+                <a:p>
+                  <a:pPr algn="ctr"/>
+                  <a:endParaRPr lang="zh-CN" altLang="en-US" dirty="0"/>
+                </a:p>
+              </p:txBody>
+            </p:sp>
+            <p:sp>
+              <p:nvSpPr>
+                <p:cNvPr id="77" name="矩形 76"/>
+                <p:cNvSpPr/>
+                <p:nvPr/>
+              </p:nvSpPr>
+              <p:spPr>
+                <a:xfrm>
+                  <a:off x="8821694" y="5621065"/>
+                  <a:ext cx="216000" cy="216000"/>
+                </a:xfrm>
+                <a:prstGeom prst="rect">
+                  <a:avLst/>
+                </a:prstGeom>
+                <a:solidFill>
+                  <a:srgbClr val="A83EA3"/>
+                </a:solidFill>
+                <a:ln w="28575">
+                  <a:solidFill>
+                    <a:srgbClr val="A83EA3"/>
+                  </a:solidFill>
+                </a:ln>
+              </p:spPr>
+              <p:style>
+                <a:lnRef idx="2">
+                  <a:schemeClr val="accent1">
+                    <a:shade val="50000"/>
+                  </a:schemeClr>
+                </a:lnRef>
+                <a:fillRef idx="1">
+                  <a:schemeClr val="accent1"/>
+                </a:fillRef>
+                <a:effectRef idx="0">
+                  <a:schemeClr val="accent1"/>
+                </a:effectRef>
+                <a:fontRef idx="minor">
+                  <a:schemeClr val="lt1"/>
+                </a:fontRef>
+              </p:style>
+              <p:txBody>
+                <a:bodyPr rtlCol="0" anchor="ctr"/>
+                <a:lstStyle/>
+                <a:p>
+                  <a:pPr algn="ctr"/>
+                  <a:endParaRPr lang="zh-CN" altLang="en-US" dirty="0"/>
+                </a:p>
+              </p:txBody>
+            </p:sp>
+            <p:sp>
+              <p:nvSpPr>
+                <p:cNvPr id="78" name="矩形 77"/>
+                <p:cNvSpPr/>
+                <p:nvPr/>
+              </p:nvSpPr>
+              <p:spPr>
+                <a:xfrm>
+                  <a:off x="9199791" y="5621065"/>
+                  <a:ext cx="216000" cy="216000"/>
+                </a:xfrm>
+                <a:prstGeom prst="rect">
+                  <a:avLst/>
+                </a:prstGeom>
+                <a:solidFill>
+                  <a:srgbClr val="A83EA3"/>
+                </a:solidFill>
+                <a:ln w="28575">
+                  <a:solidFill>
+                    <a:srgbClr val="A83EA3"/>
+                  </a:solidFill>
+                </a:ln>
+              </p:spPr>
+              <p:style>
+                <a:lnRef idx="2">
+                  <a:schemeClr val="accent1">
+                    <a:shade val="50000"/>
+                  </a:schemeClr>
+                </a:lnRef>
+                <a:fillRef idx="1">
+                  <a:schemeClr val="accent1"/>
+                </a:fillRef>
+                <a:effectRef idx="0">
+                  <a:schemeClr val="accent1"/>
+                </a:effectRef>
+                <a:fontRef idx="minor">
+                  <a:schemeClr val="lt1"/>
+                </a:fontRef>
+              </p:style>
+              <p:txBody>
+                <a:bodyPr rtlCol="0" anchor="ctr"/>
+                <a:lstStyle/>
+                <a:p>
+                  <a:pPr algn="ctr"/>
+                  <a:endParaRPr lang="zh-CN" altLang="en-US" dirty="0"/>
+                </a:p>
+              </p:txBody>
+            </p:sp>
+            <p:sp>
+              <p:nvSpPr>
+                <p:cNvPr id="79" name="矩形 78"/>
+                <p:cNvSpPr/>
+                <p:nvPr/>
+              </p:nvSpPr>
+              <p:spPr>
+                <a:xfrm>
+                  <a:off x="9577888" y="5621065"/>
+                  <a:ext cx="216000" cy="216000"/>
+                </a:xfrm>
+                <a:prstGeom prst="rect">
+                  <a:avLst/>
+                </a:prstGeom>
+                <a:solidFill>
+                  <a:srgbClr val="A83EA3"/>
+                </a:solidFill>
+                <a:ln w="28575">
+                  <a:solidFill>
+                    <a:srgbClr val="A83EA3"/>
+                  </a:solidFill>
+                </a:ln>
+              </p:spPr>
+              <p:style>
+                <a:lnRef idx="2">
+                  <a:schemeClr val="accent1">
+                    <a:shade val="50000"/>
+                  </a:schemeClr>
+                </a:lnRef>
+                <a:fillRef idx="1">
+                  <a:schemeClr val="accent1"/>
+                </a:fillRef>
+                <a:effectRef idx="0">
+                  <a:schemeClr val="accent1"/>
+                </a:effectRef>
+                <a:fontRef idx="minor">
+                  <a:schemeClr val="lt1"/>
+                </a:fontRef>
+              </p:style>
+              <p:txBody>
+                <a:bodyPr rtlCol="0" anchor="ctr"/>
+                <a:lstStyle/>
+                <a:p>
+                  <a:pPr algn="ctr"/>
+                  <a:endParaRPr lang="zh-CN" altLang="en-US" dirty="0"/>
+                </a:p>
+              </p:txBody>
+            </p:sp>
+            <p:sp>
+              <p:nvSpPr>
+                <p:cNvPr id="80" name="矩形 79"/>
+                <p:cNvSpPr/>
+                <p:nvPr/>
+              </p:nvSpPr>
+              <p:spPr>
+                <a:xfrm>
+                  <a:off x="9955985" y="5621065"/>
+                  <a:ext cx="216000" cy="216000"/>
+                </a:xfrm>
+                <a:prstGeom prst="rect">
+                  <a:avLst/>
+                </a:prstGeom>
+                <a:solidFill>
+                  <a:srgbClr val="A83EA3"/>
+                </a:solidFill>
+                <a:ln w="28575">
+                  <a:solidFill>
+                    <a:srgbClr val="A83EA3"/>
+                  </a:solidFill>
+                </a:ln>
+              </p:spPr>
+              <p:style>
+                <a:lnRef idx="2">
+                  <a:schemeClr val="accent1">
+                    <a:shade val="50000"/>
+                  </a:schemeClr>
+                </a:lnRef>
+                <a:fillRef idx="1">
+                  <a:schemeClr val="accent1"/>
+                </a:fillRef>
+                <a:effectRef idx="0">
+                  <a:schemeClr val="accent1"/>
+                </a:effectRef>
+                <a:fontRef idx="minor">
+                  <a:schemeClr val="lt1"/>
+                </a:fontRef>
+              </p:style>
+              <p:txBody>
+                <a:bodyPr rtlCol="0" anchor="ctr"/>
+                <a:lstStyle/>
+                <a:p>
+                  <a:pPr algn="ctr"/>
+                  <a:endParaRPr lang="zh-CN" altLang="en-US" dirty="0"/>
+                </a:p>
+              </p:txBody>
+            </p:sp>
+            <p:sp>
+              <p:nvSpPr>
+                <p:cNvPr id="81" name="矩形 80"/>
+                <p:cNvSpPr/>
+                <p:nvPr/>
+              </p:nvSpPr>
+              <p:spPr>
+                <a:xfrm>
+                  <a:off x="10334083" y="5621065"/>
+                  <a:ext cx="216000" cy="216000"/>
+                </a:xfrm>
+                <a:prstGeom prst="rect">
+                  <a:avLst/>
+                </a:prstGeom>
+                <a:solidFill>
+                  <a:srgbClr val="A83EA3"/>
+                </a:solidFill>
+                <a:ln w="28575">
+                  <a:solidFill>
+                    <a:srgbClr val="A83EA3"/>
+                  </a:solidFill>
+                </a:ln>
+              </p:spPr>
+              <p:style>
+                <a:lnRef idx="2">
+                  <a:schemeClr val="accent1">
+                    <a:shade val="50000"/>
+                  </a:schemeClr>
+                </a:lnRef>
+                <a:fillRef idx="1">
+                  <a:schemeClr val="accent1"/>
+                </a:fillRef>
+                <a:effectRef idx="0">
+                  <a:schemeClr val="accent1"/>
+                </a:effectRef>
+                <a:fontRef idx="minor">
+                  <a:schemeClr val="lt1"/>
+                </a:fontRef>
+              </p:style>
+              <p:txBody>
+                <a:bodyPr rtlCol="0" anchor="ctr"/>
+                <a:lstStyle/>
+                <a:p>
+                  <a:pPr algn="ctr"/>
+                  <a:endParaRPr lang="zh-CN" altLang="en-US" dirty="0"/>
+                </a:p>
+              </p:txBody>
+            </p:sp>
+          </p:grpSp>
+          <p:grpSp>
+            <p:nvGrpSpPr>
+              <p:cNvPr id="95" name="组合 94"/>
+              <p:cNvGrpSpPr/>
               <p:nvPr/>
-            </p:nvSpPr>
-            <p:spPr>
+            </p:nvGrpSpPr>
+            <p:grpSpPr>
               <a:xfrm>
-                <a:off x="7674531" y="4949332"/>
-                <a:ext cx="2879994" cy="175050"/>
+                <a:off x="7674532" y="3079318"/>
+                <a:ext cx="2862681" cy="216000"/>
+                <a:chOff x="7674532" y="3079318"/>
+                <a:chExt cx="2862681" cy="216000"/>
               </a:xfrm>
-              <a:prstGeom prst="rect">
-                <a:avLst/>
-              </a:prstGeom>
-              <a:noFill/>
-              <a:ln w="28575">
+            </p:grpSpPr>
+            <p:sp>
+              <p:nvSpPr>
+                <p:cNvPr id="86" name="矩形 85"/>
+                <p:cNvSpPr/>
+                <p:nvPr/>
+              </p:nvSpPr>
+              <p:spPr>
+                <a:xfrm>
+                  <a:off x="7674532" y="3079318"/>
+                  <a:ext cx="216000" cy="216000"/>
+                </a:xfrm>
+                <a:prstGeom prst="rect">
+                  <a:avLst/>
+                </a:prstGeom>
                 <a:solidFill>
                   <a:srgbClr val="A83EA3"/>
                 </a:solidFill>
-              </a:ln>
-            </p:spPr>
-            <p:style>
-              <a:lnRef idx="2">
-                <a:schemeClr val="accent1">
-                  <a:shade val="50000"/>
-                </a:schemeClr>
-              </a:lnRef>
-              <a:fillRef idx="1">
-                <a:schemeClr val="accent1"/>
-              </a:fillRef>
-              <a:effectRef idx="0">
-                <a:schemeClr val="accent1"/>
-              </a:effectRef>
-              <a:fontRef idx="minor">
-                <a:schemeClr val="lt1"/>
-              </a:fontRef>
-            </p:style>
-            <p:txBody>
-              <a:bodyPr rtlCol="0" anchor="ctr"/>
-              <a:lstStyle/>
-              <a:p>
-                <a:pPr algn="ctr"/>
-                <a:endParaRPr lang="zh-CN" altLang="en-US"/>
-              </a:p>
-            </p:txBody>
-          </p:sp>
-          <p:sp>
-            <p:nvSpPr>
-              <p:cNvPr id="30" name="矩形 29"/>
-              <p:cNvSpPr/>
-              <p:nvPr/>
-            </p:nvSpPr>
-            <p:spPr>
-              <a:xfrm>
-                <a:off x="7674531" y="4565187"/>
-                <a:ext cx="2879994" cy="164857"/>
-              </a:xfrm>
-              <a:prstGeom prst="rect">
-                <a:avLst/>
-              </a:prstGeom>
-              <a:noFill/>
-              <a:ln w="28575">
+                <a:ln w="28575">
+                  <a:solidFill>
+                    <a:srgbClr val="A83EA3"/>
+                  </a:solidFill>
+                </a:ln>
+              </p:spPr>
+              <p:style>
+                <a:lnRef idx="2">
+                  <a:schemeClr val="accent1">
+                    <a:shade val="50000"/>
+                  </a:schemeClr>
+                </a:lnRef>
+                <a:fillRef idx="1">
+                  <a:schemeClr val="accent1"/>
+                </a:fillRef>
+                <a:effectRef idx="0">
+                  <a:schemeClr val="accent1"/>
+                </a:effectRef>
+                <a:fontRef idx="minor">
+                  <a:schemeClr val="lt1"/>
+                </a:fontRef>
+              </p:style>
+              <p:txBody>
+                <a:bodyPr rtlCol="0" anchor="ctr"/>
+                <a:lstStyle/>
+                <a:p>
+                  <a:pPr algn="ctr"/>
+                  <a:endParaRPr lang="zh-CN" altLang="en-US" dirty="0"/>
+                </a:p>
+              </p:txBody>
+            </p:sp>
+            <p:sp>
+              <p:nvSpPr>
+                <p:cNvPr id="87" name="矩形 86"/>
+                <p:cNvSpPr/>
+                <p:nvPr/>
+              </p:nvSpPr>
+              <p:spPr>
+                <a:xfrm>
+                  <a:off x="8052629" y="3079318"/>
+                  <a:ext cx="216000" cy="216000"/>
+                </a:xfrm>
+                <a:prstGeom prst="rect">
+                  <a:avLst/>
+                </a:prstGeom>
                 <a:solidFill>
                   <a:srgbClr val="A83EA3"/>
                 </a:solidFill>
-              </a:ln>
-            </p:spPr>
-            <p:style>
-              <a:lnRef idx="2">
-                <a:schemeClr val="accent1">
-                  <a:shade val="50000"/>
-                </a:schemeClr>
-              </a:lnRef>
-              <a:fillRef idx="1">
-                <a:schemeClr val="accent1"/>
-              </a:fillRef>
-              <a:effectRef idx="0">
-                <a:schemeClr val="accent1"/>
-              </a:effectRef>
-              <a:fontRef idx="minor">
-                <a:schemeClr val="lt1"/>
-              </a:fontRef>
-            </p:style>
-            <p:txBody>
-              <a:bodyPr rtlCol="0" anchor="ctr"/>
-              <a:lstStyle/>
-              <a:p>
-                <a:pPr algn="ctr"/>
-                <a:endParaRPr lang="zh-CN" altLang="en-US"/>
-              </a:p>
-            </p:txBody>
-          </p:sp>
+                <a:ln w="28575">
+                  <a:solidFill>
+                    <a:srgbClr val="A83EA3"/>
+                  </a:solidFill>
+                </a:ln>
+              </p:spPr>
+              <p:style>
+                <a:lnRef idx="2">
+                  <a:schemeClr val="accent1">
+                    <a:shade val="50000"/>
+                  </a:schemeClr>
+                </a:lnRef>
+                <a:fillRef idx="1">
+                  <a:schemeClr val="accent1"/>
+                </a:fillRef>
+                <a:effectRef idx="0">
+                  <a:schemeClr val="accent1"/>
+                </a:effectRef>
+                <a:fontRef idx="minor">
+                  <a:schemeClr val="lt1"/>
+                </a:fontRef>
+              </p:style>
+              <p:txBody>
+                <a:bodyPr rtlCol="0" anchor="ctr"/>
+                <a:lstStyle/>
+                <a:p>
+                  <a:pPr algn="ctr"/>
+                  <a:endParaRPr lang="zh-CN" altLang="en-US" dirty="0"/>
+                </a:p>
+              </p:txBody>
+            </p:sp>
+            <p:sp>
+              <p:nvSpPr>
+                <p:cNvPr id="88" name="矩形 87"/>
+                <p:cNvSpPr/>
+                <p:nvPr/>
+              </p:nvSpPr>
+              <p:spPr>
+                <a:xfrm>
+                  <a:off x="8430726" y="3079318"/>
+                  <a:ext cx="216000" cy="216000"/>
+                </a:xfrm>
+                <a:prstGeom prst="rect">
+                  <a:avLst/>
+                </a:prstGeom>
+                <a:solidFill>
+                  <a:srgbClr val="A83EA3"/>
+                </a:solidFill>
+                <a:ln w="28575">
+                  <a:solidFill>
+                    <a:srgbClr val="A83EA3"/>
+                  </a:solidFill>
+                </a:ln>
+              </p:spPr>
+              <p:style>
+                <a:lnRef idx="2">
+                  <a:schemeClr val="accent1">
+                    <a:shade val="50000"/>
+                  </a:schemeClr>
+                </a:lnRef>
+                <a:fillRef idx="1">
+                  <a:schemeClr val="accent1"/>
+                </a:fillRef>
+                <a:effectRef idx="0">
+                  <a:schemeClr val="accent1"/>
+                </a:effectRef>
+                <a:fontRef idx="minor">
+                  <a:schemeClr val="lt1"/>
+                </a:fontRef>
+              </p:style>
+              <p:txBody>
+                <a:bodyPr rtlCol="0" anchor="ctr"/>
+                <a:lstStyle/>
+                <a:p>
+                  <a:pPr algn="ctr"/>
+                  <a:endParaRPr lang="zh-CN" altLang="en-US" dirty="0"/>
+                </a:p>
+              </p:txBody>
+            </p:sp>
+            <p:sp>
+              <p:nvSpPr>
+                <p:cNvPr id="89" name="矩形 88"/>
+                <p:cNvSpPr/>
+                <p:nvPr/>
+              </p:nvSpPr>
+              <p:spPr>
+                <a:xfrm>
+                  <a:off x="8808824" y="3079318"/>
+                  <a:ext cx="216000" cy="216000"/>
+                </a:xfrm>
+                <a:prstGeom prst="rect">
+                  <a:avLst/>
+                </a:prstGeom>
+                <a:solidFill>
+                  <a:srgbClr val="A83EA3"/>
+                </a:solidFill>
+                <a:ln w="28575">
+                  <a:solidFill>
+                    <a:srgbClr val="A83EA3"/>
+                  </a:solidFill>
+                </a:ln>
+              </p:spPr>
+              <p:style>
+                <a:lnRef idx="2">
+                  <a:schemeClr val="accent1">
+                    <a:shade val="50000"/>
+                  </a:schemeClr>
+                </a:lnRef>
+                <a:fillRef idx="1">
+                  <a:schemeClr val="accent1"/>
+                </a:fillRef>
+                <a:effectRef idx="0">
+                  <a:schemeClr val="accent1"/>
+                </a:effectRef>
+                <a:fontRef idx="minor">
+                  <a:schemeClr val="lt1"/>
+                </a:fontRef>
+              </p:style>
+              <p:txBody>
+                <a:bodyPr rtlCol="0" anchor="ctr"/>
+                <a:lstStyle/>
+                <a:p>
+                  <a:pPr algn="ctr"/>
+                  <a:endParaRPr lang="zh-CN" altLang="en-US" dirty="0"/>
+                </a:p>
+              </p:txBody>
+            </p:sp>
+            <p:sp>
+              <p:nvSpPr>
+                <p:cNvPr id="90" name="矩形 89"/>
+                <p:cNvSpPr/>
+                <p:nvPr/>
+              </p:nvSpPr>
+              <p:spPr>
+                <a:xfrm>
+                  <a:off x="9186921" y="3079318"/>
+                  <a:ext cx="216000" cy="216000"/>
+                </a:xfrm>
+                <a:prstGeom prst="rect">
+                  <a:avLst/>
+                </a:prstGeom>
+                <a:solidFill>
+                  <a:srgbClr val="A83EA3"/>
+                </a:solidFill>
+                <a:ln w="28575">
+                  <a:solidFill>
+                    <a:srgbClr val="A83EA3"/>
+                  </a:solidFill>
+                </a:ln>
+              </p:spPr>
+              <p:style>
+                <a:lnRef idx="2">
+                  <a:schemeClr val="accent1">
+                    <a:shade val="50000"/>
+                  </a:schemeClr>
+                </a:lnRef>
+                <a:fillRef idx="1">
+                  <a:schemeClr val="accent1"/>
+                </a:fillRef>
+                <a:effectRef idx="0">
+                  <a:schemeClr val="accent1"/>
+                </a:effectRef>
+                <a:fontRef idx="minor">
+                  <a:schemeClr val="lt1"/>
+                </a:fontRef>
+              </p:style>
+              <p:txBody>
+                <a:bodyPr rtlCol="0" anchor="ctr"/>
+                <a:lstStyle/>
+                <a:p>
+                  <a:pPr algn="ctr"/>
+                  <a:endParaRPr lang="zh-CN" altLang="en-US" dirty="0"/>
+                </a:p>
+              </p:txBody>
+            </p:sp>
+            <p:sp>
+              <p:nvSpPr>
+                <p:cNvPr id="91" name="矩形 90"/>
+                <p:cNvSpPr/>
+                <p:nvPr/>
+              </p:nvSpPr>
+              <p:spPr>
+                <a:xfrm>
+                  <a:off x="9565018" y="3079318"/>
+                  <a:ext cx="216000" cy="216000"/>
+                </a:xfrm>
+                <a:prstGeom prst="rect">
+                  <a:avLst/>
+                </a:prstGeom>
+                <a:solidFill>
+                  <a:srgbClr val="A83EA3"/>
+                </a:solidFill>
+                <a:ln w="28575">
+                  <a:solidFill>
+                    <a:srgbClr val="A83EA3"/>
+                  </a:solidFill>
+                </a:ln>
+              </p:spPr>
+              <p:style>
+                <a:lnRef idx="2">
+                  <a:schemeClr val="accent1">
+                    <a:shade val="50000"/>
+                  </a:schemeClr>
+                </a:lnRef>
+                <a:fillRef idx="1">
+                  <a:schemeClr val="accent1"/>
+                </a:fillRef>
+                <a:effectRef idx="0">
+                  <a:schemeClr val="accent1"/>
+                </a:effectRef>
+                <a:fontRef idx="minor">
+                  <a:schemeClr val="lt1"/>
+                </a:fontRef>
+              </p:style>
+              <p:txBody>
+                <a:bodyPr rtlCol="0" anchor="ctr"/>
+                <a:lstStyle/>
+                <a:p>
+                  <a:pPr algn="ctr"/>
+                  <a:endParaRPr lang="zh-CN" altLang="en-US" dirty="0"/>
+                </a:p>
+              </p:txBody>
+            </p:sp>
+            <p:sp>
+              <p:nvSpPr>
+                <p:cNvPr id="92" name="矩形 91"/>
+                <p:cNvSpPr/>
+                <p:nvPr/>
+              </p:nvSpPr>
+              <p:spPr>
+                <a:xfrm>
+                  <a:off x="9943115" y="3079318"/>
+                  <a:ext cx="216000" cy="216000"/>
+                </a:xfrm>
+                <a:prstGeom prst="rect">
+                  <a:avLst/>
+                </a:prstGeom>
+                <a:solidFill>
+                  <a:srgbClr val="A83EA3"/>
+                </a:solidFill>
+                <a:ln w="28575">
+                  <a:solidFill>
+                    <a:srgbClr val="A83EA3"/>
+                  </a:solidFill>
+                </a:ln>
+              </p:spPr>
+              <p:style>
+                <a:lnRef idx="2">
+                  <a:schemeClr val="accent1">
+                    <a:shade val="50000"/>
+                  </a:schemeClr>
+                </a:lnRef>
+                <a:fillRef idx="1">
+                  <a:schemeClr val="accent1"/>
+                </a:fillRef>
+                <a:effectRef idx="0">
+                  <a:schemeClr val="accent1"/>
+                </a:effectRef>
+                <a:fontRef idx="minor">
+                  <a:schemeClr val="lt1"/>
+                </a:fontRef>
+              </p:style>
+              <p:txBody>
+                <a:bodyPr rtlCol="0" anchor="ctr"/>
+                <a:lstStyle/>
+                <a:p>
+                  <a:pPr algn="ctr"/>
+                  <a:endParaRPr lang="zh-CN" altLang="en-US" dirty="0"/>
+                </a:p>
+              </p:txBody>
+            </p:sp>
+            <p:sp>
+              <p:nvSpPr>
+                <p:cNvPr id="93" name="矩形 92"/>
+                <p:cNvSpPr/>
+                <p:nvPr/>
+              </p:nvSpPr>
+              <p:spPr>
+                <a:xfrm>
+                  <a:off x="10321213" y="3079318"/>
+                  <a:ext cx="216000" cy="216000"/>
+                </a:xfrm>
+                <a:prstGeom prst="rect">
+                  <a:avLst/>
+                </a:prstGeom>
+                <a:solidFill>
+                  <a:srgbClr val="A83EA3"/>
+                </a:solidFill>
+                <a:ln w="28575">
+                  <a:solidFill>
+                    <a:srgbClr val="A83EA3"/>
+                  </a:solidFill>
+                </a:ln>
+              </p:spPr>
+              <p:style>
+                <a:lnRef idx="2">
+                  <a:schemeClr val="accent1">
+                    <a:shade val="50000"/>
+                  </a:schemeClr>
+                </a:lnRef>
+                <a:fillRef idx="1">
+                  <a:schemeClr val="accent1"/>
+                </a:fillRef>
+                <a:effectRef idx="0">
+                  <a:schemeClr val="accent1"/>
+                </a:effectRef>
+                <a:fontRef idx="minor">
+                  <a:schemeClr val="lt1"/>
+                </a:fontRef>
+              </p:style>
+              <p:txBody>
+                <a:bodyPr rtlCol="0" anchor="ctr"/>
+                <a:lstStyle/>
+                <a:p>
+                  <a:pPr algn="ctr"/>
+                  <a:endParaRPr lang="zh-CN" altLang="en-US" dirty="0"/>
+                </a:p>
+              </p:txBody>
+            </p:sp>
+          </p:grpSp>
         </p:grpSp>
-        <p:grpSp>
-          <p:nvGrpSpPr>
-            <p:cNvPr id="96" name="组合 95"/>
-            <p:cNvGrpSpPr/>
+        <p:sp>
+          <p:nvSpPr>
+            <p:cNvPr id="3" name="文本框 2"/>
+            <p:cNvSpPr txBox="1"/>
             <p:nvPr/>
-          </p:nvGrpSpPr>
-          <p:grpSpPr>
+          </p:nvSpPr>
+          <p:spPr>
+            <a:xfrm rot="5400000">
+              <a:off x="8533761" y="4143091"/>
+              <a:ext cx="1473200" cy="646331"/>
+            </a:xfrm>
+            <a:prstGeom prst="rect">
+              <a:avLst/>
+            </a:prstGeom>
+            <a:noFill/>
+          </p:spPr>
+          <p:txBody>
+            <a:bodyPr wrap="square" rtlCol="0">
+              <a:spAutoFit/>
+            </a:bodyPr>
+            <a:lstStyle/>
+            <a:p>
+              <a:pPr algn="ctr"/>
+              <a:r>
+                <a:rPr lang="en-US" altLang="zh-CN" sz="3600" b="1" dirty="0" smtClean="0">
+                  <a:solidFill>
+                    <a:srgbClr val="A83EA3"/>
+                  </a:solidFill>
+                  <a:latin typeface="Calibri" panose="020F0502020204030204" pitchFamily="34" charset="0"/>
+                  <a:ea typeface="Calibri" panose="020F0502020204030204" pitchFamily="34" charset="0"/>
+                  <a:cs typeface="Calibri" panose="020F0502020204030204" pitchFamily="34" charset="0"/>
+                </a:rPr>
+                <a:t>…… </a:t>
+              </a:r>
+              <a:endParaRPr lang="zh-CN" altLang="en-US" sz="3600" b="1" dirty="0">
+                <a:solidFill>
+                  <a:srgbClr val="A83EA3"/>
+                </a:solidFill>
+                <a:latin typeface="Calibri" panose="020F0502020204030204" pitchFamily="34" charset="0"/>
+                <a:ea typeface="Calibri" panose="020F0502020204030204" pitchFamily="34" charset="0"/>
+                <a:cs typeface="Calibri" panose="020F0502020204030204" pitchFamily="34" charset="0"/>
+              </a:endParaRPr>
+            </a:p>
+          </p:txBody>
+        </p:sp>
+        <p:sp>
+          <p:nvSpPr>
+            <p:cNvPr id="4" name="矩形 3"/>
+            <p:cNvSpPr/>
+            <p:nvPr/>
+          </p:nvSpPr>
+          <p:spPr>
             <a:xfrm>
-              <a:off x="7674532" y="5672058"/>
-              <a:ext cx="2862681" cy="216000"/>
-              <a:chOff x="7687402" y="5621065"/>
-              <a:chExt cx="2862681" cy="216000"/>
+              <a:off x="9386901" y="4087351"/>
+              <a:ext cx="718466" cy="646331"/>
             </a:xfrm>
-          </p:grpSpPr>
-          <p:sp>
-            <p:nvSpPr>
-              <p:cNvPr id="74" name="矩形 73"/>
-              <p:cNvSpPr/>
-              <p:nvPr/>
-            </p:nvSpPr>
-            <p:spPr>
-              <a:xfrm>
-                <a:off x="7687402" y="5621065"/>
-                <a:ext cx="216000" cy="216000"/>
-              </a:xfrm>
-              <a:prstGeom prst="rect">
-                <a:avLst/>
-              </a:prstGeom>
+            <a:prstGeom prst="rect">
+              <a:avLst/>
+            </a:prstGeom>
+          </p:spPr>
+          <p:txBody>
+            <a:bodyPr wrap="none">
+              <a:spAutoFit/>
+            </a:bodyPr>
+            <a:lstStyle/>
+            <a:p>
+              <a:pPr algn="ctr"/>
+              <a:r>
+                <a:rPr lang="en-US" altLang="zh-CN" sz="3600" b="1" dirty="0">
+                  <a:solidFill>
+                    <a:srgbClr val="A83EA3"/>
+                  </a:solidFill>
+                  <a:latin typeface="Calibri" panose="020F0502020204030204" pitchFamily="34" charset="0"/>
+                  <a:ea typeface="Calibri" panose="020F0502020204030204" pitchFamily="34" charset="0"/>
+                  <a:cs typeface="Calibri" panose="020F0502020204030204" pitchFamily="34" charset="0"/>
+                </a:rPr>
+                <a:t>×N</a:t>
+              </a:r>
+              <a:endParaRPr lang="zh-CN" altLang="en-US" sz="3600" b="1" dirty="0">
+                <a:solidFill>
+                  <a:srgbClr val="A83EA3"/>
+                </a:solidFill>
+                <a:latin typeface="Calibri" panose="020F0502020204030204" pitchFamily="34" charset="0"/>
+                <a:ea typeface="Calibri" panose="020F0502020204030204" pitchFamily="34" charset="0"/>
+                <a:cs typeface="Calibri" panose="020F0502020204030204" pitchFamily="34" charset="0"/>
+              </a:endParaRPr>
+            </a:p>
+          </p:txBody>
+        </p:sp>
+        <p:sp>
+          <p:nvSpPr>
+            <p:cNvPr id="51" name="矩形 50"/>
+            <p:cNvSpPr/>
+            <p:nvPr/>
+          </p:nvSpPr>
+          <p:spPr>
+            <a:xfrm>
+              <a:off x="7674532" y="3470833"/>
+              <a:ext cx="2879994" cy="445501"/>
+            </a:xfrm>
+            <a:prstGeom prst="rect">
+              <a:avLst/>
+            </a:prstGeom>
+            <a:noFill/>
+            <a:ln w="28575">
               <a:solidFill>
                 <a:srgbClr val="A83EA3"/>
               </a:solidFill>
-              <a:ln w="28575">
-                <a:solidFill>
-                  <a:srgbClr val="A83EA3"/>
-                </a:solidFill>
-              </a:ln>
-            </p:spPr>
-            <p:style>
-              <a:lnRef idx="2">
-                <a:schemeClr val="accent1">
-                  <a:shade val="50000"/>
-                </a:schemeClr>
-              </a:lnRef>
-              <a:fillRef idx="1">
-                <a:schemeClr val="accent1"/>
-              </a:fillRef>
-              <a:effectRef idx="0">
-                <a:schemeClr val="accent1"/>
-              </a:effectRef>
-              <a:fontRef idx="minor">
-                <a:schemeClr val="lt1"/>
-              </a:fontRef>
-            </p:style>
-            <p:txBody>
-              <a:bodyPr rtlCol="0" anchor="ctr"/>
-              <a:lstStyle/>
-              <a:p>
-                <a:pPr algn="ctr"/>
-                <a:endParaRPr lang="zh-CN" altLang="en-US" dirty="0"/>
-              </a:p>
-            </p:txBody>
-          </p:sp>
-          <p:sp>
-            <p:nvSpPr>
-              <p:cNvPr id="75" name="矩形 74"/>
-              <p:cNvSpPr/>
-              <p:nvPr/>
-            </p:nvSpPr>
-            <p:spPr>
-              <a:xfrm>
-                <a:off x="8065499" y="5621065"/>
-                <a:ext cx="216000" cy="216000"/>
-              </a:xfrm>
-              <a:prstGeom prst="rect">
-                <a:avLst/>
-              </a:prstGeom>
-              <a:solidFill>
-                <a:srgbClr val="A83EA3"/>
-              </a:solidFill>
-              <a:ln w="28575">
-                <a:solidFill>
-                  <a:srgbClr val="A83EA3"/>
-                </a:solidFill>
-              </a:ln>
-            </p:spPr>
-            <p:style>
-              <a:lnRef idx="2">
-                <a:schemeClr val="accent1">
-                  <a:shade val="50000"/>
-                </a:schemeClr>
-              </a:lnRef>
-              <a:fillRef idx="1">
-                <a:schemeClr val="accent1"/>
-              </a:fillRef>
-              <a:effectRef idx="0">
-                <a:schemeClr val="accent1"/>
-              </a:effectRef>
-              <a:fontRef idx="minor">
-                <a:schemeClr val="lt1"/>
-              </a:fontRef>
-            </p:style>
-            <p:txBody>
-              <a:bodyPr rtlCol="0" anchor="ctr"/>
-              <a:lstStyle/>
-              <a:p>
-                <a:pPr algn="ctr"/>
-                <a:endParaRPr lang="zh-CN" altLang="en-US" dirty="0"/>
-              </a:p>
-            </p:txBody>
-          </p:sp>
-          <p:sp>
-            <p:nvSpPr>
-              <p:cNvPr id="76" name="矩形 75"/>
-              <p:cNvSpPr/>
-              <p:nvPr/>
-            </p:nvSpPr>
-            <p:spPr>
-              <a:xfrm>
-                <a:off x="8443596" y="5621065"/>
-                <a:ext cx="216000" cy="216000"/>
-              </a:xfrm>
-              <a:prstGeom prst="rect">
-                <a:avLst/>
-              </a:prstGeom>
-              <a:solidFill>
-                <a:srgbClr val="A83EA3"/>
-              </a:solidFill>
-              <a:ln w="28575">
-                <a:solidFill>
-                  <a:srgbClr val="A83EA3"/>
-                </a:solidFill>
-              </a:ln>
-            </p:spPr>
-            <p:style>
-              <a:lnRef idx="2">
-                <a:schemeClr val="accent1">
-                  <a:shade val="50000"/>
-                </a:schemeClr>
-              </a:lnRef>
-              <a:fillRef idx="1">
-                <a:schemeClr val="accent1"/>
-              </a:fillRef>
-              <a:effectRef idx="0">
-                <a:schemeClr val="accent1"/>
-              </a:effectRef>
-              <a:fontRef idx="minor">
-                <a:schemeClr val="lt1"/>
-              </a:fontRef>
-            </p:style>
-            <p:txBody>
-              <a:bodyPr rtlCol="0" anchor="ctr"/>
-              <a:lstStyle/>
-              <a:p>
-                <a:pPr algn="ctr"/>
-                <a:endParaRPr lang="zh-CN" altLang="en-US" dirty="0"/>
-              </a:p>
-            </p:txBody>
-          </p:sp>
-          <p:sp>
-            <p:nvSpPr>
-              <p:cNvPr id="77" name="矩形 76"/>
-              <p:cNvSpPr/>
-              <p:nvPr/>
-            </p:nvSpPr>
-            <p:spPr>
-              <a:xfrm>
-                <a:off x="8821694" y="5621065"/>
-                <a:ext cx="216000" cy="216000"/>
-              </a:xfrm>
-              <a:prstGeom prst="rect">
-                <a:avLst/>
-              </a:prstGeom>
-              <a:solidFill>
-                <a:srgbClr val="A83EA3"/>
-              </a:solidFill>
-              <a:ln w="28575">
-                <a:solidFill>
-                  <a:srgbClr val="A83EA3"/>
-                </a:solidFill>
-              </a:ln>
-            </p:spPr>
-            <p:style>
-              <a:lnRef idx="2">
-                <a:schemeClr val="accent1">
-                  <a:shade val="50000"/>
-                </a:schemeClr>
-              </a:lnRef>
-              <a:fillRef idx="1">
-                <a:schemeClr val="accent1"/>
-              </a:fillRef>
-              <a:effectRef idx="0">
-                <a:schemeClr val="accent1"/>
-              </a:effectRef>
-              <a:fontRef idx="minor">
-                <a:schemeClr val="lt1"/>
-              </a:fontRef>
-            </p:style>
-            <p:txBody>
-              <a:bodyPr rtlCol="0" anchor="ctr"/>
-              <a:lstStyle/>
-              <a:p>
-                <a:pPr algn="ctr"/>
-                <a:endParaRPr lang="zh-CN" altLang="en-US" dirty="0"/>
-              </a:p>
-            </p:txBody>
-          </p:sp>
-          <p:sp>
-            <p:nvSpPr>
-              <p:cNvPr id="78" name="矩形 77"/>
-              <p:cNvSpPr/>
-              <p:nvPr/>
-            </p:nvSpPr>
-            <p:spPr>
-              <a:xfrm>
-                <a:off x="9199791" y="5621065"/>
-                <a:ext cx="216000" cy="216000"/>
-              </a:xfrm>
-              <a:prstGeom prst="rect">
-                <a:avLst/>
-              </a:prstGeom>
-              <a:solidFill>
-                <a:srgbClr val="A83EA3"/>
-              </a:solidFill>
-              <a:ln w="28575">
-                <a:solidFill>
-                  <a:srgbClr val="A83EA3"/>
-                </a:solidFill>
-              </a:ln>
-            </p:spPr>
-            <p:style>
-              <a:lnRef idx="2">
-                <a:schemeClr val="accent1">
-                  <a:shade val="50000"/>
-                </a:schemeClr>
-              </a:lnRef>
-              <a:fillRef idx="1">
-                <a:schemeClr val="accent1"/>
-              </a:fillRef>
-              <a:effectRef idx="0">
-                <a:schemeClr val="accent1"/>
-              </a:effectRef>
-              <a:fontRef idx="minor">
-                <a:schemeClr val="lt1"/>
-              </a:fontRef>
-            </p:style>
-            <p:txBody>
-              <a:bodyPr rtlCol="0" anchor="ctr"/>
-              <a:lstStyle/>
-              <a:p>
-                <a:pPr algn="ctr"/>
-                <a:endParaRPr lang="zh-CN" altLang="en-US" dirty="0"/>
-              </a:p>
-            </p:txBody>
-          </p:sp>
-          <p:sp>
-            <p:nvSpPr>
-              <p:cNvPr id="79" name="矩形 78"/>
-              <p:cNvSpPr/>
-              <p:nvPr/>
-            </p:nvSpPr>
-            <p:spPr>
-              <a:xfrm>
-                <a:off x="9577888" y="5621065"/>
-                <a:ext cx="216000" cy="216000"/>
-              </a:xfrm>
-              <a:prstGeom prst="rect">
-                <a:avLst/>
-              </a:prstGeom>
-              <a:solidFill>
-                <a:srgbClr val="A83EA3"/>
-              </a:solidFill>
-              <a:ln w="28575">
-                <a:solidFill>
-                  <a:srgbClr val="A83EA3"/>
-                </a:solidFill>
-              </a:ln>
-            </p:spPr>
-            <p:style>
-              <a:lnRef idx="2">
-                <a:schemeClr val="accent1">
-                  <a:shade val="50000"/>
-                </a:schemeClr>
-              </a:lnRef>
-              <a:fillRef idx="1">
-                <a:schemeClr val="accent1"/>
-              </a:fillRef>
-              <a:effectRef idx="0">
-                <a:schemeClr val="accent1"/>
-              </a:effectRef>
-              <a:fontRef idx="minor">
-                <a:schemeClr val="lt1"/>
-              </a:fontRef>
-            </p:style>
-            <p:txBody>
-              <a:bodyPr rtlCol="0" anchor="ctr"/>
-              <a:lstStyle/>
-              <a:p>
-                <a:pPr algn="ctr"/>
-                <a:endParaRPr lang="zh-CN" altLang="en-US" dirty="0"/>
-              </a:p>
-            </p:txBody>
-          </p:sp>
-          <p:sp>
-            <p:nvSpPr>
-              <p:cNvPr id="80" name="矩形 79"/>
-              <p:cNvSpPr/>
-              <p:nvPr/>
-            </p:nvSpPr>
-            <p:spPr>
-              <a:xfrm>
-                <a:off x="9955985" y="5621065"/>
-                <a:ext cx="216000" cy="216000"/>
-              </a:xfrm>
-              <a:prstGeom prst="rect">
-                <a:avLst/>
-              </a:prstGeom>
-              <a:solidFill>
-                <a:srgbClr val="A83EA3"/>
-              </a:solidFill>
-              <a:ln w="28575">
-                <a:solidFill>
-                  <a:srgbClr val="A83EA3"/>
-                </a:solidFill>
-              </a:ln>
-            </p:spPr>
-            <p:style>
-              <a:lnRef idx="2">
-                <a:schemeClr val="accent1">
-                  <a:shade val="50000"/>
-                </a:schemeClr>
-              </a:lnRef>
-              <a:fillRef idx="1">
-                <a:schemeClr val="accent1"/>
-              </a:fillRef>
-              <a:effectRef idx="0">
-                <a:schemeClr val="accent1"/>
-              </a:effectRef>
-              <a:fontRef idx="minor">
-                <a:schemeClr val="lt1"/>
-              </a:fontRef>
-            </p:style>
-            <p:txBody>
-              <a:bodyPr rtlCol="0" anchor="ctr"/>
-              <a:lstStyle/>
-              <a:p>
-                <a:pPr algn="ctr"/>
-                <a:endParaRPr lang="zh-CN" altLang="en-US" dirty="0"/>
-              </a:p>
-            </p:txBody>
-          </p:sp>
-          <p:sp>
-            <p:nvSpPr>
-              <p:cNvPr id="81" name="矩形 80"/>
-              <p:cNvSpPr/>
-              <p:nvPr/>
-            </p:nvSpPr>
-            <p:spPr>
-              <a:xfrm>
-                <a:off x="10334083" y="5621065"/>
-                <a:ext cx="216000" cy="216000"/>
-              </a:xfrm>
-              <a:prstGeom prst="rect">
-                <a:avLst/>
-              </a:prstGeom>
-              <a:solidFill>
-                <a:srgbClr val="A83EA3"/>
-              </a:solidFill>
-              <a:ln w="28575">
-                <a:solidFill>
-                  <a:srgbClr val="A83EA3"/>
-                </a:solidFill>
-              </a:ln>
-            </p:spPr>
-            <p:style>
-              <a:lnRef idx="2">
-                <a:schemeClr val="accent1">
-                  <a:shade val="50000"/>
-                </a:schemeClr>
-              </a:lnRef>
-              <a:fillRef idx="1">
-                <a:schemeClr val="accent1"/>
-              </a:fillRef>
-              <a:effectRef idx="0">
-                <a:schemeClr val="accent1"/>
-              </a:effectRef>
-              <a:fontRef idx="minor">
-                <a:schemeClr val="lt1"/>
-              </a:fontRef>
-            </p:style>
-            <p:txBody>
-              <a:bodyPr rtlCol="0" anchor="ctr"/>
-              <a:lstStyle/>
-              <a:p>
-                <a:pPr algn="ctr"/>
-                <a:endParaRPr lang="zh-CN" altLang="en-US" dirty="0"/>
-              </a:p>
-            </p:txBody>
-          </p:sp>
-        </p:grpSp>
-        <p:grpSp>
-          <p:nvGrpSpPr>
-            <p:cNvPr id="95" name="组合 94"/>
-            <p:cNvGrpSpPr/>
-            <p:nvPr/>
-          </p:nvGrpSpPr>
-          <p:grpSpPr>
-            <a:xfrm>
-              <a:off x="7674532" y="3079318"/>
-              <a:ext cx="2862681" cy="216000"/>
-              <a:chOff x="7674532" y="3079318"/>
-              <a:chExt cx="2862681" cy="216000"/>
-            </a:xfrm>
-          </p:grpSpPr>
-          <p:sp>
-            <p:nvSpPr>
-              <p:cNvPr id="86" name="矩形 85"/>
-              <p:cNvSpPr/>
-              <p:nvPr/>
-            </p:nvSpPr>
-            <p:spPr>
-              <a:xfrm>
-                <a:off x="7674532" y="3079318"/>
-                <a:ext cx="216000" cy="216000"/>
-              </a:xfrm>
-              <a:prstGeom prst="rect">
-                <a:avLst/>
-              </a:prstGeom>
-              <a:solidFill>
-                <a:srgbClr val="A83EA3"/>
-              </a:solidFill>
-              <a:ln w="28575">
-                <a:solidFill>
-                  <a:srgbClr val="A83EA3"/>
-                </a:solidFill>
-              </a:ln>
-            </p:spPr>
-            <p:style>
-              <a:lnRef idx="2">
-                <a:schemeClr val="accent1">
-                  <a:shade val="50000"/>
-                </a:schemeClr>
-              </a:lnRef>
-              <a:fillRef idx="1">
-                <a:schemeClr val="accent1"/>
-              </a:fillRef>
-              <a:effectRef idx="0">
-                <a:schemeClr val="accent1"/>
-              </a:effectRef>
-              <a:fontRef idx="minor">
-                <a:schemeClr val="lt1"/>
-              </a:fontRef>
-            </p:style>
-            <p:txBody>
-              <a:bodyPr rtlCol="0" anchor="ctr"/>
-              <a:lstStyle/>
-              <a:p>
-                <a:pPr algn="ctr"/>
-                <a:endParaRPr lang="zh-CN" altLang="en-US" dirty="0"/>
-              </a:p>
-            </p:txBody>
-          </p:sp>
-          <p:sp>
-            <p:nvSpPr>
-              <p:cNvPr id="87" name="矩形 86"/>
-              <p:cNvSpPr/>
-              <p:nvPr/>
-            </p:nvSpPr>
-            <p:spPr>
-              <a:xfrm>
-                <a:off x="8052629" y="3079318"/>
-                <a:ext cx="216000" cy="216000"/>
-              </a:xfrm>
-              <a:prstGeom prst="rect">
-                <a:avLst/>
-              </a:prstGeom>
-              <a:solidFill>
-                <a:srgbClr val="A83EA3"/>
-              </a:solidFill>
-              <a:ln w="28575">
-                <a:solidFill>
-                  <a:srgbClr val="A83EA3"/>
-                </a:solidFill>
-              </a:ln>
-            </p:spPr>
-            <p:style>
-              <a:lnRef idx="2">
-                <a:schemeClr val="accent1">
-                  <a:shade val="50000"/>
-                </a:schemeClr>
-              </a:lnRef>
-              <a:fillRef idx="1">
-                <a:schemeClr val="accent1"/>
-              </a:fillRef>
-              <a:effectRef idx="0">
-                <a:schemeClr val="accent1"/>
-              </a:effectRef>
-              <a:fontRef idx="minor">
-                <a:schemeClr val="lt1"/>
-              </a:fontRef>
-            </p:style>
-            <p:txBody>
-              <a:bodyPr rtlCol="0" anchor="ctr"/>
-              <a:lstStyle/>
-              <a:p>
-                <a:pPr algn="ctr"/>
-                <a:endParaRPr lang="zh-CN" altLang="en-US" dirty="0"/>
-              </a:p>
-            </p:txBody>
-          </p:sp>
-          <p:sp>
-            <p:nvSpPr>
-              <p:cNvPr id="88" name="矩形 87"/>
-              <p:cNvSpPr/>
-              <p:nvPr/>
-            </p:nvSpPr>
-            <p:spPr>
-              <a:xfrm>
-                <a:off x="8430726" y="3079318"/>
-                <a:ext cx="216000" cy="216000"/>
-              </a:xfrm>
-              <a:prstGeom prst="rect">
-                <a:avLst/>
-              </a:prstGeom>
-              <a:solidFill>
-                <a:srgbClr val="A83EA3"/>
-              </a:solidFill>
-              <a:ln w="28575">
-                <a:solidFill>
-                  <a:srgbClr val="A83EA3"/>
-                </a:solidFill>
-              </a:ln>
-            </p:spPr>
-            <p:style>
-              <a:lnRef idx="2">
-                <a:schemeClr val="accent1">
-                  <a:shade val="50000"/>
-                </a:schemeClr>
-              </a:lnRef>
-              <a:fillRef idx="1">
-                <a:schemeClr val="accent1"/>
-              </a:fillRef>
-              <a:effectRef idx="0">
-                <a:schemeClr val="accent1"/>
-              </a:effectRef>
-              <a:fontRef idx="minor">
-                <a:schemeClr val="lt1"/>
-              </a:fontRef>
-            </p:style>
-            <p:txBody>
-              <a:bodyPr rtlCol="0" anchor="ctr"/>
-              <a:lstStyle/>
-              <a:p>
-                <a:pPr algn="ctr"/>
-                <a:endParaRPr lang="zh-CN" altLang="en-US" dirty="0"/>
-              </a:p>
-            </p:txBody>
-          </p:sp>
-          <p:sp>
-            <p:nvSpPr>
-              <p:cNvPr id="89" name="矩形 88"/>
-              <p:cNvSpPr/>
-              <p:nvPr/>
-            </p:nvSpPr>
-            <p:spPr>
-              <a:xfrm>
-                <a:off x="8808824" y="3079318"/>
-                <a:ext cx="216000" cy="216000"/>
-              </a:xfrm>
-              <a:prstGeom prst="rect">
-                <a:avLst/>
-              </a:prstGeom>
-              <a:solidFill>
-                <a:srgbClr val="A83EA3"/>
-              </a:solidFill>
-              <a:ln w="28575">
-                <a:solidFill>
-                  <a:srgbClr val="A83EA3"/>
-                </a:solidFill>
-              </a:ln>
-            </p:spPr>
-            <p:style>
-              <a:lnRef idx="2">
-                <a:schemeClr val="accent1">
-                  <a:shade val="50000"/>
-                </a:schemeClr>
-              </a:lnRef>
-              <a:fillRef idx="1">
-                <a:schemeClr val="accent1"/>
-              </a:fillRef>
-              <a:effectRef idx="0">
-                <a:schemeClr val="accent1"/>
-              </a:effectRef>
-              <a:fontRef idx="minor">
-                <a:schemeClr val="lt1"/>
-              </a:fontRef>
-            </p:style>
-            <p:txBody>
-              <a:bodyPr rtlCol="0" anchor="ctr"/>
-              <a:lstStyle/>
-              <a:p>
-                <a:pPr algn="ctr"/>
-                <a:endParaRPr lang="zh-CN" altLang="en-US" dirty="0"/>
-              </a:p>
-            </p:txBody>
-          </p:sp>
-          <p:sp>
-            <p:nvSpPr>
-              <p:cNvPr id="90" name="矩形 89"/>
-              <p:cNvSpPr/>
-              <p:nvPr/>
-            </p:nvSpPr>
-            <p:spPr>
-              <a:xfrm>
-                <a:off x="9186921" y="3079318"/>
-                <a:ext cx="216000" cy="216000"/>
-              </a:xfrm>
-              <a:prstGeom prst="rect">
-                <a:avLst/>
-              </a:prstGeom>
-              <a:solidFill>
-                <a:srgbClr val="A83EA3"/>
-              </a:solidFill>
-              <a:ln w="28575">
-                <a:solidFill>
-                  <a:srgbClr val="A83EA3"/>
-                </a:solidFill>
-              </a:ln>
-            </p:spPr>
-            <p:style>
-              <a:lnRef idx="2">
-                <a:schemeClr val="accent1">
-                  <a:shade val="50000"/>
-                </a:schemeClr>
-              </a:lnRef>
-              <a:fillRef idx="1">
-                <a:schemeClr val="accent1"/>
-              </a:fillRef>
-              <a:effectRef idx="0">
-                <a:schemeClr val="accent1"/>
-              </a:effectRef>
-              <a:fontRef idx="minor">
-                <a:schemeClr val="lt1"/>
-              </a:fontRef>
-            </p:style>
-            <p:txBody>
-              <a:bodyPr rtlCol="0" anchor="ctr"/>
-              <a:lstStyle/>
-              <a:p>
-                <a:pPr algn="ctr"/>
-                <a:endParaRPr lang="zh-CN" altLang="en-US" dirty="0"/>
-              </a:p>
-            </p:txBody>
-          </p:sp>
-          <p:sp>
-            <p:nvSpPr>
-              <p:cNvPr id="91" name="矩形 90"/>
-              <p:cNvSpPr/>
-              <p:nvPr/>
-            </p:nvSpPr>
-            <p:spPr>
-              <a:xfrm>
-                <a:off x="9565018" y="3079318"/>
-                <a:ext cx="216000" cy="216000"/>
-              </a:xfrm>
-              <a:prstGeom prst="rect">
-                <a:avLst/>
-              </a:prstGeom>
-              <a:solidFill>
-                <a:srgbClr val="A83EA3"/>
-              </a:solidFill>
-              <a:ln w="28575">
-                <a:solidFill>
-                  <a:srgbClr val="A83EA3"/>
-                </a:solidFill>
-              </a:ln>
-            </p:spPr>
-            <p:style>
-              <a:lnRef idx="2">
-                <a:schemeClr val="accent1">
-                  <a:shade val="50000"/>
-                </a:schemeClr>
-              </a:lnRef>
-              <a:fillRef idx="1">
-                <a:schemeClr val="accent1"/>
-              </a:fillRef>
-              <a:effectRef idx="0">
-                <a:schemeClr val="accent1"/>
-              </a:effectRef>
-              <a:fontRef idx="minor">
-                <a:schemeClr val="lt1"/>
-              </a:fontRef>
-            </p:style>
-            <p:txBody>
-              <a:bodyPr rtlCol="0" anchor="ctr"/>
-              <a:lstStyle/>
-              <a:p>
-                <a:pPr algn="ctr"/>
-                <a:endParaRPr lang="zh-CN" altLang="en-US" dirty="0"/>
-              </a:p>
-            </p:txBody>
-          </p:sp>
-          <p:sp>
-            <p:nvSpPr>
-              <p:cNvPr id="92" name="矩形 91"/>
-              <p:cNvSpPr/>
-              <p:nvPr/>
-            </p:nvSpPr>
-            <p:spPr>
-              <a:xfrm>
-                <a:off x="9943115" y="3079318"/>
-                <a:ext cx="216000" cy="216000"/>
-              </a:xfrm>
-              <a:prstGeom prst="rect">
-                <a:avLst/>
-              </a:prstGeom>
-              <a:solidFill>
-                <a:srgbClr val="A83EA3"/>
-              </a:solidFill>
-              <a:ln w="28575">
-                <a:solidFill>
-                  <a:srgbClr val="A83EA3"/>
-                </a:solidFill>
-              </a:ln>
-            </p:spPr>
-            <p:style>
-              <a:lnRef idx="2">
-                <a:schemeClr val="accent1">
-                  <a:shade val="50000"/>
-                </a:schemeClr>
-              </a:lnRef>
-              <a:fillRef idx="1">
-                <a:schemeClr val="accent1"/>
-              </a:fillRef>
-              <a:effectRef idx="0">
-                <a:schemeClr val="accent1"/>
-              </a:effectRef>
-              <a:fontRef idx="minor">
-                <a:schemeClr val="lt1"/>
-              </a:fontRef>
-            </p:style>
-            <p:txBody>
-              <a:bodyPr rtlCol="0" anchor="ctr"/>
-              <a:lstStyle/>
-              <a:p>
-                <a:pPr algn="ctr"/>
-                <a:endParaRPr lang="zh-CN" altLang="en-US" dirty="0"/>
-              </a:p>
-            </p:txBody>
-          </p:sp>
-          <p:sp>
-            <p:nvSpPr>
-              <p:cNvPr id="93" name="矩形 92"/>
-              <p:cNvSpPr/>
-              <p:nvPr/>
-            </p:nvSpPr>
-            <p:spPr>
-              <a:xfrm>
-                <a:off x="10321213" y="3079318"/>
-                <a:ext cx="216000" cy="216000"/>
-              </a:xfrm>
-              <a:prstGeom prst="rect">
-                <a:avLst/>
-              </a:prstGeom>
-              <a:solidFill>
-                <a:srgbClr val="A83EA3"/>
-              </a:solidFill>
-              <a:ln w="28575">
-                <a:solidFill>
-                  <a:srgbClr val="A83EA3"/>
-                </a:solidFill>
-              </a:ln>
-            </p:spPr>
-            <p:style>
-              <a:lnRef idx="2">
-                <a:schemeClr val="accent1">
-                  <a:shade val="50000"/>
-                </a:schemeClr>
-              </a:lnRef>
-              <a:fillRef idx="1">
-                <a:schemeClr val="accent1"/>
-              </a:fillRef>
-              <a:effectRef idx="0">
-                <a:schemeClr val="accent1"/>
-              </a:effectRef>
-              <a:fontRef idx="minor">
-                <a:schemeClr val="lt1"/>
-              </a:fontRef>
-            </p:style>
-            <p:txBody>
-              <a:bodyPr rtlCol="0" anchor="ctr"/>
-              <a:lstStyle/>
-              <a:p>
-                <a:pPr algn="ctr"/>
-                <a:endParaRPr lang="zh-CN" altLang="en-US" dirty="0"/>
-              </a:p>
-            </p:txBody>
-          </p:sp>
-        </p:grpSp>
+            </a:ln>
+          </p:spPr>
+          <p:style>
+            <a:lnRef idx="2">
+              <a:schemeClr val="accent1">
+                <a:shade val="50000"/>
+              </a:schemeClr>
+            </a:lnRef>
+            <a:fillRef idx="1">
+              <a:schemeClr val="accent1"/>
+            </a:fillRef>
+            <a:effectRef idx="0">
+              <a:schemeClr val="accent1"/>
+            </a:effectRef>
+            <a:fontRef idx="minor">
+              <a:schemeClr val="lt1"/>
+            </a:fontRef>
+          </p:style>
+          <p:txBody>
+            <a:bodyPr rtlCol="0" anchor="ctr"/>
+            <a:lstStyle/>
+            <a:p>
+              <a:pPr algn="ctr"/>
+              <a:endParaRPr lang="zh-CN" altLang="en-US"/>
+            </a:p>
+          </p:txBody>
+        </p:sp>
       </p:grpSp>
     </p:spTree>
     <p:extLst>
@@ -5897,7 +5894,7 @@
       </p:cxnSp>
       <p:grpSp>
         <p:nvGrpSpPr>
-          <p:cNvPr id="97" name="组合 96"/>
+          <p:cNvPr id="50" name="组合 49"/>
           <p:cNvGrpSpPr/>
           <p:nvPr/>
         </p:nvGrpSpPr>
@@ -5905,34 +5902,34 @@
           <a:xfrm>
             <a:off x="7674532" y="3052814"/>
             <a:ext cx="2879994" cy="2808740"/>
-            <a:chOff x="7674532" y="3079318"/>
+            <a:chOff x="7674532" y="3052814"/>
             <a:chExt cx="2879994" cy="2808740"/>
           </a:xfrm>
         </p:grpSpPr>
         <p:grpSp>
           <p:nvGrpSpPr>
-            <p:cNvPr id="94" name="组合 93"/>
+            <p:cNvPr id="51" name="组合 50"/>
             <p:cNvGrpSpPr/>
             <p:nvPr/>
           </p:nvGrpSpPr>
           <p:grpSpPr>
             <a:xfrm>
-              <a:off x="7674532" y="3558363"/>
-              <a:ext cx="2879994" cy="1893749"/>
-              <a:chOff x="7674531" y="3800950"/>
-              <a:chExt cx="2879994" cy="1323432"/>
+              <a:off x="7674532" y="3052814"/>
+              <a:ext cx="2879994" cy="2808740"/>
+              <a:chOff x="7674532" y="3079318"/>
+              <a:chExt cx="2879994" cy="2808740"/>
             </a:xfrm>
           </p:grpSpPr>
           <p:sp>
             <p:nvSpPr>
-              <p:cNvPr id="33" name="矩形 32"/>
+              <p:cNvPr id="57" name="矩形 56"/>
               <p:cNvSpPr/>
               <p:nvPr/>
             </p:nvSpPr>
             <p:spPr>
-              <a:xfrm rot="10800000">
-                <a:off x="7674531" y="3800950"/>
-                <a:ext cx="2879994" cy="175050"/>
+              <a:xfrm>
+                <a:off x="7674532" y="5006610"/>
+                <a:ext cx="2879994" cy="445501"/>
               </a:xfrm>
               <a:prstGeom prst="rect">
                 <a:avLst/>
@@ -5969,943 +5966,940 @@
               </a:p>
             </p:txBody>
           </p:sp>
-          <p:sp>
-            <p:nvSpPr>
-              <p:cNvPr id="34" name="矩形 33"/>
-              <p:cNvSpPr/>
+          <p:grpSp>
+            <p:nvGrpSpPr>
+              <p:cNvPr id="58" name="组合 57"/>
+              <p:cNvGrpSpPr/>
               <p:nvPr/>
-            </p:nvSpPr>
-            <p:spPr>
-              <a:xfrm rot="10800000">
-                <a:off x="7674531" y="4194503"/>
-                <a:ext cx="2879994" cy="151402"/>
+            </p:nvGrpSpPr>
+            <p:grpSpPr>
+              <a:xfrm>
+                <a:off x="7674532" y="5672058"/>
+                <a:ext cx="2862681" cy="216000"/>
+                <a:chOff x="7687402" y="5621065"/>
+                <a:chExt cx="2862681" cy="216000"/>
               </a:xfrm>
-              <a:prstGeom prst="rect">
-                <a:avLst/>
-              </a:prstGeom>
-              <a:noFill/>
-              <a:ln w="28575">
+            </p:grpSpPr>
+            <p:sp>
+              <p:nvSpPr>
+                <p:cNvPr id="69" name="矩形 68"/>
+                <p:cNvSpPr/>
+                <p:nvPr/>
+              </p:nvSpPr>
+              <p:spPr>
+                <a:xfrm>
+                  <a:off x="7687402" y="5621065"/>
+                  <a:ext cx="216000" cy="216000"/>
+                </a:xfrm>
+                <a:prstGeom prst="rect">
+                  <a:avLst/>
+                </a:prstGeom>
                 <a:solidFill>
                   <a:srgbClr val="A83EA3"/>
                 </a:solidFill>
-              </a:ln>
-            </p:spPr>
-            <p:style>
-              <a:lnRef idx="2">
-                <a:schemeClr val="accent1">
-                  <a:shade val="50000"/>
-                </a:schemeClr>
-              </a:lnRef>
-              <a:fillRef idx="1">
-                <a:schemeClr val="accent1"/>
-              </a:fillRef>
-              <a:effectRef idx="0">
-                <a:schemeClr val="accent1"/>
-              </a:effectRef>
-              <a:fontRef idx="minor">
-                <a:schemeClr val="lt1"/>
-              </a:fontRef>
-            </p:style>
-            <p:txBody>
-              <a:bodyPr rtlCol="0" anchor="ctr"/>
-              <a:lstStyle/>
-              <a:p>
-                <a:pPr algn="ctr"/>
-                <a:endParaRPr lang="zh-CN" altLang="en-US"/>
-              </a:p>
-            </p:txBody>
-          </p:sp>
-          <p:sp>
-            <p:nvSpPr>
-              <p:cNvPr id="29" name="矩形 28"/>
-              <p:cNvSpPr/>
+                <a:ln w="28575">
+                  <a:solidFill>
+                    <a:srgbClr val="A83EA3"/>
+                  </a:solidFill>
+                </a:ln>
+              </p:spPr>
+              <p:style>
+                <a:lnRef idx="2">
+                  <a:schemeClr val="accent1">
+                    <a:shade val="50000"/>
+                  </a:schemeClr>
+                </a:lnRef>
+                <a:fillRef idx="1">
+                  <a:schemeClr val="accent1"/>
+                </a:fillRef>
+                <a:effectRef idx="0">
+                  <a:schemeClr val="accent1"/>
+                </a:effectRef>
+                <a:fontRef idx="minor">
+                  <a:schemeClr val="lt1"/>
+                </a:fontRef>
+              </p:style>
+              <p:txBody>
+                <a:bodyPr rtlCol="0" anchor="ctr"/>
+                <a:lstStyle/>
+                <a:p>
+                  <a:pPr algn="ctr"/>
+                  <a:endParaRPr lang="zh-CN" altLang="en-US" dirty="0"/>
+                </a:p>
+              </p:txBody>
+            </p:sp>
+            <p:sp>
+              <p:nvSpPr>
+                <p:cNvPr id="70" name="矩形 69"/>
+                <p:cNvSpPr/>
+                <p:nvPr/>
+              </p:nvSpPr>
+              <p:spPr>
+                <a:xfrm>
+                  <a:off x="8065499" y="5621065"/>
+                  <a:ext cx="216000" cy="216000"/>
+                </a:xfrm>
+                <a:prstGeom prst="rect">
+                  <a:avLst/>
+                </a:prstGeom>
+                <a:solidFill>
+                  <a:srgbClr val="A83EA3"/>
+                </a:solidFill>
+                <a:ln w="28575">
+                  <a:solidFill>
+                    <a:srgbClr val="A83EA3"/>
+                  </a:solidFill>
+                </a:ln>
+              </p:spPr>
+              <p:style>
+                <a:lnRef idx="2">
+                  <a:schemeClr val="accent1">
+                    <a:shade val="50000"/>
+                  </a:schemeClr>
+                </a:lnRef>
+                <a:fillRef idx="1">
+                  <a:schemeClr val="accent1"/>
+                </a:fillRef>
+                <a:effectRef idx="0">
+                  <a:schemeClr val="accent1"/>
+                </a:effectRef>
+                <a:fontRef idx="minor">
+                  <a:schemeClr val="lt1"/>
+                </a:fontRef>
+              </p:style>
+              <p:txBody>
+                <a:bodyPr rtlCol="0" anchor="ctr"/>
+                <a:lstStyle/>
+                <a:p>
+                  <a:pPr algn="ctr"/>
+                  <a:endParaRPr lang="zh-CN" altLang="en-US" dirty="0"/>
+                </a:p>
+              </p:txBody>
+            </p:sp>
+            <p:sp>
+              <p:nvSpPr>
+                <p:cNvPr id="71" name="矩形 70"/>
+                <p:cNvSpPr/>
+                <p:nvPr/>
+              </p:nvSpPr>
+              <p:spPr>
+                <a:xfrm>
+                  <a:off x="8443596" y="5621065"/>
+                  <a:ext cx="216000" cy="216000"/>
+                </a:xfrm>
+                <a:prstGeom prst="rect">
+                  <a:avLst/>
+                </a:prstGeom>
+                <a:solidFill>
+                  <a:srgbClr val="A83EA3"/>
+                </a:solidFill>
+                <a:ln w="28575">
+                  <a:solidFill>
+                    <a:srgbClr val="A83EA3"/>
+                  </a:solidFill>
+                </a:ln>
+              </p:spPr>
+              <p:style>
+                <a:lnRef idx="2">
+                  <a:schemeClr val="accent1">
+                    <a:shade val="50000"/>
+                  </a:schemeClr>
+                </a:lnRef>
+                <a:fillRef idx="1">
+                  <a:schemeClr val="accent1"/>
+                </a:fillRef>
+                <a:effectRef idx="0">
+                  <a:schemeClr val="accent1"/>
+                </a:effectRef>
+                <a:fontRef idx="minor">
+                  <a:schemeClr val="lt1"/>
+                </a:fontRef>
+              </p:style>
+              <p:txBody>
+                <a:bodyPr rtlCol="0" anchor="ctr"/>
+                <a:lstStyle/>
+                <a:p>
+                  <a:pPr algn="ctr"/>
+                  <a:endParaRPr lang="zh-CN" altLang="en-US" dirty="0"/>
+                </a:p>
+              </p:txBody>
+            </p:sp>
+            <p:sp>
+              <p:nvSpPr>
+                <p:cNvPr id="72" name="矩形 71"/>
+                <p:cNvSpPr/>
+                <p:nvPr/>
+              </p:nvSpPr>
+              <p:spPr>
+                <a:xfrm>
+                  <a:off x="8821694" y="5621065"/>
+                  <a:ext cx="216000" cy="216000"/>
+                </a:xfrm>
+                <a:prstGeom prst="rect">
+                  <a:avLst/>
+                </a:prstGeom>
+                <a:solidFill>
+                  <a:srgbClr val="A83EA3"/>
+                </a:solidFill>
+                <a:ln w="28575">
+                  <a:solidFill>
+                    <a:srgbClr val="A83EA3"/>
+                  </a:solidFill>
+                </a:ln>
+              </p:spPr>
+              <p:style>
+                <a:lnRef idx="2">
+                  <a:schemeClr val="accent1">
+                    <a:shade val="50000"/>
+                  </a:schemeClr>
+                </a:lnRef>
+                <a:fillRef idx="1">
+                  <a:schemeClr val="accent1"/>
+                </a:fillRef>
+                <a:effectRef idx="0">
+                  <a:schemeClr val="accent1"/>
+                </a:effectRef>
+                <a:fontRef idx="minor">
+                  <a:schemeClr val="lt1"/>
+                </a:fontRef>
+              </p:style>
+              <p:txBody>
+                <a:bodyPr rtlCol="0" anchor="ctr"/>
+                <a:lstStyle/>
+                <a:p>
+                  <a:pPr algn="ctr"/>
+                  <a:endParaRPr lang="zh-CN" altLang="en-US" dirty="0"/>
+                </a:p>
+              </p:txBody>
+            </p:sp>
+            <p:sp>
+              <p:nvSpPr>
+                <p:cNvPr id="73" name="矩形 72"/>
+                <p:cNvSpPr/>
+                <p:nvPr/>
+              </p:nvSpPr>
+              <p:spPr>
+                <a:xfrm>
+                  <a:off x="9199791" y="5621065"/>
+                  <a:ext cx="216000" cy="216000"/>
+                </a:xfrm>
+                <a:prstGeom prst="rect">
+                  <a:avLst/>
+                </a:prstGeom>
+                <a:solidFill>
+                  <a:srgbClr val="A83EA3"/>
+                </a:solidFill>
+                <a:ln w="28575">
+                  <a:solidFill>
+                    <a:srgbClr val="A83EA3"/>
+                  </a:solidFill>
+                </a:ln>
+              </p:spPr>
+              <p:style>
+                <a:lnRef idx="2">
+                  <a:schemeClr val="accent1">
+                    <a:shade val="50000"/>
+                  </a:schemeClr>
+                </a:lnRef>
+                <a:fillRef idx="1">
+                  <a:schemeClr val="accent1"/>
+                </a:fillRef>
+                <a:effectRef idx="0">
+                  <a:schemeClr val="accent1"/>
+                </a:effectRef>
+                <a:fontRef idx="minor">
+                  <a:schemeClr val="lt1"/>
+                </a:fontRef>
+              </p:style>
+              <p:txBody>
+                <a:bodyPr rtlCol="0" anchor="ctr"/>
+                <a:lstStyle/>
+                <a:p>
+                  <a:pPr algn="ctr"/>
+                  <a:endParaRPr lang="zh-CN" altLang="en-US" dirty="0"/>
+                </a:p>
+              </p:txBody>
+            </p:sp>
+            <p:sp>
+              <p:nvSpPr>
+                <p:cNvPr id="82" name="矩形 81"/>
+                <p:cNvSpPr/>
+                <p:nvPr/>
+              </p:nvSpPr>
+              <p:spPr>
+                <a:xfrm>
+                  <a:off x="9577888" y="5621065"/>
+                  <a:ext cx="216000" cy="216000"/>
+                </a:xfrm>
+                <a:prstGeom prst="rect">
+                  <a:avLst/>
+                </a:prstGeom>
+                <a:solidFill>
+                  <a:srgbClr val="A83EA3"/>
+                </a:solidFill>
+                <a:ln w="28575">
+                  <a:solidFill>
+                    <a:srgbClr val="A83EA3"/>
+                  </a:solidFill>
+                </a:ln>
+              </p:spPr>
+              <p:style>
+                <a:lnRef idx="2">
+                  <a:schemeClr val="accent1">
+                    <a:shade val="50000"/>
+                  </a:schemeClr>
+                </a:lnRef>
+                <a:fillRef idx="1">
+                  <a:schemeClr val="accent1"/>
+                </a:fillRef>
+                <a:effectRef idx="0">
+                  <a:schemeClr val="accent1"/>
+                </a:effectRef>
+                <a:fontRef idx="minor">
+                  <a:schemeClr val="lt1"/>
+                </a:fontRef>
+              </p:style>
+              <p:txBody>
+                <a:bodyPr rtlCol="0" anchor="ctr"/>
+                <a:lstStyle/>
+                <a:p>
+                  <a:pPr algn="ctr"/>
+                  <a:endParaRPr lang="zh-CN" altLang="en-US" dirty="0"/>
+                </a:p>
+              </p:txBody>
+            </p:sp>
+            <p:sp>
+              <p:nvSpPr>
+                <p:cNvPr id="83" name="矩形 82"/>
+                <p:cNvSpPr/>
+                <p:nvPr/>
+              </p:nvSpPr>
+              <p:spPr>
+                <a:xfrm>
+                  <a:off x="9955985" y="5621065"/>
+                  <a:ext cx="216000" cy="216000"/>
+                </a:xfrm>
+                <a:prstGeom prst="rect">
+                  <a:avLst/>
+                </a:prstGeom>
+                <a:solidFill>
+                  <a:srgbClr val="A83EA3"/>
+                </a:solidFill>
+                <a:ln w="28575">
+                  <a:solidFill>
+                    <a:srgbClr val="A83EA3"/>
+                  </a:solidFill>
+                </a:ln>
+              </p:spPr>
+              <p:style>
+                <a:lnRef idx="2">
+                  <a:schemeClr val="accent1">
+                    <a:shade val="50000"/>
+                  </a:schemeClr>
+                </a:lnRef>
+                <a:fillRef idx="1">
+                  <a:schemeClr val="accent1"/>
+                </a:fillRef>
+                <a:effectRef idx="0">
+                  <a:schemeClr val="accent1"/>
+                </a:effectRef>
+                <a:fontRef idx="minor">
+                  <a:schemeClr val="lt1"/>
+                </a:fontRef>
+              </p:style>
+              <p:txBody>
+                <a:bodyPr rtlCol="0" anchor="ctr"/>
+                <a:lstStyle/>
+                <a:p>
+                  <a:pPr algn="ctr"/>
+                  <a:endParaRPr lang="zh-CN" altLang="en-US" dirty="0"/>
+                </a:p>
+              </p:txBody>
+            </p:sp>
+            <p:sp>
+              <p:nvSpPr>
+                <p:cNvPr id="84" name="矩形 83"/>
+                <p:cNvSpPr/>
+                <p:nvPr/>
+              </p:nvSpPr>
+              <p:spPr>
+                <a:xfrm>
+                  <a:off x="10334083" y="5621065"/>
+                  <a:ext cx="216000" cy="216000"/>
+                </a:xfrm>
+                <a:prstGeom prst="rect">
+                  <a:avLst/>
+                </a:prstGeom>
+                <a:solidFill>
+                  <a:srgbClr val="A83EA3"/>
+                </a:solidFill>
+                <a:ln w="28575">
+                  <a:solidFill>
+                    <a:srgbClr val="A83EA3"/>
+                  </a:solidFill>
+                </a:ln>
+              </p:spPr>
+              <p:style>
+                <a:lnRef idx="2">
+                  <a:schemeClr val="accent1">
+                    <a:shade val="50000"/>
+                  </a:schemeClr>
+                </a:lnRef>
+                <a:fillRef idx="1">
+                  <a:schemeClr val="accent1"/>
+                </a:fillRef>
+                <a:effectRef idx="0">
+                  <a:schemeClr val="accent1"/>
+                </a:effectRef>
+                <a:fontRef idx="minor">
+                  <a:schemeClr val="lt1"/>
+                </a:fontRef>
+              </p:style>
+              <p:txBody>
+                <a:bodyPr rtlCol="0" anchor="ctr"/>
+                <a:lstStyle/>
+                <a:p>
+                  <a:pPr algn="ctr"/>
+                  <a:endParaRPr lang="zh-CN" altLang="en-US" dirty="0"/>
+                </a:p>
+              </p:txBody>
+            </p:sp>
+          </p:grpSp>
+          <p:grpSp>
+            <p:nvGrpSpPr>
+              <p:cNvPr id="59" name="组合 58"/>
+              <p:cNvGrpSpPr/>
               <p:nvPr/>
-            </p:nvSpPr>
-            <p:spPr>
+            </p:nvGrpSpPr>
+            <p:grpSpPr>
               <a:xfrm>
-                <a:off x="7674531" y="4949332"/>
-                <a:ext cx="2879994" cy="175050"/>
+                <a:off x="7674532" y="3079318"/>
+                <a:ext cx="2862681" cy="216000"/>
+                <a:chOff x="7674532" y="3079318"/>
+                <a:chExt cx="2862681" cy="216000"/>
               </a:xfrm>
-              <a:prstGeom prst="rect">
-                <a:avLst/>
-              </a:prstGeom>
-              <a:noFill/>
-              <a:ln w="28575">
+            </p:grpSpPr>
+            <p:sp>
+              <p:nvSpPr>
+                <p:cNvPr id="60" name="矩形 59"/>
+                <p:cNvSpPr/>
+                <p:nvPr/>
+              </p:nvSpPr>
+              <p:spPr>
+                <a:xfrm>
+                  <a:off x="7674532" y="3079318"/>
+                  <a:ext cx="216000" cy="216000"/>
+                </a:xfrm>
+                <a:prstGeom prst="rect">
+                  <a:avLst/>
+                </a:prstGeom>
                 <a:solidFill>
                   <a:srgbClr val="A83EA3"/>
                 </a:solidFill>
-              </a:ln>
-            </p:spPr>
-            <p:style>
-              <a:lnRef idx="2">
-                <a:schemeClr val="accent1">
-                  <a:shade val="50000"/>
-                </a:schemeClr>
-              </a:lnRef>
-              <a:fillRef idx="1">
-                <a:schemeClr val="accent1"/>
-              </a:fillRef>
-              <a:effectRef idx="0">
-                <a:schemeClr val="accent1"/>
-              </a:effectRef>
-              <a:fontRef idx="minor">
-                <a:schemeClr val="lt1"/>
-              </a:fontRef>
-            </p:style>
-            <p:txBody>
-              <a:bodyPr rtlCol="0" anchor="ctr"/>
-              <a:lstStyle/>
-              <a:p>
-                <a:pPr algn="ctr"/>
-                <a:endParaRPr lang="zh-CN" altLang="en-US"/>
-              </a:p>
-            </p:txBody>
-          </p:sp>
-          <p:sp>
-            <p:nvSpPr>
-              <p:cNvPr id="30" name="矩形 29"/>
-              <p:cNvSpPr/>
-              <p:nvPr/>
-            </p:nvSpPr>
-            <p:spPr>
-              <a:xfrm>
-                <a:off x="7674531" y="4565187"/>
-                <a:ext cx="2879994" cy="164857"/>
-              </a:xfrm>
-              <a:prstGeom prst="rect">
-                <a:avLst/>
-              </a:prstGeom>
-              <a:noFill/>
-              <a:ln w="28575">
+                <a:ln w="28575">
+                  <a:solidFill>
+                    <a:srgbClr val="A83EA3"/>
+                  </a:solidFill>
+                </a:ln>
+              </p:spPr>
+              <p:style>
+                <a:lnRef idx="2">
+                  <a:schemeClr val="accent1">
+                    <a:shade val="50000"/>
+                  </a:schemeClr>
+                </a:lnRef>
+                <a:fillRef idx="1">
+                  <a:schemeClr val="accent1"/>
+                </a:fillRef>
+                <a:effectRef idx="0">
+                  <a:schemeClr val="accent1"/>
+                </a:effectRef>
+                <a:fontRef idx="minor">
+                  <a:schemeClr val="lt1"/>
+                </a:fontRef>
+              </p:style>
+              <p:txBody>
+                <a:bodyPr rtlCol="0" anchor="ctr"/>
+                <a:lstStyle/>
+                <a:p>
+                  <a:pPr algn="ctr"/>
+                  <a:endParaRPr lang="zh-CN" altLang="en-US" dirty="0"/>
+                </a:p>
+              </p:txBody>
+            </p:sp>
+            <p:sp>
+              <p:nvSpPr>
+                <p:cNvPr id="61" name="矩形 60"/>
+                <p:cNvSpPr/>
+                <p:nvPr/>
+              </p:nvSpPr>
+              <p:spPr>
+                <a:xfrm>
+                  <a:off x="8052629" y="3079318"/>
+                  <a:ext cx="216000" cy="216000"/>
+                </a:xfrm>
+                <a:prstGeom prst="rect">
+                  <a:avLst/>
+                </a:prstGeom>
                 <a:solidFill>
                   <a:srgbClr val="A83EA3"/>
                 </a:solidFill>
-              </a:ln>
-            </p:spPr>
-            <p:style>
-              <a:lnRef idx="2">
-                <a:schemeClr val="accent1">
-                  <a:shade val="50000"/>
-                </a:schemeClr>
-              </a:lnRef>
-              <a:fillRef idx="1">
-                <a:schemeClr val="accent1"/>
-              </a:fillRef>
-              <a:effectRef idx="0">
-                <a:schemeClr val="accent1"/>
-              </a:effectRef>
-              <a:fontRef idx="minor">
-                <a:schemeClr val="lt1"/>
-              </a:fontRef>
-            </p:style>
-            <p:txBody>
-              <a:bodyPr rtlCol="0" anchor="ctr"/>
-              <a:lstStyle/>
-              <a:p>
-                <a:pPr algn="ctr"/>
-                <a:endParaRPr lang="zh-CN" altLang="en-US"/>
-              </a:p>
-            </p:txBody>
-          </p:sp>
+                <a:ln w="28575">
+                  <a:solidFill>
+                    <a:srgbClr val="A83EA3"/>
+                  </a:solidFill>
+                </a:ln>
+              </p:spPr>
+              <p:style>
+                <a:lnRef idx="2">
+                  <a:schemeClr val="accent1">
+                    <a:shade val="50000"/>
+                  </a:schemeClr>
+                </a:lnRef>
+                <a:fillRef idx="1">
+                  <a:schemeClr val="accent1"/>
+                </a:fillRef>
+                <a:effectRef idx="0">
+                  <a:schemeClr val="accent1"/>
+                </a:effectRef>
+                <a:fontRef idx="minor">
+                  <a:schemeClr val="lt1"/>
+                </a:fontRef>
+              </p:style>
+              <p:txBody>
+                <a:bodyPr rtlCol="0" anchor="ctr"/>
+                <a:lstStyle/>
+                <a:p>
+                  <a:pPr algn="ctr"/>
+                  <a:endParaRPr lang="zh-CN" altLang="en-US" dirty="0"/>
+                </a:p>
+              </p:txBody>
+            </p:sp>
+            <p:sp>
+              <p:nvSpPr>
+                <p:cNvPr id="62" name="矩形 61"/>
+                <p:cNvSpPr/>
+                <p:nvPr/>
+              </p:nvSpPr>
+              <p:spPr>
+                <a:xfrm>
+                  <a:off x="8430726" y="3079318"/>
+                  <a:ext cx="216000" cy="216000"/>
+                </a:xfrm>
+                <a:prstGeom prst="rect">
+                  <a:avLst/>
+                </a:prstGeom>
+                <a:solidFill>
+                  <a:srgbClr val="A83EA3"/>
+                </a:solidFill>
+                <a:ln w="28575">
+                  <a:solidFill>
+                    <a:srgbClr val="A83EA3"/>
+                  </a:solidFill>
+                </a:ln>
+              </p:spPr>
+              <p:style>
+                <a:lnRef idx="2">
+                  <a:schemeClr val="accent1">
+                    <a:shade val="50000"/>
+                  </a:schemeClr>
+                </a:lnRef>
+                <a:fillRef idx="1">
+                  <a:schemeClr val="accent1"/>
+                </a:fillRef>
+                <a:effectRef idx="0">
+                  <a:schemeClr val="accent1"/>
+                </a:effectRef>
+                <a:fontRef idx="minor">
+                  <a:schemeClr val="lt1"/>
+                </a:fontRef>
+              </p:style>
+              <p:txBody>
+                <a:bodyPr rtlCol="0" anchor="ctr"/>
+                <a:lstStyle/>
+                <a:p>
+                  <a:pPr algn="ctr"/>
+                  <a:endParaRPr lang="zh-CN" altLang="en-US" dirty="0"/>
+                </a:p>
+              </p:txBody>
+            </p:sp>
+            <p:sp>
+              <p:nvSpPr>
+                <p:cNvPr id="63" name="矩形 62"/>
+                <p:cNvSpPr/>
+                <p:nvPr/>
+              </p:nvSpPr>
+              <p:spPr>
+                <a:xfrm>
+                  <a:off x="8808824" y="3079318"/>
+                  <a:ext cx="216000" cy="216000"/>
+                </a:xfrm>
+                <a:prstGeom prst="rect">
+                  <a:avLst/>
+                </a:prstGeom>
+                <a:solidFill>
+                  <a:srgbClr val="A83EA3"/>
+                </a:solidFill>
+                <a:ln w="28575">
+                  <a:solidFill>
+                    <a:srgbClr val="A83EA3"/>
+                  </a:solidFill>
+                </a:ln>
+              </p:spPr>
+              <p:style>
+                <a:lnRef idx="2">
+                  <a:schemeClr val="accent1">
+                    <a:shade val="50000"/>
+                  </a:schemeClr>
+                </a:lnRef>
+                <a:fillRef idx="1">
+                  <a:schemeClr val="accent1"/>
+                </a:fillRef>
+                <a:effectRef idx="0">
+                  <a:schemeClr val="accent1"/>
+                </a:effectRef>
+                <a:fontRef idx="minor">
+                  <a:schemeClr val="lt1"/>
+                </a:fontRef>
+              </p:style>
+              <p:txBody>
+                <a:bodyPr rtlCol="0" anchor="ctr"/>
+                <a:lstStyle/>
+                <a:p>
+                  <a:pPr algn="ctr"/>
+                  <a:endParaRPr lang="zh-CN" altLang="en-US" dirty="0"/>
+                </a:p>
+              </p:txBody>
+            </p:sp>
+            <p:sp>
+              <p:nvSpPr>
+                <p:cNvPr id="64" name="矩形 63"/>
+                <p:cNvSpPr/>
+                <p:nvPr/>
+              </p:nvSpPr>
+              <p:spPr>
+                <a:xfrm>
+                  <a:off x="9186921" y="3079318"/>
+                  <a:ext cx="216000" cy="216000"/>
+                </a:xfrm>
+                <a:prstGeom prst="rect">
+                  <a:avLst/>
+                </a:prstGeom>
+                <a:solidFill>
+                  <a:srgbClr val="A83EA3"/>
+                </a:solidFill>
+                <a:ln w="28575">
+                  <a:solidFill>
+                    <a:srgbClr val="A83EA3"/>
+                  </a:solidFill>
+                </a:ln>
+              </p:spPr>
+              <p:style>
+                <a:lnRef idx="2">
+                  <a:schemeClr val="accent1">
+                    <a:shade val="50000"/>
+                  </a:schemeClr>
+                </a:lnRef>
+                <a:fillRef idx="1">
+                  <a:schemeClr val="accent1"/>
+                </a:fillRef>
+                <a:effectRef idx="0">
+                  <a:schemeClr val="accent1"/>
+                </a:effectRef>
+                <a:fontRef idx="minor">
+                  <a:schemeClr val="lt1"/>
+                </a:fontRef>
+              </p:style>
+              <p:txBody>
+                <a:bodyPr rtlCol="0" anchor="ctr"/>
+                <a:lstStyle/>
+                <a:p>
+                  <a:pPr algn="ctr"/>
+                  <a:endParaRPr lang="zh-CN" altLang="en-US" dirty="0"/>
+                </a:p>
+              </p:txBody>
+            </p:sp>
+            <p:sp>
+              <p:nvSpPr>
+                <p:cNvPr id="66" name="矩形 65"/>
+                <p:cNvSpPr/>
+                <p:nvPr/>
+              </p:nvSpPr>
+              <p:spPr>
+                <a:xfrm>
+                  <a:off x="9565018" y="3079318"/>
+                  <a:ext cx="216000" cy="216000"/>
+                </a:xfrm>
+                <a:prstGeom prst="rect">
+                  <a:avLst/>
+                </a:prstGeom>
+                <a:solidFill>
+                  <a:srgbClr val="A83EA3"/>
+                </a:solidFill>
+                <a:ln w="28575">
+                  <a:solidFill>
+                    <a:srgbClr val="A83EA3"/>
+                  </a:solidFill>
+                </a:ln>
+              </p:spPr>
+              <p:style>
+                <a:lnRef idx="2">
+                  <a:schemeClr val="accent1">
+                    <a:shade val="50000"/>
+                  </a:schemeClr>
+                </a:lnRef>
+                <a:fillRef idx="1">
+                  <a:schemeClr val="accent1"/>
+                </a:fillRef>
+                <a:effectRef idx="0">
+                  <a:schemeClr val="accent1"/>
+                </a:effectRef>
+                <a:fontRef idx="minor">
+                  <a:schemeClr val="lt1"/>
+                </a:fontRef>
+              </p:style>
+              <p:txBody>
+                <a:bodyPr rtlCol="0" anchor="ctr"/>
+                <a:lstStyle/>
+                <a:p>
+                  <a:pPr algn="ctr"/>
+                  <a:endParaRPr lang="zh-CN" altLang="en-US" dirty="0"/>
+                </a:p>
+              </p:txBody>
+            </p:sp>
+            <p:sp>
+              <p:nvSpPr>
+                <p:cNvPr id="67" name="矩形 66"/>
+                <p:cNvSpPr/>
+                <p:nvPr/>
+              </p:nvSpPr>
+              <p:spPr>
+                <a:xfrm>
+                  <a:off x="9943115" y="3079318"/>
+                  <a:ext cx="216000" cy="216000"/>
+                </a:xfrm>
+                <a:prstGeom prst="rect">
+                  <a:avLst/>
+                </a:prstGeom>
+                <a:solidFill>
+                  <a:srgbClr val="A83EA3"/>
+                </a:solidFill>
+                <a:ln w="28575">
+                  <a:solidFill>
+                    <a:srgbClr val="A83EA3"/>
+                  </a:solidFill>
+                </a:ln>
+              </p:spPr>
+              <p:style>
+                <a:lnRef idx="2">
+                  <a:schemeClr val="accent1">
+                    <a:shade val="50000"/>
+                  </a:schemeClr>
+                </a:lnRef>
+                <a:fillRef idx="1">
+                  <a:schemeClr val="accent1"/>
+                </a:fillRef>
+                <a:effectRef idx="0">
+                  <a:schemeClr val="accent1"/>
+                </a:effectRef>
+                <a:fontRef idx="minor">
+                  <a:schemeClr val="lt1"/>
+                </a:fontRef>
+              </p:style>
+              <p:txBody>
+                <a:bodyPr rtlCol="0" anchor="ctr"/>
+                <a:lstStyle/>
+                <a:p>
+                  <a:pPr algn="ctr"/>
+                  <a:endParaRPr lang="zh-CN" altLang="en-US" dirty="0"/>
+                </a:p>
+              </p:txBody>
+            </p:sp>
+            <p:sp>
+              <p:nvSpPr>
+                <p:cNvPr id="68" name="矩形 67"/>
+                <p:cNvSpPr/>
+                <p:nvPr/>
+              </p:nvSpPr>
+              <p:spPr>
+                <a:xfrm>
+                  <a:off x="10321213" y="3079318"/>
+                  <a:ext cx="216000" cy="216000"/>
+                </a:xfrm>
+                <a:prstGeom prst="rect">
+                  <a:avLst/>
+                </a:prstGeom>
+                <a:solidFill>
+                  <a:srgbClr val="A83EA3"/>
+                </a:solidFill>
+                <a:ln w="28575">
+                  <a:solidFill>
+                    <a:srgbClr val="A83EA3"/>
+                  </a:solidFill>
+                </a:ln>
+              </p:spPr>
+              <p:style>
+                <a:lnRef idx="2">
+                  <a:schemeClr val="accent1">
+                    <a:shade val="50000"/>
+                  </a:schemeClr>
+                </a:lnRef>
+                <a:fillRef idx="1">
+                  <a:schemeClr val="accent1"/>
+                </a:fillRef>
+                <a:effectRef idx="0">
+                  <a:schemeClr val="accent1"/>
+                </a:effectRef>
+                <a:fontRef idx="minor">
+                  <a:schemeClr val="lt1"/>
+                </a:fontRef>
+              </p:style>
+              <p:txBody>
+                <a:bodyPr rtlCol="0" anchor="ctr"/>
+                <a:lstStyle/>
+                <a:p>
+                  <a:pPr algn="ctr"/>
+                  <a:endParaRPr lang="zh-CN" altLang="en-US" dirty="0"/>
+                </a:p>
+              </p:txBody>
+            </p:sp>
+          </p:grpSp>
         </p:grpSp>
-        <p:grpSp>
-          <p:nvGrpSpPr>
-            <p:cNvPr id="96" name="组合 95"/>
-            <p:cNvGrpSpPr/>
+        <p:sp>
+          <p:nvSpPr>
+            <p:cNvPr id="52" name="文本框 51"/>
+            <p:cNvSpPr txBox="1"/>
             <p:nvPr/>
-          </p:nvGrpSpPr>
-          <p:grpSpPr>
+          </p:nvSpPr>
+          <p:spPr>
+            <a:xfrm rot="5400000">
+              <a:off x="8533761" y="4143091"/>
+              <a:ext cx="1473200" cy="646331"/>
+            </a:xfrm>
+            <a:prstGeom prst="rect">
+              <a:avLst/>
+            </a:prstGeom>
+            <a:noFill/>
+          </p:spPr>
+          <p:txBody>
+            <a:bodyPr wrap="square" rtlCol="0">
+              <a:spAutoFit/>
+            </a:bodyPr>
+            <a:lstStyle/>
+            <a:p>
+              <a:pPr algn="ctr"/>
+              <a:r>
+                <a:rPr lang="en-US" altLang="zh-CN" sz="3600" b="1" dirty="0" smtClean="0">
+                  <a:solidFill>
+                    <a:srgbClr val="A83EA3"/>
+                  </a:solidFill>
+                  <a:latin typeface="Calibri" panose="020F0502020204030204" pitchFamily="34" charset="0"/>
+                  <a:ea typeface="Calibri" panose="020F0502020204030204" pitchFamily="34" charset="0"/>
+                  <a:cs typeface="Calibri" panose="020F0502020204030204" pitchFamily="34" charset="0"/>
+                </a:rPr>
+                <a:t>…… </a:t>
+              </a:r>
+              <a:endParaRPr lang="zh-CN" altLang="en-US" sz="3600" b="1" dirty="0">
+                <a:solidFill>
+                  <a:srgbClr val="A83EA3"/>
+                </a:solidFill>
+                <a:latin typeface="Calibri" panose="020F0502020204030204" pitchFamily="34" charset="0"/>
+                <a:ea typeface="Calibri" panose="020F0502020204030204" pitchFamily="34" charset="0"/>
+                <a:cs typeface="Calibri" panose="020F0502020204030204" pitchFamily="34" charset="0"/>
+              </a:endParaRPr>
+            </a:p>
+          </p:txBody>
+        </p:sp>
+        <p:sp>
+          <p:nvSpPr>
+            <p:cNvPr id="53" name="矩形 52"/>
+            <p:cNvSpPr/>
+            <p:nvPr/>
+          </p:nvSpPr>
+          <p:spPr>
             <a:xfrm>
-              <a:off x="7674532" y="5672058"/>
-              <a:ext cx="2862681" cy="216000"/>
-              <a:chOff x="7687402" y="5621065"/>
-              <a:chExt cx="2862681" cy="216000"/>
+              <a:off x="9386901" y="4087351"/>
+              <a:ext cx="718466" cy="646331"/>
             </a:xfrm>
-          </p:grpSpPr>
-          <p:sp>
-            <p:nvSpPr>
-              <p:cNvPr id="74" name="矩形 73"/>
-              <p:cNvSpPr/>
-              <p:nvPr/>
-            </p:nvSpPr>
-            <p:spPr>
-              <a:xfrm>
-                <a:off x="7687402" y="5621065"/>
-                <a:ext cx="216000" cy="216000"/>
-              </a:xfrm>
-              <a:prstGeom prst="rect">
-                <a:avLst/>
-              </a:prstGeom>
+            <a:prstGeom prst="rect">
+              <a:avLst/>
+            </a:prstGeom>
+          </p:spPr>
+          <p:txBody>
+            <a:bodyPr wrap="none">
+              <a:spAutoFit/>
+            </a:bodyPr>
+            <a:lstStyle/>
+            <a:p>
+              <a:pPr algn="ctr"/>
+              <a:r>
+                <a:rPr lang="en-US" altLang="zh-CN" sz="3600" b="1" dirty="0">
+                  <a:solidFill>
+                    <a:srgbClr val="A83EA3"/>
+                  </a:solidFill>
+                  <a:latin typeface="Calibri" panose="020F0502020204030204" pitchFamily="34" charset="0"/>
+                  <a:ea typeface="Calibri" panose="020F0502020204030204" pitchFamily="34" charset="0"/>
+                  <a:cs typeface="Calibri" panose="020F0502020204030204" pitchFamily="34" charset="0"/>
+                </a:rPr>
+                <a:t>×N</a:t>
+              </a:r>
+              <a:endParaRPr lang="zh-CN" altLang="en-US" sz="3600" b="1" dirty="0">
+                <a:solidFill>
+                  <a:srgbClr val="A83EA3"/>
+                </a:solidFill>
+                <a:latin typeface="Calibri" panose="020F0502020204030204" pitchFamily="34" charset="0"/>
+                <a:ea typeface="Calibri" panose="020F0502020204030204" pitchFamily="34" charset="0"/>
+                <a:cs typeface="Calibri" panose="020F0502020204030204" pitchFamily="34" charset="0"/>
+              </a:endParaRPr>
+            </a:p>
+          </p:txBody>
+        </p:sp>
+        <p:sp>
+          <p:nvSpPr>
+            <p:cNvPr id="55" name="矩形 54"/>
+            <p:cNvSpPr/>
+            <p:nvPr/>
+          </p:nvSpPr>
+          <p:spPr>
+            <a:xfrm>
+              <a:off x="7674532" y="3470833"/>
+              <a:ext cx="2879994" cy="445501"/>
+            </a:xfrm>
+            <a:prstGeom prst="rect">
+              <a:avLst/>
+            </a:prstGeom>
+            <a:noFill/>
+            <a:ln w="28575">
               <a:solidFill>
                 <a:srgbClr val="A83EA3"/>
               </a:solidFill>
-              <a:ln w="28575">
-                <a:solidFill>
-                  <a:srgbClr val="A83EA3"/>
-                </a:solidFill>
-              </a:ln>
-            </p:spPr>
-            <p:style>
-              <a:lnRef idx="2">
-                <a:schemeClr val="accent1">
-                  <a:shade val="50000"/>
-                </a:schemeClr>
-              </a:lnRef>
-              <a:fillRef idx="1">
-                <a:schemeClr val="accent1"/>
-              </a:fillRef>
-              <a:effectRef idx="0">
-                <a:schemeClr val="accent1"/>
-              </a:effectRef>
-              <a:fontRef idx="minor">
-                <a:schemeClr val="lt1"/>
-              </a:fontRef>
-            </p:style>
-            <p:txBody>
-              <a:bodyPr rtlCol="0" anchor="ctr"/>
-              <a:lstStyle/>
-              <a:p>
-                <a:pPr algn="ctr"/>
-                <a:endParaRPr lang="zh-CN" altLang="en-US" dirty="0"/>
-              </a:p>
-            </p:txBody>
-          </p:sp>
-          <p:sp>
-            <p:nvSpPr>
-              <p:cNvPr id="75" name="矩形 74"/>
-              <p:cNvSpPr/>
-              <p:nvPr/>
-            </p:nvSpPr>
-            <p:spPr>
-              <a:xfrm>
-                <a:off x="8065499" y="5621065"/>
-                <a:ext cx="216000" cy="216000"/>
-              </a:xfrm>
-              <a:prstGeom prst="rect">
-                <a:avLst/>
-              </a:prstGeom>
-              <a:solidFill>
-                <a:srgbClr val="A83EA3"/>
-              </a:solidFill>
-              <a:ln w="28575">
-                <a:solidFill>
-                  <a:srgbClr val="A83EA3"/>
-                </a:solidFill>
-              </a:ln>
-            </p:spPr>
-            <p:style>
-              <a:lnRef idx="2">
-                <a:schemeClr val="accent1">
-                  <a:shade val="50000"/>
-                </a:schemeClr>
-              </a:lnRef>
-              <a:fillRef idx="1">
-                <a:schemeClr val="accent1"/>
-              </a:fillRef>
-              <a:effectRef idx="0">
-                <a:schemeClr val="accent1"/>
-              </a:effectRef>
-              <a:fontRef idx="minor">
-                <a:schemeClr val="lt1"/>
-              </a:fontRef>
-            </p:style>
-            <p:txBody>
-              <a:bodyPr rtlCol="0" anchor="ctr"/>
-              <a:lstStyle/>
-              <a:p>
-                <a:pPr algn="ctr"/>
-                <a:endParaRPr lang="zh-CN" altLang="en-US" dirty="0"/>
-              </a:p>
-            </p:txBody>
-          </p:sp>
-          <p:sp>
-            <p:nvSpPr>
-              <p:cNvPr id="76" name="矩形 75"/>
-              <p:cNvSpPr/>
-              <p:nvPr/>
-            </p:nvSpPr>
-            <p:spPr>
-              <a:xfrm>
-                <a:off x="8443596" y="5621065"/>
-                <a:ext cx="216000" cy="216000"/>
-              </a:xfrm>
-              <a:prstGeom prst="rect">
-                <a:avLst/>
-              </a:prstGeom>
-              <a:solidFill>
-                <a:srgbClr val="A83EA3"/>
-              </a:solidFill>
-              <a:ln w="28575">
-                <a:solidFill>
-                  <a:srgbClr val="A83EA3"/>
-                </a:solidFill>
-              </a:ln>
-            </p:spPr>
-            <p:style>
-              <a:lnRef idx="2">
-                <a:schemeClr val="accent1">
-                  <a:shade val="50000"/>
-                </a:schemeClr>
-              </a:lnRef>
-              <a:fillRef idx="1">
-                <a:schemeClr val="accent1"/>
-              </a:fillRef>
-              <a:effectRef idx="0">
-                <a:schemeClr val="accent1"/>
-              </a:effectRef>
-              <a:fontRef idx="minor">
-                <a:schemeClr val="lt1"/>
-              </a:fontRef>
-            </p:style>
-            <p:txBody>
-              <a:bodyPr rtlCol="0" anchor="ctr"/>
-              <a:lstStyle/>
-              <a:p>
-                <a:pPr algn="ctr"/>
-                <a:endParaRPr lang="zh-CN" altLang="en-US" dirty="0"/>
-              </a:p>
-            </p:txBody>
-          </p:sp>
-          <p:sp>
-            <p:nvSpPr>
-              <p:cNvPr id="77" name="矩形 76"/>
-              <p:cNvSpPr/>
-              <p:nvPr/>
-            </p:nvSpPr>
-            <p:spPr>
-              <a:xfrm>
-                <a:off x="8821694" y="5621065"/>
-                <a:ext cx="216000" cy="216000"/>
-              </a:xfrm>
-              <a:prstGeom prst="rect">
-                <a:avLst/>
-              </a:prstGeom>
-              <a:solidFill>
-                <a:srgbClr val="A83EA3"/>
-              </a:solidFill>
-              <a:ln w="28575">
-                <a:solidFill>
-                  <a:srgbClr val="A83EA3"/>
-                </a:solidFill>
-              </a:ln>
-            </p:spPr>
-            <p:style>
-              <a:lnRef idx="2">
-                <a:schemeClr val="accent1">
-                  <a:shade val="50000"/>
-                </a:schemeClr>
-              </a:lnRef>
-              <a:fillRef idx="1">
-                <a:schemeClr val="accent1"/>
-              </a:fillRef>
-              <a:effectRef idx="0">
-                <a:schemeClr val="accent1"/>
-              </a:effectRef>
-              <a:fontRef idx="minor">
-                <a:schemeClr val="lt1"/>
-              </a:fontRef>
-            </p:style>
-            <p:txBody>
-              <a:bodyPr rtlCol="0" anchor="ctr"/>
-              <a:lstStyle/>
-              <a:p>
-                <a:pPr algn="ctr"/>
-                <a:endParaRPr lang="zh-CN" altLang="en-US" dirty="0"/>
-              </a:p>
-            </p:txBody>
-          </p:sp>
-          <p:sp>
-            <p:nvSpPr>
-              <p:cNvPr id="78" name="矩形 77"/>
-              <p:cNvSpPr/>
-              <p:nvPr/>
-            </p:nvSpPr>
-            <p:spPr>
-              <a:xfrm>
-                <a:off x="9199791" y="5621065"/>
-                <a:ext cx="216000" cy="216000"/>
-              </a:xfrm>
-              <a:prstGeom prst="rect">
-                <a:avLst/>
-              </a:prstGeom>
-              <a:solidFill>
-                <a:srgbClr val="A83EA3"/>
-              </a:solidFill>
-              <a:ln w="28575">
-                <a:solidFill>
-                  <a:srgbClr val="A83EA3"/>
-                </a:solidFill>
-              </a:ln>
-            </p:spPr>
-            <p:style>
-              <a:lnRef idx="2">
-                <a:schemeClr val="accent1">
-                  <a:shade val="50000"/>
-                </a:schemeClr>
-              </a:lnRef>
-              <a:fillRef idx="1">
-                <a:schemeClr val="accent1"/>
-              </a:fillRef>
-              <a:effectRef idx="0">
-                <a:schemeClr val="accent1"/>
-              </a:effectRef>
-              <a:fontRef idx="minor">
-                <a:schemeClr val="lt1"/>
-              </a:fontRef>
-            </p:style>
-            <p:txBody>
-              <a:bodyPr rtlCol="0" anchor="ctr"/>
-              <a:lstStyle/>
-              <a:p>
-                <a:pPr algn="ctr"/>
-                <a:endParaRPr lang="zh-CN" altLang="en-US" dirty="0"/>
-              </a:p>
-            </p:txBody>
-          </p:sp>
-          <p:sp>
-            <p:nvSpPr>
-              <p:cNvPr id="79" name="矩形 78"/>
-              <p:cNvSpPr/>
-              <p:nvPr/>
-            </p:nvSpPr>
-            <p:spPr>
-              <a:xfrm>
-                <a:off x="9577888" y="5621065"/>
-                <a:ext cx="216000" cy="216000"/>
-              </a:xfrm>
-              <a:prstGeom prst="rect">
-                <a:avLst/>
-              </a:prstGeom>
-              <a:solidFill>
-                <a:srgbClr val="A83EA3"/>
-              </a:solidFill>
-              <a:ln w="28575">
-                <a:solidFill>
-                  <a:srgbClr val="A83EA3"/>
-                </a:solidFill>
-              </a:ln>
-            </p:spPr>
-            <p:style>
-              <a:lnRef idx="2">
-                <a:schemeClr val="accent1">
-                  <a:shade val="50000"/>
-                </a:schemeClr>
-              </a:lnRef>
-              <a:fillRef idx="1">
-                <a:schemeClr val="accent1"/>
-              </a:fillRef>
-              <a:effectRef idx="0">
-                <a:schemeClr val="accent1"/>
-              </a:effectRef>
-              <a:fontRef idx="minor">
-                <a:schemeClr val="lt1"/>
-              </a:fontRef>
-            </p:style>
-            <p:txBody>
-              <a:bodyPr rtlCol="0" anchor="ctr"/>
-              <a:lstStyle/>
-              <a:p>
-                <a:pPr algn="ctr"/>
-                <a:endParaRPr lang="zh-CN" altLang="en-US" dirty="0"/>
-              </a:p>
-            </p:txBody>
-          </p:sp>
-          <p:sp>
-            <p:nvSpPr>
-              <p:cNvPr id="80" name="矩形 79"/>
-              <p:cNvSpPr/>
-              <p:nvPr/>
-            </p:nvSpPr>
-            <p:spPr>
-              <a:xfrm>
-                <a:off x="9955985" y="5621065"/>
-                <a:ext cx="216000" cy="216000"/>
-              </a:xfrm>
-              <a:prstGeom prst="rect">
-                <a:avLst/>
-              </a:prstGeom>
-              <a:solidFill>
-                <a:srgbClr val="A83EA3"/>
-              </a:solidFill>
-              <a:ln w="28575">
-                <a:solidFill>
-                  <a:srgbClr val="A83EA3"/>
-                </a:solidFill>
-              </a:ln>
-            </p:spPr>
-            <p:style>
-              <a:lnRef idx="2">
-                <a:schemeClr val="accent1">
-                  <a:shade val="50000"/>
-                </a:schemeClr>
-              </a:lnRef>
-              <a:fillRef idx="1">
-                <a:schemeClr val="accent1"/>
-              </a:fillRef>
-              <a:effectRef idx="0">
-                <a:schemeClr val="accent1"/>
-              </a:effectRef>
-              <a:fontRef idx="minor">
-                <a:schemeClr val="lt1"/>
-              </a:fontRef>
-            </p:style>
-            <p:txBody>
-              <a:bodyPr rtlCol="0" anchor="ctr"/>
-              <a:lstStyle/>
-              <a:p>
-                <a:pPr algn="ctr"/>
-                <a:endParaRPr lang="zh-CN" altLang="en-US" dirty="0"/>
-              </a:p>
-            </p:txBody>
-          </p:sp>
-          <p:sp>
-            <p:nvSpPr>
-              <p:cNvPr id="81" name="矩形 80"/>
-              <p:cNvSpPr/>
-              <p:nvPr/>
-            </p:nvSpPr>
-            <p:spPr>
-              <a:xfrm>
-                <a:off x="10334083" y="5621065"/>
-                <a:ext cx="216000" cy="216000"/>
-              </a:xfrm>
-              <a:prstGeom prst="rect">
-                <a:avLst/>
-              </a:prstGeom>
-              <a:solidFill>
-                <a:srgbClr val="A83EA3"/>
-              </a:solidFill>
-              <a:ln w="28575">
-                <a:solidFill>
-                  <a:srgbClr val="A83EA3"/>
-                </a:solidFill>
-              </a:ln>
-            </p:spPr>
-            <p:style>
-              <a:lnRef idx="2">
-                <a:schemeClr val="accent1">
-                  <a:shade val="50000"/>
-                </a:schemeClr>
-              </a:lnRef>
-              <a:fillRef idx="1">
-                <a:schemeClr val="accent1"/>
-              </a:fillRef>
-              <a:effectRef idx="0">
-                <a:schemeClr val="accent1"/>
-              </a:effectRef>
-              <a:fontRef idx="minor">
-                <a:schemeClr val="lt1"/>
-              </a:fontRef>
-            </p:style>
-            <p:txBody>
-              <a:bodyPr rtlCol="0" anchor="ctr"/>
-              <a:lstStyle/>
-              <a:p>
-                <a:pPr algn="ctr"/>
-                <a:endParaRPr lang="zh-CN" altLang="en-US" dirty="0"/>
-              </a:p>
-            </p:txBody>
-          </p:sp>
-        </p:grpSp>
-        <p:grpSp>
-          <p:nvGrpSpPr>
-            <p:cNvPr id="95" name="组合 94"/>
-            <p:cNvGrpSpPr/>
-            <p:nvPr/>
-          </p:nvGrpSpPr>
-          <p:grpSpPr>
-            <a:xfrm>
-              <a:off x="7674532" y="3079318"/>
-              <a:ext cx="2862681" cy="216000"/>
-              <a:chOff x="7674532" y="3079318"/>
-              <a:chExt cx="2862681" cy="216000"/>
-            </a:xfrm>
-          </p:grpSpPr>
-          <p:sp>
-            <p:nvSpPr>
-              <p:cNvPr id="86" name="矩形 85"/>
-              <p:cNvSpPr/>
-              <p:nvPr/>
-            </p:nvSpPr>
-            <p:spPr>
-              <a:xfrm>
-                <a:off x="7674532" y="3079318"/>
-                <a:ext cx="216000" cy="216000"/>
-              </a:xfrm>
-              <a:prstGeom prst="rect">
-                <a:avLst/>
-              </a:prstGeom>
-              <a:solidFill>
-                <a:srgbClr val="A83EA3"/>
-              </a:solidFill>
-              <a:ln w="28575">
-                <a:solidFill>
-                  <a:srgbClr val="A83EA3"/>
-                </a:solidFill>
-              </a:ln>
-            </p:spPr>
-            <p:style>
-              <a:lnRef idx="2">
-                <a:schemeClr val="accent1">
-                  <a:shade val="50000"/>
-                </a:schemeClr>
-              </a:lnRef>
-              <a:fillRef idx="1">
-                <a:schemeClr val="accent1"/>
-              </a:fillRef>
-              <a:effectRef idx="0">
-                <a:schemeClr val="accent1"/>
-              </a:effectRef>
-              <a:fontRef idx="minor">
-                <a:schemeClr val="lt1"/>
-              </a:fontRef>
-            </p:style>
-            <p:txBody>
-              <a:bodyPr rtlCol="0" anchor="ctr"/>
-              <a:lstStyle/>
-              <a:p>
-                <a:pPr algn="ctr"/>
-                <a:endParaRPr lang="zh-CN" altLang="en-US" dirty="0"/>
-              </a:p>
-            </p:txBody>
-          </p:sp>
-          <p:sp>
-            <p:nvSpPr>
-              <p:cNvPr id="87" name="矩形 86"/>
-              <p:cNvSpPr/>
-              <p:nvPr/>
-            </p:nvSpPr>
-            <p:spPr>
-              <a:xfrm>
-                <a:off x="8052629" y="3079318"/>
-                <a:ext cx="216000" cy="216000"/>
-              </a:xfrm>
-              <a:prstGeom prst="rect">
-                <a:avLst/>
-              </a:prstGeom>
-              <a:solidFill>
-                <a:srgbClr val="A83EA3"/>
-              </a:solidFill>
-              <a:ln w="28575">
-                <a:solidFill>
-                  <a:srgbClr val="A83EA3"/>
-                </a:solidFill>
-              </a:ln>
-            </p:spPr>
-            <p:style>
-              <a:lnRef idx="2">
-                <a:schemeClr val="accent1">
-                  <a:shade val="50000"/>
-                </a:schemeClr>
-              </a:lnRef>
-              <a:fillRef idx="1">
-                <a:schemeClr val="accent1"/>
-              </a:fillRef>
-              <a:effectRef idx="0">
-                <a:schemeClr val="accent1"/>
-              </a:effectRef>
-              <a:fontRef idx="minor">
-                <a:schemeClr val="lt1"/>
-              </a:fontRef>
-            </p:style>
-            <p:txBody>
-              <a:bodyPr rtlCol="0" anchor="ctr"/>
-              <a:lstStyle/>
-              <a:p>
-                <a:pPr algn="ctr"/>
-                <a:endParaRPr lang="zh-CN" altLang="en-US" dirty="0"/>
-              </a:p>
-            </p:txBody>
-          </p:sp>
-          <p:sp>
-            <p:nvSpPr>
-              <p:cNvPr id="88" name="矩形 87"/>
-              <p:cNvSpPr/>
-              <p:nvPr/>
-            </p:nvSpPr>
-            <p:spPr>
-              <a:xfrm>
-                <a:off x="8430726" y="3079318"/>
-                <a:ext cx="216000" cy="216000"/>
-              </a:xfrm>
-              <a:prstGeom prst="rect">
-                <a:avLst/>
-              </a:prstGeom>
-              <a:solidFill>
-                <a:srgbClr val="A83EA3"/>
-              </a:solidFill>
-              <a:ln w="28575">
-                <a:solidFill>
-                  <a:srgbClr val="A83EA3"/>
-                </a:solidFill>
-              </a:ln>
-            </p:spPr>
-            <p:style>
-              <a:lnRef idx="2">
-                <a:schemeClr val="accent1">
-                  <a:shade val="50000"/>
-                </a:schemeClr>
-              </a:lnRef>
-              <a:fillRef idx="1">
-                <a:schemeClr val="accent1"/>
-              </a:fillRef>
-              <a:effectRef idx="0">
-                <a:schemeClr val="accent1"/>
-              </a:effectRef>
-              <a:fontRef idx="minor">
-                <a:schemeClr val="lt1"/>
-              </a:fontRef>
-            </p:style>
-            <p:txBody>
-              <a:bodyPr rtlCol="0" anchor="ctr"/>
-              <a:lstStyle/>
-              <a:p>
-                <a:pPr algn="ctr"/>
-                <a:endParaRPr lang="zh-CN" altLang="en-US" dirty="0"/>
-              </a:p>
-            </p:txBody>
-          </p:sp>
-          <p:sp>
-            <p:nvSpPr>
-              <p:cNvPr id="89" name="矩形 88"/>
-              <p:cNvSpPr/>
-              <p:nvPr/>
-            </p:nvSpPr>
-            <p:spPr>
-              <a:xfrm>
-                <a:off x="8808824" y="3079318"/>
-                <a:ext cx="216000" cy="216000"/>
-              </a:xfrm>
-              <a:prstGeom prst="rect">
-                <a:avLst/>
-              </a:prstGeom>
-              <a:solidFill>
-                <a:srgbClr val="A83EA3"/>
-              </a:solidFill>
-              <a:ln w="28575">
-                <a:solidFill>
-                  <a:srgbClr val="A83EA3"/>
-                </a:solidFill>
-              </a:ln>
-            </p:spPr>
-            <p:style>
-              <a:lnRef idx="2">
-                <a:schemeClr val="accent1">
-                  <a:shade val="50000"/>
-                </a:schemeClr>
-              </a:lnRef>
-              <a:fillRef idx="1">
-                <a:schemeClr val="accent1"/>
-              </a:fillRef>
-              <a:effectRef idx="0">
-                <a:schemeClr val="accent1"/>
-              </a:effectRef>
-              <a:fontRef idx="minor">
-                <a:schemeClr val="lt1"/>
-              </a:fontRef>
-            </p:style>
-            <p:txBody>
-              <a:bodyPr rtlCol="0" anchor="ctr"/>
-              <a:lstStyle/>
-              <a:p>
-                <a:pPr algn="ctr"/>
-                <a:endParaRPr lang="zh-CN" altLang="en-US" dirty="0"/>
-              </a:p>
-            </p:txBody>
-          </p:sp>
-          <p:sp>
-            <p:nvSpPr>
-              <p:cNvPr id="90" name="矩形 89"/>
-              <p:cNvSpPr/>
-              <p:nvPr/>
-            </p:nvSpPr>
-            <p:spPr>
-              <a:xfrm>
-                <a:off x="9186921" y="3079318"/>
-                <a:ext cx="216000" cy="216000"/>
-              </a:xfrm>
-              <a:prstGeom prst="rect">
-                <a:avLst/>
-              </a:prstGeom>
-              <a:solidFill>
-                <a:srgbClr val="A83EA3"/>
-              </a:solidFill>
-              <a:ln w="28575">
-                <a:solidFill>
-                  <a:srgbClr val="A83EA3"/>
-                </a:solidFill>
-              </a:ln>
-            </p:spPr>
-            <p:style>
-              <a:lnRef idx="2">
-                <a:schemeClr val="accent1">
-                  <a:shade val="50000"/>
-                </a:schemeClr>
-              </a:lnRef>
-              <a:fillRef idx="1">
-                <a:schemeClr val="accent1"/>
-              </a:fillRef>
-              <a:effectRef idx="0">
-                <a:schemeClr val="accent1"/>
-              </a:effectRef>
-              <a:fontRef idx="minor">
-                <a:schemeClr val="lt1"/>
-              </a:fontRef>
-            </p:style>
-            <p:txBody>
-              <a:bodyPr rtlCol="0" anchor="ctr"/>
-              <a:lstStyle/>
-              <a:p>
-                <a:pPr algn="ctr"/>
-                <a:endParaRPr lang="zh-CN" altLang="en-US" dirty="0"/>
-              </a:p>
-            </p:txBody>
-          </p:sp>
-          <p:sp>
-            <p:nvSpPr>
-              <p:cNvPr id="91" name="矩形 90"/>
-              <p:cNvSpPr/>
-              <p:nvPr/>
-            </p:nvSpPr>
-            <p:spPr>
-              <a:xfrm>
-                <a:off x="9565018" y="3079318"/>
-                <a:ext cx="216000" cy="216000"/>
-              </a:xfrm>
-              <a:prstGeom prst="rect">
-                <a:avLst/>
-              </a:prstGeom>
-              <a:solidFill>
-                <a:srgbClr val="A83EA3"/>
-              </a:solidFill>
-              <a:ln w="28575">
-                <a:solidFill>
-                  <a:srgbClr val="A83EA3"/>
-                </a:solidFill>
-              </a:ln>
-            </p:spPr>
-            <p:style>
-              <a:lnRef idx="2">
-                <a:schemeClr val="accent1">
-                  <a:shade val="50000"/>
-                </a:schemeClr>
-              </a:lnRef>
-              <a:fillRef idx="1">
-                <a:schemeClr val="accent1"/>
-              </a:fillRef>
-              <a:effectRef idx="0">
-                <a:schemeClr val="accent1"/>
-              </a:effectRef>
-              <a:fontRef idx="minor">
-                <a:schemeClr val="lt1"/>
-              </a:fontRef>
-            </p:style>
-            <p:txBody>
-              <a:bodyPr rtlCol="0" anchor="ctr"/>
-              <a:lstStyle/>
-              <a:p>
-                <a:pPr algn="ctr"/>
-                <a:endParaRPr lang="zh-CN" altLang="en-US" dirty="0"/>
-              </a:p>
-            </p:txBody>
-          </p:sp>
-          <p:sp>
-            <p:nvSpPr>
-              <p:cNvPr id="92" name="矩形 91"/>
-              <p:cNvSpPr/>
-              <p:nvPr/>
-            </p:nvSpPr>
-            <p:spPr>
-              <a:xfrm>
-                <a:off x="9943115" y="3079318"/>
-                <a:ext cx="216000" cy="216000"/>
-              </a:xfrm>
-              <a:prstGeom prst="rect">
-                <a:avLst/>
-              </a:prstGeom>
-              <a:solidFill>
-                <a:srgbClr val="A83EA3"/>
-              </a:solidFill>
-              <a:ln w="28575">
-                <a:solidFill>
-                  <a:srgbClr val="A83EA3"/>
-                </a:solidFill>
-              </a:ln>
-            </p:spPr>
-            <p:style>
-              <a:lnRef idx="2">
-                <a:schemeClr val="accent1">
-                  <a:shade val="50000"/>
-                </a:schemeClr>
-              </a:lnRef>
-              <a:fillRef idx="1">
-                <a:schemeClr val="accent1"/>
-              </a:fillRef>
-              <a:effectRef idx="0">
-                <a:schemeClr val="accent1"/>
-              </a:effectRef>
-              <a:fontRef idx="minor">
-                <a:schemeClr val="lt1"/>
-              </a:fontRef>
-            </p:style>
-            <p:txBody>
-              <a:bodyPr rtlCol="0" anchor="ctr"/>
-              <a:lstStyle/>
-              <a:p>
-                <a:pPr algn="ctr"/>
-                <a:endParaRPr lang="zh-CN" altLang="en-US" dirty="0"/>
-              </a:p>
-            </p:txBody>
-          </p:sp>
-          <p:sp>
-            <p:nvSpPr>
-              <p:cNvPr id="93" name="矩形 92"/>
-              <p:cNvSpPr/>
-              <p:nvPr/>
-            </p:nvSpPr>
-            <p:spPr>
-              <a:xfrm>
-                <a:off x="10321213" y="3079318"/>
-                <a:ext cx="216000" cy="216000"/>
-              </a:xfrm>
-              <a:prstGeom prst="rect">
-                <a:avLst/>
-              </a:prstGeom>
-              <a:solidFill>
-                <a:srgbClr val="A83EA3"/>
-              </a:solidFill>
-              <a:ln w="28575">
-                <a:solidFill>
-                  <a:srgbClr val="A83EA3"/>
-                </a:solidFill>
-              </a:ln>
-            </p:spPr>
-            <p:style>
-              <a:lnRef idx="2">
-                <a:schemeClr val="accent1">
-                  <a:shade val="50000"/>
-                </a:schemeClr>
-              </a:lnRef>
-              <a:fillRef idx="1">
-                <a:schemeClr val="accent1"/>
-              </a:fillRef>
-              <a:effectRef idx="0">
-                <a:schemeClr val="accent1"/>
-              </a:effectRef>
-              <a:fontRef idx="minor">
-                <a:schemeClr val="lt1"/>
-              </a:fontRef>
-            </p:style>
-            <p:txBody>
-              <a:bodyPr rtlCol="0" anchor="ctr"/>
-              <a:lstStyle/>
-              <a:p>
-                <a:pPr algn="ctr"/>
-                <a:endParaRPr lang="zh-CN" altLang="en-US" dirty="0"/>
-              </a:p>
-            </p:txBody>
-          </p:sp>
-        </p:grpSp>
+            </a:ln>
+          </p:spPr>
+          <p:style>
+            <a:lnRef idx="2">
+              <a:schemeClr val="accent1">
+                <a:shade val="50000"/>
+              </a:schemeClr>
+            </a:lnRef>
+            <a:fillRef idx="1">
+              <a:schemeClr val="accent1"/>
+            </a:fillRef>
+            <a:effectRef idx="0">
+              <a:schemeClr val="accent1"/>
+            </a:effectRef>
+            <a:fontRef idx="minor">
+              <a:schemeClr val="lt1"/>
+            </a:fontRef>
+          </p:style>
+          <p:txBody>
+            <a:bodyPr rtlCol="0" anchor="ctr"/>
+            <a:lstStyle/>
+            <a:p>
+              <a:pPr algn="ctr"/>
+              <a:endParaRPr lang="zh-CN" altLang="en-US"/>
+            </a:p>
+          </p:txBody>
+        </p:sp>
       </p:grpSp>
     </p:spTree>
     <p:extLst>

</xml_diff>

<commit_message>
Deploying to gh-pages from @ Bili-Sakura/ICLR-BLOG-2026-SAKURA@7aecb20828178c26b4ea718e86066dd5112a034f 🚀
</commit_message>
<xml_diff>
--- a/assets/img/2026-04-27-diffusion-architecture-evolution/figures.pptx
+++ b/assets/img/2026-04-27-diffusion-architecture-evolution/figures.pptx
@@ -260,7 +260,7 @@
           <a:p>
             <a:fld id="{2382B1A8-8FBB-433B-947F-F52F1C8CEB02}" type="datetimeFigureOut">
               <a:rPr lang="zh-CN" altLang="en-US" smtClean="0"/>
-              <a:t>2025/10/21</a:t>
+              <a:t>2025/11/9</a:t>
             </a:fld>
             <a:endParaRPr lang="zh-CN" altLang="en-US"/>
           </a:p>
@@ -430,7 +430,7 @@
           <a:p>
             <a:fld id="{2382B1A8-8FBB-433B-947F-F52F1C8CEB02}" type="datetimeFigureOut">
               <a:rPr lang="zh-CN" altLang="en-US" smtClean="0"/>
-              <a:t>2025/10/21</a:t>
+              <a:t>2025/11/9</a:t>
             </a:fld>
             <a:endParaRPr lang="zh-CN" altLang="en-US"/>
           </a:p>
@@ -610,7 +610,7 @@
           <a:p>
             <a:fld id="{2382B1A8-8FBB-433B-947F-F52F1C8CEB02}" type="datetimeFigureOut">
               <a:rPr lang="zh-CN" altLang="en-US" smtClean="0"/>
-              <a:t>2025/10/21</a:t>
+              <a:t>2025/11/9</a:t>
             </a:fld>
             <a:endParaRPr lang="zh-CN" altLang="en-US"/>
           </a:p>
@@ -780,7 +780,7 @@
           <a:p>
             <a:fld id="{2382B1A8-8FBB-433B-947F-F52F1C8CEB02}" type="datetimeFigureOut">
               <a:rPr lang="zh-CN" altLang="en-US" smtClean="0"/>
-              <a:t>2025/10/21</a:t>
+              <a:t>2025/11/9</a:t>
             </a:fld>
             <a:endParaRPr lang="zh-CN" altLang="en-US"/>
           </a:p>
@@ -1026,7 +1026,7 @@
           <a:p>
             <a:fld id="{2382B1A8-8FBB-433B-947F-F52F1C8CEB02}" type="datetimeFigureOut">
               <a:rPr lang="zh-CN" altLang="en-US" smtClean="0"/>
-              <a:t>2025/10/21</a:t>
+              <a:t>2025/11/9</a:t>
             </a:fld>
             <a:endParaRPr lang="zh-CN" altLang="en-US"/>
           </a:p>
@@ -1258,7 +1258,7 @@
           <a:p>
             <a:fld id="{2382B1A8-8FBB-433B-947F-F52F1C8CEB02}" type="datetimeFigureOut">
               <a:rPr lang="zh-CN" altLang="en-US" smtClean="0"/>
-              <a:t>2025/10/21</a:t>
+              <a:t>2025/11/9</a:t>
             </a:fld>
             <a:endParaRPr lang="zh-CN" altLang="en-US"/>
           </a:p>
@@ -1625,7 +1625,7 @@
           <a:p>
             <a:fld id="{2382B1A8-8FBB-433B-947F-F52F1C8CEB02}" type="datetimeFigureOut">
               <a:rPr lang="zh-CN" altLang="en-US" smtClean="0"/>
-              <a:t>2025/10/21</a:t>
+              <a:t>2025/11/9</a:t>
             </a:fld>
             <a:endParaRPr lang="zh-CN" altLang="en-US"/>
           </a:p>
@@ -1743,7 +1743,7 @@
           <a:p>
             <a:fld id="{2382B1A8-8FBB-433B-947F-F52F1C8CEB02}" type="datetimeFigureOut">
               <a:rPr lang="zh-CN" altLang="en-US" smtClean="0"/>
-              <a:t>2025/10/21</a:t>
+              <a:t>2025/11/9</a:t>
             </a:fld>
             <a:endParaRPr lang="zh-CN" altLang="en-US"/>
           </a:p>
@@ -1838,7 +1838,7 @@
           <a:p>
             <a:fld id="{2382B1A8-8FBB-433B-947F-F52F1C8CEB02}" type="datetimeFigureOut">
               <a:rPr lang="zh-CN" altLang="en-US" smtClean="0"/>
-              <a:t>2025/10/21</a:t>
+              <a:t>2025/11/9</a:t>
             </a:fld>
             <a:endParaRPr lang="zh-CN" altLang="en-US"/>
           </a:p>
@@ -2115,7 +2115,7 @@
           <a:p>
             <a:fld id="{2382B1A8-8FBB-433B-947F-F52F1C8CEB02}" type="datetimeFigureOut">
               <a:rPr lang="zh-CN" altLang="en-US" smtClean="0"/>
-              <a:t>2025/10/21</a:t>
+              <a:t>2025/11/9</a:t>
             </a:fld>
             <a:endParaRPr lang="zh-CN" altLang="en-US"/>
           </a:p>
@@ -2368,7 +2368,7 @@
           <a:p>
             <a:fld id="{2382B1A8-8FBB-433B-947F-F52F1C8CEB02}" type="datetimeFigureOut">
               <a:rPr lang="zh-CN" altLang="en-US" smtClean="0"/>
-              <a:t>2025/10/21</a:t>
+              <a:t>2025/11/9</a:t>
             </a:fld>
             <a:endParaRPr lang="zh-CN" altLang="en-US"/>
           </a:p>
@@ -2581,7 +2581,7 @@
           <a:p>
             <a:fld id="{2382B1A8-8FBB-433B-947F-F52F1C8CEB02}" type="datetimeFigureOut">
               <a:rPr lang="zh-CN" altLang="en-US" smtClean="0"/>
-              <a:t>2025/10/21</a:t>
+              <a:t>2025/11/9</a:t>
             </a:fld>
             <a:endParaRPr lang="zh-CN" altLang="en-US"/>
           </a:p>
@@ -3880,7 +3880,7 @@
       </p:cxnSp>
       <p:grpSp>
         <p:nvGrpSpPr>
-          <p:cNvPr id="97" name="组合 96"/>
+          <p:cNvPr id="7" name="组合 6"/>
           <p:cNvGrpSpPr/>
           <p:nvPr/>
         </p:nvGrpSpPr>
@@ -3888,34 +3888,34 @@
           <a:xfrm>
             <a:off x="7674532" y="3052814"/>
             <a:ext cx="2879994" cy="2808740"/>
-            <a:chOff x="7674532" y="3079318"/>
+            <a:chOff x="7674532" y="3052814"/>
             <a:chExt cx="2879994" cy="2808740"/>
           </a:xfrm>
         </p:grpSpPr>
         <p:grpSp>
           <p:nvGrpSpPr>
-            <p:cNvPr id="94" name="组合 93"/>
+            <p:cNvPr id="97" name="组合 96"/>
             <p:cNvGrpSpPr/>
             <p:nvPr/>
           </p:nvGrpSpPr>
           <p:grpSpPr>
             <a:xfrm>
-              <a:off x="7674532" y="3558363"/>
-              <a:ext cx="2879994" cy="1893749"/>
-              <a:chOff x="7674531" y="3800950"/>
-              <a:chExt cx="2879994" cy="1323432"/>
+              <a:off x="7674532" y="3052814"/>
+              <a:ext cx="2879994" cy="2808740"/>
+              <a:chOff x="7674532" y="3079318"/>
+              <a:chExt cx="2879994" cy="2808740"/>
             </a:xfrm>
           </p:grpSpPr>
           <p:sp>
             <p:nvSpPr>
-              <p:cNvPr id="33" name="矩形 32"/>
+              <p:cNvPr id="29" name="矩形 28"/>
               <p:cNvSpPr/>
               <p:nvPr/>
             </p:nvSpPr>
             <p:spPr>
-              <a:xfrm rot="10800000">
-                <a:off x="7674531" y="3800950"/>
-                <a:ext cx="2879994" cy="175050"/>
+              <a:xfrm>
+                <a:off x="7674532" y="5006610"/>
+                <a:ext cx="2879994" cy="445501"/>
               </a:xfrm>
               <a:prstGeom prst="rect">
                 <a:avLst/>
@@ -3952,943 +3952,940 @@
               </a:p>
             </p:txBody>
           </p:sp>
-          <p:sp>
-            <p:nvSpPr>
-              <p:cNvPr id="34" name="矩形 33"/>
-              <p:cNvSpPr/>
+          <p:grpSp>
+            <p:nvGrpSpPr>
+              <p:cNvPr id="96" name="组合 95"/>
+              <p:cNvGrpSpPr/>
               <p:nvPr/>
-            </p:nvSpPr>
-            <p:spPr>
-              <a:xfrm rot="10800000">
-                <a:off x="7674531" y="4194503"/>
-                <a:ext cx="2879994" cy="151402"/>
+            </p:nvGrpSpPr>
+            <p:grpSpPr>
+              <a:xfrm>
+                <a:off x="7674532" y="5672058"/>
+                <a:ext cx="2862681" cy="216000"/>
+                <a:chOff x="7687402" y="5621065"/>
+                <a:chExt cx="2862681" cy="216000"/>
               </a:xfrm>
-              <a:prstGeom prst="rect">
-                <a:avLst/>
-              </a:prstGeom>
-              <a:noFill/>
-              <a:ln w="28575">
+            </p:grpSpPr>
+            <p:sp>
+              <p:nvSpPr>
+                <p:cNvPr id="74" name="矩形 73"/>
+                <p:cNvSpPr/>
+                <p:nvPr/>
+              </p:nvSpPr>
+              <p:spPr>
+                <a:xfrm>
+                  <a:off x="7687402" y="5621065"/>
+                  <a:ext cx="216000" cy="216000"/>
+                </a:xfrm>
+                <a:prstGeom prst="rect">
+                  <a:avLst/>
+                </a:prstGeom>
                 <a:solidFill>
                   <a:srgbClr val="A83EA3"/>
                 </a:solidFill>
-              </a:ln>
-            </p:spPr>
-            <p:style>
-              <a:lnRef idx="2">
-                <a:schemeClr val="accent1">
-                  <a:shade val="50000"/>
-                </a:schemeClr>
-              </a:lnRef>
-              <a:fillRef idx="1">
-                <a:schemeClr val="accent1"/>
-              </a:fillRef>
-              <a:effectRef idx="0">
-                <a:schemeClr val="accent1"/>
-              </a:effectRef>
-              <a:fontRef idx="minor">
-                <a:schemeClr val="lt1"/>
-              </a:fontRef>
-            </p:style>
-            <p:txBody>
-              <a:bodyPr rtlCol="0" anchor="ctr"/>
-              <a:lstStyle/>
-              <a:p>
-                <a:pPr algn="ctr"/>
-                <a:endParaRPr lang="zh-CN" altLang="en-US"/>
-              </a:p>
-            </p:txBody>
-          </p:sp>
-          <p:sp>
-            <p:nvSpPr>
-              <p:cNvPr id="29" name="矩形 28"/>
-              <p:cNvSpPr/>
+                <a:ln w="28575">
+                  <a:solidFill>
+                    <a:srgbClr val="A83EA3"/>
+                  </a:solidFill>
+                </a:ln>
+              </p:spPr>
+              <p:style>
+                <a:lnRef idx="2">
+                  <a:schemeClr val="accent1">
+                    <a:shade val="50000"/>
+                  </a:schemeClr>
+                </a:lnRef>
+                <a:fillRef idx="1">
+                  <a:schemeClr val="accent1"/>
+                </a:fillRef>
+                <a:effectRef idx="0">
+                  <a:schemeClr val="accent1"/>
+                </a:effectRef>
+                <a:fontRef idx="minor">
+                  <a:schemeClr val="lt1"/>
+                </a:fontRef>
+              </p:style>
+              <p:txBody>
+                <a:bodyPr rtlCol="0" anchor="ctr"/>
+                <a:lstStyle/>
+                <a:p>
+                  <a:pPr algn="ctr"/>
+                  <a:endParaRPr lang="zh-CN" altLang="en-US" dirty="0"/>
+                </a:p>
+              </p:txBody>
+            </p:sp>
+            <p:sp>
+              <p:nvSpPr>
+                <p:cNvPr id="75" name="矩形 74"/>
+                <p:cNvSpPr/>
+                <p:nvPr/>
+              </p:nvSpPr>
+              <p:spPr>
+                <a:xfrm>
+                  <a:off x="8065499" y="5621065"/>
+                  <a:ext cx="216000" cy="216000"/>
+                </a:xfrm>
+                <a:prstGeom prst="rect">
+                  <a:avLst/>
+                </a:prstGeom>
+                <a:solidFill>
+                  <a:srgbClr val="A83EA3"/>
+                </a:solidFill>
+                <a:ln w="28575">
+                  <a:solidFill>
+                    <a:srgbClr val="A83EA3"/>
+                  </a:solidFill>
+                </a:ln>
+              </p:spPr>
+              <p:style>
+                <a:lnRef idx="2">
+                  <a:schemeClr val="accent1">
+                    <a:shade val="50000"/>
+                  </a:schemeClr>
+                </a:lnRef>
+                <a:fillRef idx="1">
+                  <a:schemeClr val="accent1"/>
+                </a:fillRef>
+                <a:effectRef idx="0">
+                  <a:schemeClr val="accent1"/>
+                </a:effectRef>
+                <a:fontRef idx="minor">
+                  <a:schemeClr val="lt1"/>
+                </a:fontRef>
+              </p:style>
+              <p:txBody>
+                <a:bodyPr rtlCol="0" anchor="ctr"/>
+                <a:lstStyle/>
+                <a:p>
+                  <a:pPr algn="ctr"/>
+                  <a:endParaRPr lang="zh-CN" altLang="en-US" dirty="0"/>
+                </a:p>
+              </p:txBody>
+            </p:sp>
+            <p:sp>
+              <p:nvSpPr>
+                <p:cNvPr id="76" name="矩形 75"/>
+                <p:cNvSpPr/>
+                <p:nvPr/>
+              </p:nvSpPr>
+              <p:spPr>
+                <a:xfrm>
+                  <a:off x="8443596" y="5621065"/>
+                  <a:ext cx="216000" cy="216000"/>
+                </a:xfrm>
+                <a:prstGeom prst="rect">
+                  <a:avLst/>
+                </a:prstGeom>
+                <a:solidFill>
+                  <a:srgbClr val="A83EA3"/>
+                </a:solidFill>
+                <a:ln w="28575">
+                  <a:solidFill>
+                    <a:srgbClr val="A83EA3"/>
+                  </a:solidFill>
+                </a:ln>
+              </p:spPr>
+              <p:style>
+                <a:lnRef idx="2">
+                  <a:schemeClr val="accent1">
+                    <a:shade val="50000"/>
+                  </a:schemeClr>
+                </a:lnRef>
+                <a:fillRef idx="1">
+                  <a:schemeClr val="accent1"/>
+                </a:fillRef>
+                <a:effectRef idx="0">
+                  <a:schemeClr val="accent1"/>
+                </a:effectRef>
+                <a:fontRef idx="minor">
+                  <a:schemeClr val="lt1"/>
+                </a:fontRef>
+              </p:style>
+              <p:txBody>
+                <a:bodyPr rtlCol="0" anchor="ctr"/>
+                <a:lstStyle/>
+                <a:p>
+                  <a:pPr algn="ctr"/>
+                  <a:endParaRPr lang="zh-CN" altLang="en-US" dirty="0"/>
+                </a:p>
+              </p:txBody>
+            </p:sp>
+            <p:sp>
+              <p:nvSpPr>
+                <p:cNvPr id="77" name="矩形 76"/>
+                <p:cNvSpPr/>
+                <p:nvPr/>
+              </p:nvSpPr>
+              <p:spPr>
+                <a:xfrm>
+                  <a:off x="8821694" y="5621065"/>
+                  <a:ext cx="216000" cy="216000"/>
+                </a:xfrm>
+                <a:prstGeom prst="rect">
+                  <a:avLst/>
+                </a:prstGeom>
+                <a:solidFill>
+                  <a:srgbClr val="A83EA3"/>
+                </a:solidFill>
+                <a:ln w="28575">
+                  <a:solidFill>
+                    <a:srgbClr val="A83EA3"/>
+                  </a:solidFill>
+                </a:ln>
+              </p:spPr>
+              <p:style>
+                <a:lnRef idx="2">
+                  <a:schemeClr val="accent1">
+                    <a:shade val="50000"/>
+                  </a:schemeClr>
+                </a:lnRef>
+                <a:fillRef idx="1">
+                  <a:schemeClr val="accent1"/>
+                </a:fillRef>
+                <a:effectRef idx="0">
+                  <a:schemeClr val="accent1"/>
+                </a:effectRef>
+                <a:fontRef idx="minor">
+                  <a:schemeClr val="lt1"/>
+                </a:fontRef>
+              </p:style>
+              <p:txBody>
+                <a:bodyPr rtlCol="0" anchor="ctr"/>
+                <a:lstStyle/>
+                <a:p>
+                  <a:pPr algn="ctr"/>
+                  <a:endParaRPr lang="zh-CN" altLang="en-US" dirty="0"/>
+                </a:p>
+              </p:txBody>
+            </p:sp>
+            <p:sp>
+              <p:nvSpPr>
+                <p:cNvPr id="78" name="矩形 77"/>
+                <p:cNvSpPr/>
+                <p:nvPr/>
+              </p:nvSpPr>
+              <p:spPr>
+                <a:xfrm>
+                  <a:off x="9199791" y="5621065"/>
+                  <a:ext cx="216000" cy="216000"/>
+                </a:xfrm>
+                <a:prstGeom prst="rect">
+                  <a:avLst/>
+                </a:prstGeom>
+                <a:solidFill>
+                  <a:srgbClr val="A83EA3"/>
+                </a:solidFill>
+                <a:ln w="28575">
+                  <a:solidFill>
+                    <a:srgbClr val="A83EA3"/>
+                  </a:solidFill>
+                </a:ln>
+              </p:spPr>
+              <p:style>
+                <a:lnRef idx="2">
+                  <a:schemeClr val="accent1">
+                    <a:shade val="50000"/>
+                  </a:schemeClr>
+                </a:lnRef>
+                <a:fillRef idx="1">
+                  <a:schemeClr val="accent1"/>
+                </a:fillRef>
+                <a:effectRef idx="0">
+                  <a:schemeClr val="accent1"/>
+                </a:effectRef>
+                <a:fontRef idx="minor">
+                  <a:schemeClr val="lt1"/>
+                </a:fontRef>
+              </p:style>
+              <p:txBody>
+                <a:bodyPr rtlCol="0" anchor="ctr"/>
+                <a:lstStyle/>
+                <a:p>
+                  <a:pPr algn="ctr"/>
+                  <a:endParaRPr lang="zh-CN" altLang="en-US" dirty="0"/>
+                </a:p>
+              </p:txBody>
+            </p:sp>
+            <p:sp>
+              <p:nvSpPr>
+                <p:cNvPr id="79" name="矩形 78"/>
+                <p:cNvSpPr/>
+                <p:nvPr/>
+              </p:nvSpPr>
+              <p:spPr>
+                <a:xfrm>
+                  <a:off x="9577888" y="5621065"/>
+                  <a:ext cx="216000" cy="216000"/>
+                </a:xfrm>
+                <a:prstGeom prst="rect">
+                  <a:avLst/>
+                </a:prstGeom>
+                <a:solidFill>
+                  <a:srgbClr val="A83EA3"/>
+                </a:solidFill>
+                <a:ln w="28575">
+                  <a:solidFill>
+                    <a:srgbClr val="A83EA3"/>
+                  </a:solidFill>
+                </a:ln>
+              </p:spPr>
+              <p:style>
+                <a:lnRef idx="2">
+                  <a:schemeClr val="accent1">
+                    <a:shade val="50000"/>
+                  </a:schemeClr>
+                </a:lnRef>
+                <a:fillRef idx="1">
+                  <a:schemeClr val="accent1"/>
+                </a:fillRef>
+                <a:effectRef idx="0">
+                  <a:schemeClr val="accent1"/>
+                </a:effectRef>
+                <a:fontRef idx="minor">
+                  <a:schemeClr val="lt1"/>
+                </a:fontRef>
+              </p:style>
+              <p:txBody>
+                <a:bodyPr rtlCol="0" anchor="ctr"/>
+                <a:lstStyle/>
+                <a:p>
+                  <a:pPr algn="ctr"/>
+                  <a:endParaRPr lang="zh-CN" altLang="en-US" dirty="0"/>
+                </a:p>
+              </p:txBody>
+            </p:sp>
+            <p:sp>
+              <p:nvSpPr>
+                <p:cNvPr id="80" name="矩形 79"/>
+                <p:cNvSpPr/>
+                <p:nvPr/>
+              </p:nvSpPr>
+              <p:spPr>
+                <a:xfrm>
+                  <a:off x="9955985" y="5621065"/>
+                  <a:ext cx="216000" cy="216000"/>
+                </a:xfrm>
+                <a:prstGeom prst="rect">
+                  <a:avLst/>
+                </a:prstGeom>
+                <a:solidFill>
+                  <a:srgbClr val="A83EA3"/>
+                </a:solidFill>
+                <a:ln w="28575">
+                  <a:solidFill>
+                    <a:srgbClr val="A83EA3"/>
+                  </a:solidFill>
+                </a:ln>
+              </p:spPr>
+              <p:style>
+                <a:lnRef idx="2">
+                  <a:schemeClr val="accent1">
+                    <a:shade val="50000"/>
+                  </a:schemeClr>
+                </a:lnRef>
+                <a:fillRef idx="1">
+                  <a:schemeClr val="accent1"/>
+                </a:fillRef>
+                <a:effectRef idx="0">
+                  <a:schemeClr val="accent1"/>
+                </a:effectRef>
+                <a:fontRef idx="minor">
+                  <a:schemeClr val="lt1"/>
+                </a:fontRef>
+              </p:style>
+              <p:txBody>
+                <a:bodyPr rtlCol="0" anchor="ctr"/>
+                <a:lstStyle/>
+                <a:p>
+                  <a:pPr algn="ctr"/>
+                  <a:endParaRPr lang="zh-CN" altLang="en-US" dirty="0"/>
+                </a:p>
+              </p:txBody>
+            </p:sp>
+            <p:sp>
+              <p:nvSpPr>
+                <p:cNvPr id="81" name="矩形 80"/>
+                <p:cNvSpPr/>
+                <p:nvPr/>
+              </p:nvSpPr>
+              <p:spPr>
+                <a:xfrm>
+                  <a:off x="10334083" y="5621065"/>
+                  <a:ext cx="216000" cy="216000"/>
+                </a:xfrm>
+                <a:prstGeom prst="rect">
+                  <a:avLst/>
+                </a:prstGeom>
+                <a:solidFill>
+                  <a:srgbClr val="A83EA3"/>
+                </a:solidFill>
+                <a:ln w="28575">
+                  <a:solidFill>
+                    <a:srgbClr val="A83EA3"/>
+                  </a:solidFill>
+                </a:ln>
+              </p:spPr>
+              <p:style>
+                <a:lnRef idx="2">
+                  <a:schemeClr val="accent1">
+                    <a:shade val="50000"/>
+                  </a:schemeClr>
+                </a:lnRef>
+                <a:fillRef idx="1">
+                  <a:schemeClr val="accent1"/>
+                </a:fillRef>
+                <a:effectRef idx="0">
+                  <a:schemeClr val="accent1"/>
+                </a:effectRef>
+                <a:fontRef idx="minor">
+                  <a:schemeClr val="lt1"/>
+                </a:fontRef>
+              </p:style>
+              <p:txBody>
+                <a:bodyPr rtlCol="0" anchor="ctr"/>
+                <a:lstStyle/>
+                <a:p>
+                  <a:pPr algn="ctr"/>
+                  <a:endParaRPr lang="zh-CN" altLang="en-US" dirty="0"/>
+                </a:p>
+              </p:txBody>
+            </p:sp>
+          </p:grpSp>
+          <p:grpSp>
+            <p:nvGrpSpPr>
+              <p:cNvPr id="95" name="组合 94"/>
+              <p:cNvGrpSpPr/>
               <p:nvPr/>
-            </p:nvSpPr>
-            <p:spPr>
+            </p:nvGrpSpPr>
+            <p:grpSpPr>
               <a:xfrm>
-                <a:off x="7674531" y="4949332"/>
-                <a:ext cx="2879994" cy="175050"/>
+                <a:off x="7674532" y="3079318"/>
+                <a:ext cx="2862681" cy="216000"/>
+                <a:chOff x="7674532" y="3079318"/>
+                <a:chExt cx="2862681" cy="216000"/>
               </a:xfrm>
-              <a:prstGeom prst="rect">
-                <a:avLst/>
-              </a:prstGeom>
-              <a:noFill/>
-              <a:ln w="28575">
+            </p:grpSpPr>
+            <p:sp>
+              <p:nvSpPr>
+                <p:cNvPr id="86" name="矩形 85"/>
+                <p:cNvSpPr/>
+                <p:nvPr/>
+              </p:nvSpPr>
+              <p:spPr>
+                <a:xfrm>
+                  <a:off x="7674532" y="3079318"/>
+                  <a:ext cx="216000" cy="216000"/>
+                </a:xfrm>
+                <a:prstGeom prst="rect">
+                  <a:avLst/>
+                </a:prstGeom>
                 <a:solidFill>
                   <a:srgbClr val="A83EA3"/>
                 </a:solidFill>
-              </a:ln>
-            </p:spPr>
-            <p:style>
-              <a:lnRef idx="2">
-                <a:schemeClr val="accent1">
-                  <a:shade val="50000"/>
-                </a:schemeClr>
-              </a:lnRef>
-              <a:fillRef idx="1">
-                <a:schemeClr val="accent1"/>
-              </a:fillRef>
-              <a:effectRef idx="0">
-                <a:schemeClr val="accent1"/>
-              </a:effectRef>
-              <a:fontRef idx="minor">
-                <a:schemeClr val="lt1"/>
-              </a:fontRef>
-            </p:style>
-            <p:txBody>
-              <a:bodyPr rtlCol="0" anchor="ctr"/>
-              <a:lstStyle/>
-              <a:p>
-                <a:pPr algn="ctr"/>
-                <a:endParaRPr lang="zh-CN" altLang="en-US"/>
-              </a:p>
-            </p:txBody>
-          </p:sp>
-          <p:sp>
-            <p:nvSpPr>
-              <p:cNvPr id="30" name="矩形 29"/>
-              <p:cNvSpPr/>
-              <p:nvPr/>
-            </p:nvSpPr>
-            <p:spPr>
-              <a:xfrm>
-                <a:off x="7674531" y="4565187"/>
-                <a:ext cx="2879994" cy="164857"/>
-              </a:xfrm>
-              <a:prstGeom prst="rect">
-                <a:avLst/>
-              </a:prstGeom>
-              <a:noFill/>
-              <a:ln w="28575">
+                <a:ln w="28575">
+                  <a:solidFill>
+                    <a:srgbClr val="A83EA3"/>
+                  </a:solidFill>
+                </a:ln>
+              </p:spPr>
+              <p:style>
+                <a:lnRef idx="2">
+                  <a:schemeClr val="accent1">
+                    <a:shade val="50000"/>
+                  </a:schemeClr>
+                </a:lnRef>
+                <a:fillRef idx="1">
+                  <a:schemeClr val="accent1"/>
+                </a:fillRef>
+                <a:effectRef idx="0">
+                  <a:schemeClr val="accent1"/>
+                </a:effectRef>
+                <a:fontRef idx="minor">
+                  <a:schemeClr val="lt1"/>
+                </a:fontRef>
+              </p:style>
+              <p:txBody>
+                <a:bodyPr rtlCol="0" anchor="ctr"/>
+                <a:lstStyle/>
+                <a:p>
+                  <a:pPr algn="ctr"/>
+                  <a:endParaRPr lang="zh-CN" altLang="en-US" dirty="0"/>
+                </a:p>
+              </p:txBody>
+            </p:sp>
+            <p:sp>
+              <p:nvSpPr>
+                <p:cNvPr id="87" name="矩形 86"/>
+                <p:cNvSpPr/>
+                <p:nvPr/>
+              </p:nvSpPr>
+              <p:spPr>
+                <a:xfrm>
+                  <a:off x="8052629" y="3079318"/>
+                  <a:ext cx="216000" cy="216000"/>
+                </a:xfrm>
+                <a:prstGeom prst="rect">
+                  <a:avLst/>
+                </a:prstGeom>
                 <a:solidFill>
                   <a:srgbClr val="A83EA3"/>
                 </a:solidFill>
-              </a:ln>
-            </p:spPr>
-            <p:style>
-              <a:lnRef idx="2">
-                <a:schemeClr val="accent1">
-                  <a:shade val="50000"/>
-                </a:schemeClr>
-              </a:lnRef>
-              <a:fillRef idx="1">
-                <a:schemeClr val="accent1"/>
-              </a:fillRef>
-              <a:effectRef idx="0">
-                <a:schemeClr val="accent1"/>
-              </a:effectRef>
-              <a:fontRef idx="minor">
-                <a:schemeClr val="lt1"/>
-              </a:fontRef>
-            </p:style>
-            <p:txBody>
-              <a:bodyPr rtlCol="0" anchor="ctr"/>
-              <a:lstStyle/>
-              <a:p>
-                <a:pPr algn="ctr"/>
-                <a:endParaRPr lang="zh-CN" altLang="en-US"/>
-              </a:p>
-            </p:txBody>
-          </p:sp>
+                <a:ln w="28575">
+                  <a:solidFill>
+                    <a:srgbClr val="A83EA3"/>
+                  </a:solidFill>
+                </a:ln>
+              </p:spPr>
+              <p:style>
+                <a:lnRef idx="2">
+                  <a:schemeClr val="accent1">
+                    <a:shade val="50000"/>
+                  </a:schemeClr>
+                </a:lnRef>
+                <a:fillRef idx="1">
+                  <a:schemeClr val="accent1"/>
+                </a:fillRef>
+                <a:effectRef idx="0">
+                  <a:schemeClr val="accent1"/>
+                </a:effectRef>
+                <a:fontRef idx="minor">
+                  <a:schemeClr val="lt1"/>
+                </a:fontRef>
+              </p:style>
+              <p:txBody>
+                <a:bodyPr rtlCol="0" anchor="ctr"/>
+                <a:lstStyle/>
+                <a:p>
+                  <a:pPr algn="ctr"/>
+                  <a:endParaRPr lang="zh-CN" altLang="en-US" dirty="0"/>
+                </a:p>
+              </p:txBody>
+            </p:sp>
+            <p:sp>
+              <p:nvSpPr>
+                <p:cNvPr id="88" name="矩形 87"/>
+                <p:cNvSpPr/>
+                <p:nvPr/>
+              </p:nvSpPr>
+              <p:spPr>
+                <a:xfrm>
+                  <a:off x="8430726" y="3079318"/>
+                  <a:ext cx="216000" cy="216000"/>
+                </a:xfrm>
+                <a:prstGeom prst="rect">
+                  <a:avLst/>
+                </a:prstGeom>
+                <a:solidFill>
+                  <a:srgbClr val="A83EA3"/>
+                </a:solidFill>
+                <a:ln w="28575">
+                  <a:solidFill>
+                    <a:srgbClr val="A83EA3"/>
+                  </a:solidFill>
+                </a:ln>
+              </p:spPr>
+              <p:style>
+                <a:lnRef idx="2">
+                  <a:schemeClr val="accent1">
+                    <a:shade val="50000"/>
+                  </a:schemeClr>
+                </a:lnRef>
+                <a:fillRef idx="1">
+                  <a:schemeClr val="accent1"/>
+                </a:fillRef>
+                <a:effectRef idx="0">
+                  <a:schemeClr val="accent1"/>
+                </a:effectRef>
+                <a:fontRef idx="minor">
+                  <a:schemeClr val="lt1"/>
+                </a:fontRef>
+              </p:style>
+              <p:txBody>
+                <a:bodyPr rtlCol="0" anchor="ctr"/>
+                <a:lstStyle/>
+                <a:p>
+                  <a:pPr algn="ctr"/>
+                  <a:endParaRPr lang="zh-CN" altLang="en-US" dirty="0"/>
+                </a:p>
+              </p:txBody>
+            </p:sp>
+            <p:sp>
+              <p:nvSpPr>
+                <p:cNvPr id="89" name="矩形 88"/>
+                <p:cNvSpPr/>
+                <p:nvPr/>
+              </p:nvSpPr>
+              <p:spPr>
+                <a:xfrm>
+                  <a:off x="8808824" y="3079318"/>
+                  <a:ext cx="216000" cy="216000"/>
+                </a:xfrm>
+                <a:prstGeom prst="rect">
+                  <a:avLst/>
+                </a:prstGeom>
+                <a:solidFill>
+                  <a:srgbClr val="A83EA3"/>
+                </a:solidFill>
+                <a:ln w="28575">
+                  <a:solidFill>
+                    <a:srgbClr val="A83EA3"/>
+                  </a:solidFill>
+                </a:ln>
+              </p:spPr>
+              <p:style>
+                <a:lnRef idx="2">
+                  <a:schemeClr val="accent1">
+                    <a:shade val="50000"/>
+                  </a:schemeClr>
+                </a:lnRef>
+                <a:fillRef idx="1">
+                  <a:schemeClr val="accent1"/>
+                </a:fillRef>
+                <a:effectRef idx="0">
+                  <a:schemeClr val="accent1"/>
+                </a:effectRef>
+                <a:fontRef idx="minor">
+                  <a:schemeClr val="lt1"/>
+                </a:fontRef>
+              </p:style>
+              <p:txBody>
+                <a:bodyPr rtlCol="0" anchor="ctr"/>
+                <a:lstStyle/>
+                <a:p>
+                  <a:pPr algn="ctr"/>
+                  <a:endParaRPr lang="zh-CN" altLang="en-US" dirty="0"/>
+                </a:p>
+              </p:txBody>
+            </p:sp>
+            <p:sp>
+              <p:nvSpPr>
+                <p:cNvPr id="90" name="矩形 89"/>
+                <p:cNvSpPr/>
+                <p:nvPr/>
+              </p:nvSpPr>
+              <p:spPr>
+                <a:xfrm>
+                  <a:off x="9186921" y="3079318"/>
+                  <a:ext cx="216000" cy="216000"/>
+                </a:xfrm>
+                <a:prstGeom prst="rect">
+                  <a:avLst/>
+                </a:prstGeom>
+                <a:solidFill>
+                  <a:srgbClr val="A83EA3"/>
+                </a:solidFill>
+                <a:ln w="28575">
+                  <a:solidFill>
+                    <a:srgbClr val="A83EA3"/>
+                  </a:solidFill>
+                </a:ln>
+              </p:spPr>
+              <p:style>
+                <a:lnRef idx="2">
+                  <a:schemeClr val="accent1">
+                    <a:shade val="50000"/>
+                  </a:schemeClr>
+                </a:lnRef>
+                <a:fillRef idx="1">
+                  <a:schemeClr val="accent1"/>
+                </a:fillRef>
+                <a:effectRef idx="0">
+                  <a:schemeClr val="accent1"/>
+                </a:effectRef>
+                <a:fontRef idx="minor">
+                  <a:schemeClr val="lt1"/>
+                </a:fontRef>
+              </p:style>
+              <p:txBody>
+                <a:bodyPr rtlCol="0" anchor="ctr"/>
+                <a:lstStyle/>
+                <a:p>
+                  <a:pPr algn="ctr"/>
+                  <a:endParaRPr lang="zh-CN" altLang="en-US" dirty="0"/>
+                </a:p>
+              </p:txBody>
+            </p:sp>
+            <p:sp>
+              <p:nvSpPr>
+                <p:cNvPr id="91" name="矩形 90"/>
+                <p:cNvSpPr/>
+                <p:nvPr/>
+              </p:nvSpPr>
+              <p:spPr>
+                <a:xfrm>
+                  <a:off x="9565018" y="3079318"/>
+                  <a:ext cx="216000" cy="216000"/>
+                </a:xfrm>
+                <a:prstGeom prst="rect">
+                  <a:avLst/>
+                </a:prstGeom>
+                <a:solidFill>
+                  <a:srgbClr val="A83EA3"/>
+                </a:solidFill>
+                <a:ln w="28575">
+                  <a:solidFill>
+                    <a:srgbClr val="A83EA3"/>
+                  </a:solidFill>
+                </a:ln>
+              </p:spPr>
+              <p:style>
+                <a:lnRef idx="2">
+                  <a:schemeClr val="accent1">
+                    <a:shade val="50000"/>
+                  </a:schemeClr>
+                </a:lnRef>
+                <a:fillRef idx="1">
+                  <a:schemeClr val="accent1"/>
+                </a:fillRef>
+                <a:effectRef idx="0">
+                  <a:schemeClr val="accent1"/>
+                </a:effectRef>
+                <a:fontRef idx="minor">
+                  <a:schemeClr val="lt1"/>
+                </a:fontRef>
+              </p:style>
+              <p:txBody>
+                <a:bodyPr rtlCol="0" anchor="ctr"/>
+                <a:lstStyle/>
+                <a:p>
+                  <a:pPr algn="ctr"/>
+                  <a:endParaRPr lang="zh-CN" altLang="en-US" dirty="0"/>
+                </a:p>
+              </p:txBody>
+            </p:sp>
+            <p:sp>
+              <p:nvSpPr>
+                <p:cNvPr id="92" name="矩形 91"/>
+                <p:cNvSpPr/>
+                <p:nvPr/>
+              </p:nvSpPr>
+              <p:spPr>
+                <a:xfrm>
+                  <a:off x="9943115" y="3079318"/>
+                  <a:ext cx="216000" cy="216000"/>
+                </a:xfrm>
+                <a:prstGeom prst="rect">
+                  <a:avLst/>
+                </a:prstGeom>
+                <a:solidFill>
+                  <a:srgbClr val="A83EA3"/>
+                </a:solidFill>
+                <a:ln w="28575">
+                  <a:solidFill>
+                    <a:srgbClr val="A83EA3"/>
+                  </a:solidFill>
+                </a:ln>
+              </p:spPr>
+              <p:style>
+                <a:lnRef idx="2">
+                  <a:schemeClr val="accent1">
+                    <a:shade val="50000"/>
+                  </a:schemeClr>
+                </a:lnRef>
+                <a:fillRef idx="1">
+                  <a:schemeClr val="accent1"/>
+                </a:fillRef>
+                <a:effectRef idx="0">
+                  <a:schemeClr val="accent1"/>
+                </a:effectRef>
+                <a:fontRef idx="minor">
+                  <a:schemeClr val="lt1"/>
+                </a:fontRef>
+              </p:style>
+              <p:txBody>
+                <a:bodyPr rtlCol="0" anchor="ctr"/>
+                <a:lstStyle/>
+                <a:p>
+                  <a:pPr algn="ctr"/>
+                  <a:endParaRPr lang="zh-CN" altLang="en-US" dirty="0"/>
+                </a:p>
+              </p:txBody>
+            </p:sp>
+            <p:sp>
+              <p:nvSpPr>
+                <p:cNvPr id="93" name="矩形 92"/>
+                <p:cNvSpPr/>
+                <p:nvPr/>
+              </p:nvSpPr>
+              <p:spPr>
+                <a:xfrm>
+                  <a:off x="10321213" y="3079318"/>
+                  <a:ext cx="216000" cy="216000"/>
+                </a:xfrm>
+                <a:prstGeom prst="rect">
+                  <a:avLst/>
+                </a:prstGeom>
+                <a:solidFill>
+                  <a:srgbClr val="A83EA3"/>
+                </a:solidFill>
+                <a:ln w="28575">
+                  <a:solidFill>
+                    <a:srgbClr val="A83EA3"/>
+                  </a:solidFill>
+                </a:ln>
+              </p:spPr>
+              <p:style>
+                <a:lnRef idx="2">
+                  <a:schemeClr val="accent1">
+                    <a:shade val="50000"/>
+                  </a:schemeClr>
+                </a:lnRef>
+                <a:fillRef idx="1">
+                  <a:schemeClr val="accent1"/>
+                </a:fillRef>
+                <a:effectRef idx="0">
+                  <a:schemeClr val="accent1"/>
+                </a:effectRef>
+                <a:fontRef idx="minor">
+                  <a:schemeClr val="lt1"/>
+                </a:fontRef>
+              </p:style>
+              <p:txBody>
+                <a:bodyPr rtlCol="0" anchor="ctr"/>
+                <a:lstStyle/>
+                <a:p>
+                  <a:pPr algn="ctr"/>
+                  <a:endParaRPr lang="zh-CN" altLang="en-US" dirty="0"/>
+                </a:p>
+              </p:txBody>
+            </p:sp>
+          </p:grpSp>
         </p:grpSp>
-        <p:grpSp>
-          <p:nvGrpSpPr>
-            <p:cNvPr id="96" name="组合 95"/>
-            <p:cNvGrpSpPr/>
+        <p:sp>
+          <p:nvSpPr>
+            <p:cNvPr id="3" name="文本框 2"/>
+            <p:cNvSpPr txBox="1"/>
             <p:nvPr/>
-          </p:nvGrpSpPr>
-          <p:grpSpPr>
+          </p:nvSpPr>
+          <p:spPr>
+            <a:xfrm rot="5400000">
+              <a:off x="8533761" y="4143091"/>
+              <a:ext cx="1473200" cy="646331"/>
+            </a:xfrm>
+            <a:prstGeom prst="rect">
+              <a:avLst/>
+            </a:prstGeom>
+            <a:noFill/>
+          </p:spPr>
+          <p:txBody>
+            <a:bodyPr wrap="square" rtlCol="0">
+              <a:spAutoFit/>
+            </a:bodyPr>
+            <a:lstStyle/>
+            <a:p>
+              <a:pPr algn="ctr"/>
+              <a:r>
+                <a:rPr lang="en-US" altLang="zh-CN" sz="3600" b="1" dirty="0" smtClean="0">
+                  <a:solidFill>
+                    <a:srgbClr val="A83EA3"/>
+                  </a:solidFill>
+                  <a:latin typeface="Calibri" panose="020F0502020204030204" pitchFamily="34" charset="0"/>
+                  <a:ea typeface="Calibri" panose="020F0502020204030204" pitchFamily="34" charset="0"/>
+                  <a:cs typeface="Calibri" panose="020F0502020204030204" pitchFamily="34" charset="0"/>
+                </a:rPr>
+                <a:t>…… </a:t>
+              </a:r>
+              <a:endParaRPr lang="zh-CN" altLang="en-US" sz="3600" b="1" dirty="0">
+                <a:solidFill>
+                  <a:srgbClr val="A83EA3"/>
+                </a:solidFill>
+                <a:latin typeface="Calibri" panose="020F0502020204030204" pitchFamily="34" charset="0"/>
+                <a:ea typeface="Calibri" panose="020F0502020204030204" pitchFamily="34" charset="0"/>
+                <a:cs typeface="Calibri" panose="020F0502020204030204" pitchFamily="34" charset="0"/>
+              </a:endParaRPr>
+            </a:p>
+          </p:txBody>
+        </p:sp>
+        <p:sp>
+          <p:nvSpPr>
+            <p:cNvPr id="4" name="矩形 3"/>
+            <p:cNvSpPr/>
+            <p:nvPr/>
+          </p:nvSpPr>
+          <p:spPr>
             <a:xfrm>
-              <a:off x="7674532" y="5672058"/>
-              <a:ext cx="2862681" cy="216000"/>
-              <a:chOff x="7687402" y="5621065"/>
-              <a:chExt cx="2862681" cy="216000"/>
+              <a:off x="9386901" y="4087351"/>
+              <a:ext cx="718466" cy="646331"/>
             </a:xfrm>
-          </p:grpSpPr>
-          <p:sp>
-            <p:nvSpPr>
-              <p:cNvPr id="74" name="矩形 73"/>
-              <p:cNvSpPr/>
-              <p:nvPr/>
-            </p:nvSpPr>
-            <p:spPr>
-              <a:xfrm>
-                <a:off x="7687402" y="5621065"/>
-                <a:ext cx="216000" cy="216000"/>
-              </a:xfrm>
-              <a:prstGeom prst="rect">
-                <a:avLst/>
-              </a:prstGeom>
+            <a:prstGeom prst="rect">
+              <a:avLst/>
+            </a:prstGeom>
+          </p:spPr>
+          <p:txBody>
+            <a:bodyPr wrap="none">
+              <a:spAutoFit/>
+            </a:bodyPr>
+            <a:lstStyle/>
+            <a:p>
+              <a:pPr algn="ctr"/>
+              <a:r>
+                <a:rPr lang="en-US" altLang="zh-CN" sz="3600" b="1" dirty="0">
+                  <a:solidFill>
+                    <a:srgbClr val="A83EA3"/>
+                  </a:solidFill>
+                  <a:latin typeface="Calibri" panose="020F0502020204030204" pitchFamily="34" charset="0"/>
+                  <a:ea typeface="Calibri" panose="020F0502020204030204" pitchFamily="34" charset="0"/>
+                  <a:cs typeface="Calibri" panose="020F0502020204030204" pitchFamily="34" charset="0"/>
+                </a:rPr>
+                <a:t>×N</a:t>
+              </a:r>
+              <a:endParaRPr lang="zh-CN" altLang="en-US" sz="3600" b="1" dirty="0">
+                <a:solidFill>
+                  <a:srgbClr val="A83EA3"/>
+                </a:solidFill>
+                <a:latin typeface="Calibri" panose="020F0502020204030204" pitchFamily="34" charset="0"/>
+                <a:ea typeface="Calibri" panose="020F0502020204030204" pitchFamily="34" charset="0"/>
+                <a:cs typeface="Calibri" panose="020F0502020204030204" pitchFamily="34" charset="0"/>
+              </a:endParaRPr>
+            </a:p>
+          </p:txBody>
+        </p:sp>
+        <p:sp>
+          <p:nvSpPr>
+            <p:cNvPr id="51" name="矩形 50"/>
+            <p:cNvSpPr/>
+            <p:nvPr/>
+          </p:nvSpPr>
+          <p:spPr>
+            <a:xfrm>
+              <a:off x="7674532" y="3470833"/>
+              <a:ext cx="2879994" cy="445501"/>
+            </a:xfrm>
+            <a:prstGeom prst="rect">
+              <a:avLst/>
+            </a:prstGeom>
+            <a:noFill/>
+            <a:ln w="28575">
               <a:solidFill>
                 <a:srgbClr val="A83EA3"/>
               </a:solidFill>
-              <a:ln w="28575">
-                <a:solidFill>
-                  <a:srgbClr val="A83EA3"/>
-                </a:solidFill>
-              </a:ln>
-            </p:spPr>
-            <p:style>
-              <a:lnRef idx="2">
-                <a:schemeClr val="accent1">
-                  <a:shade val="50000"/>
-                </a:schemeClr>
-              </a:lnRef>
-              <a:fillRef idx="1">
-                <a:schemeClr val="accent1"/>
-              </a:fillRef>
-              <a:effectRef idx="0">
-                <a:schemeClr val="accent1"/>
-              </a:effectRef>
-              <a:fontRef idx="minor">
-                <a:schemeClr val="lt1"/>
-              </a:fontRef>
-            </p:style>
-            <p:txBody>
-              <a:bodyPr rtlCol="0" anchor="ctr"/>
-              <a:lstStyle/>
-              <a:p>
-                <a:pPr algn="ctr"/>
-                <a:endParaRPr lang="zh-CN" altLang="en-US" dirty="0"/>
-              </a:p>
-            </p:txBody>
-          </p:sp>
-          <p:sp>
-            <p:nvSpPr>
-              <p:cNvPr id="75" name="矩形 74"/>
-              <p:cNvSpPr/>
-              <p:nvPr/>
-            </p:nvSpPr>
-            <p:spPr>
-              <a:xfrm>
-                <a:off x="8065499" y="5621065"/>
-                <a:ext cx="216000" cy="216000"/>
-              </a:xfrm>
-              <a:prstGeom prst="rect">
-                <a:avLst/>
-              </a:prstGeom>
-              <a:solidFill>
-                <a:srgbClr val="A83EA3"/>
-              </a:solidFill>
-              <a:ln w="28575">
-                <a:solidFill>
-                  <a:srgbClr val="A83EA3"/>
-                </a:solidFill>
-              </a:ln>
-            </p:spPr>
-            <p:style>
-              <a:lnRef idx="2">
-                <a:schemeClr val="accent1">
-                  <a:shade val="50000"/>
-                </a:schemeClr>
-              </a:lnRef>
-              <a:fillRef idx="1">
-                <a:schemeClr val="accent1"/>
-              </a:fillRef>
-              <a:effectRef idx="0">
-                <a:schemeClr val="accent1"/>
-              </a:effectRef>
-              <a:fontRef idx="minor">
-                <a:schemeClr val="lt1"/>
-              </a:fontRef>
-            </p:style>
-            <p:txBody>
-              <a:bodyPr rtlCol="0" anchor="ctr"/>
-              <a:lstStyle/>
-              <a:p>
-                <a:pPr algn="ctr"/>
-                <a:endParaRPr lang="zh-CN" altLang="en-US" dirty="0"/>
-              </a:p>
-            </p:txBody>
-          </p:sp>
-          <p:sp>
-            <p:nvSpPr>
-              <p:cNvPr id="76" name="矩形 75"/>
-              <p:cNvSpPr/>
-              <p:nvPr/>
-            </p:nvSpPr>
-            <p:spPr>
-              <a:xfrm>
-                <a:off x="8443596" y="5621065"/>
-                <a:ext cx="216000" cy="216000"/>
-              </a:xfrm>
-              <a:prstGeom prst="rect">
-                <a:avLst/>
-              </a:prstGeom>
-              <a:solidFill>
-                <a:srgbClr val="A83EA3"/>
-              </a:solidFill>
-              <a:ln w="28575">
-                <a:solidFill>
-                  <a:srgbClr val="A83EA3"/>
-                </a:solidFill>
-              </a:ln>
-            </p:spPr>
-            <p:style>
-              <a:lnRef idx="2">
-                <a:schemeClr val="accent1">
-                  <a:shade val="50000"/>
-                </a:schemeClr>
-              </a:lnRef>
-              <a:fillRef idx="1">
-                <a:schemeClr val="accent1"/>
-              </a:fillRef>
-              <a:effectRef idx="0">
-                <a:schemeClr val="accent1"/>
-              </a:effectRef>
-              <a:fontRef idx="minor">
-                <a:schemeClr val="lt1"/>
-              </a:fontRef>
-            </p:style>
-            <p:txBody>
-              <a:bodyPr rtlCol="0" anchor="ctr"/>
-              <a:lstStyle/>
-              <a:p>
-                <a:pPr algn="ctr"/>
-                <a:endParaRPr lang="zh-CN" altLang="en-US" dirty="0"/>
-              </a:p>
-            </p:txBody>
-          </p:sp>
-          <p:sp>
-            <p:nvSpPr>
-              <p:cNvPr id="77" name="矩形 76"/>
-              <p:cNvSpPr/>
-              <p:nvPr/>
-            </p:nvSpPr>
-            <p:spPr>
-              <a:xfrm>
-                <a:off x="8821694" y="5621065"/>
-                <a:ext cx="216000" cy="216000"/>
-              </a:xfrm>
-              <a:prstGeom prst="rect">
-                <a:avLst/>
-              </a:prstGeom>
-              <a:solidFill>
-                <a:srgbClr val="A83EA3"/>
-              </a:solidFill>
-              <a:ln w="28575">
-                <a:solidFill>
-                  <a:srgbClr val="A83EA3"/>
-                </a:solidFill>
-              </a:ln>
-            </p:spPr>
-            <p:style>
-              <a:lnRef idx="2">
-                <a:schemeClr val="accent1">
-                  <a:shade val="50000"/>
-                </a:schemeClr>
-              </a:lnRef>
-              <a:fillRef idx="1">
-                <a:schemeClr val="accent1"/>
-              </a:fillRef>
-              <a:effectRef idx="0">
-                <a:schemeClr val="accent1"/>
-              </a:effectRef>
-              <a:fontRef idx="minor">
-                <a:schemeClr val="lt1"/>
-              </a:fontRef>
-            </p:style>
-            <p:txBody>
-              <a:bodyPr rtlCol="0" anchor="ctr"/>
-              <a:lstStyle/>
-              <a:p>
-                <a:pPr algn="ctr"/>
-                <a:endParaRPr lang="zh-CN" altLang="en-US" dirty="0"/>
-              </a:p>
-            </p:txBody>
-          </p:sp>
-          <p:sp>
-            <p:nvSpPr>
-              <p:cNvPr id="78" name="矩形 77"/>
-              <p:cNvSpPr/>
-              <p:nvPr/>
-            </p:nvSpPr>
-            <p:spPr>
-              <a:xfrm>
-                <a:off x="9199791" y="5621065"/>
-                <a:ext cx="216000" cy="216000"/>
-              </a:xfrm>
-              <a:prstGeom prst="rect">
-                <a:avLst/>
-              </a:prstGeom>
-              <a:solidFill>
-                <a:srgbClr val="A83EA3"/>
-              </a:solidFill>
-              <a:ln w="28575">
-                <a:solidFill>
-                  <a:srgbClr val="A83EA3"/>
-                </a:solidFill>
-              </a:ln>
-            </p:spPr>
-            <p:style>
-              <a:lnRef idx="2">
-                <a:schemeClr val="accent1">
-                  <a:shade val="50000"/>
-                </a:schemeClr>
-              </a:lnRef>
-              <a:fillRef idx="1">
-                <a:schemeClr val="accent1"/>
-              </a:fillRef>
-              <a:effectRef idx="0">
-                <a:schemeClr val="accent1"/>
-              </a:effectRef>
-              <a:fontRef idx="minor">
-                <a:schemeClr val="lt1"/>
-              </a:fontRef>
-            </p:style>
-            <p:txBody>
-              <a:bodyPr rtlCol="0" anchor="ctr"/>
-              <a:lstStyle/>
-              <a:p>
-                <a:pPr algn="ctr"/>
-                <a:endParaRPr lang="zh-CN" altLang="en-US" dirty="0"/>
-              </a:p>
-            </p:txBody>
-          </p:sp>
-          <p:sp>
-            <p:nvSpPr>
-              <p:cNvPr id="79" name="矩形 78"/>
-              <p:cNvSpPr/>
-              <p:nvPr/>
-            </p:nvSpPr>
-            <p:spPr>
-              <a:xfrm>
-                <a:off x="9577888" y="5621065"/>
-                <a:ext cx="216000" cy="216000"/>
-              </a:xfrm>
-              <a:prstGeom prst="rect">
-                <a:avLst/>
-              </a:prstGeom>
-              <a:solidFill>
-                <a:srgbClr val="A83EA3"/>
-              </a:solidFill>
-              <a:ln w="28575">
-                <a:solidFill>
-                  <a:srgbClr val="A83EA3"/>
-                </a:solidFill>
-              </a:ln>
-            </p:spPr>
-            <p:style>
-              <a:lnRef idx="2">
-                <a:schemeClr val="accent1">
-                  <a:shade val="50000"/>
-                </a:schemeClr>
-              </a:lnRef>
-              <a:fillRef idx="1">
-                <a:schemeClr val="accent1"/>
-              </a:fillRef>
-              <a:effectRef idx="0">
-                <a:schemeClr val="accent1"/>
-              </a:effectRef>
-              <a:fontRef idx="minor">
-                <a:schemeClr val="lt1"/>
-              </a:fontRef>
-            </p:style>
-            <p:txBody>
-              <a:bodyPr rtlCol="0" anchor="ctr"/>
-              <a:lstStyle/>
-              <a:p>
-                <a:pPr algn="ctr"/>
-                <a:endParaRPr lang="zh-CN" altLang="en-US" dirty="0"/>
-              </a:p>
-            </p:txBody>
-          </p:sp>
-          <p:sp>
-            <p:nvSpPr>
-              <p:cNvPr id="80" name="矩形 79"/>
-              <p:cNvSpPr/>
-              <p:nvPr/>
-            </p:nvSpPr>
-            <p:spPr>
-              <a:xfrm>
-                <a:off x="9955985" y="5621065"/>
-                <a:ext cx="216000" cy="216000"/>
-              </a:xfrm>
-              <a:prstGeom prst="rect">
-                <a:avLst/>
-              </a:prstGeom>
-              <a:solidFill>
-                <a:srgbClr val="A83EA3"/>
-              </a:solidFill>
-              <a:ln w="28575">
-                <a:solidFill>
-                  <a:srgbClr val="A83EA3"/>
-                </a:solidFill>
-              </a:ln>
-            </p:spPr>
-            <p:style>
-              <a:lnRef idx="2">
-                <a:schemeClr val="accent1">
-                  <a:shade val="50000"/>
-                </a:schemeClr>
-              </a:lnRef>
-              <a:fillRef idx="1">
-                <a:schemeClr val="accent1"/>
-              </a:fillRef>
-              <a:effectRef idx="0">
-                <a:schemeClr val="accent1"/>
-              </a:effectRef>
-              <a:fontRef idx="minor">
-                <a:schemeClr val="lt1"/>
-              </a:fontRef>
-            </p:style>
-            <p:txBody>
-              <a:bodyPr rtlCol="0" anchor="ctr"/>
-              <a:lstStyle/>
-              <a:p>
-                <a:pPr algn="ctr"/>
-                <a:endParaRPr lang="zh-CN" altLang="en-US" dirty="0"/>
-              </a:p>
-            </p:txBody>
-          </p:sp>
-          <p:sp>
-            <p:nvSpPr>
-              <p:cNvPr id="81" name="矩形 80"/>
-              <p:cNvSpPr/>
-              <p:nvPr/>
-            </p:nvSpPr>
-            <p:spPr>
-              <a:xfrm>
-                <a:off x="10334083" y="5621065"/>
-                <a:ext cx="216000" cy="216000"/>
-              </a:xfrm>
-              <a:prstGeom prst="rect">
-                <a:avLst/>
-              </a:prstGeom>
-              <a:solidFill>
-                <a:srgbClr val="A83EA3"/>
-              </a:solidFill>
-              <a:ln w="28575">
-                <a:solidFill>
-                  <a:srgbClr val="A83EA3"/>
-                </a:solidFill>
-              </a:ln>
-            </p:spPr>
-            <p:style>
-              <a:lnRef idx="2">
-                <a:schemeClr val="accent1">
-                  <a:shade val="50000"/>
-                </a:schemeClr>
-              </a:lnRef>
-              <a:fillRef idx="1">
-                <a:schemeClr val="accent1"/>
-              </a:fillRef>
-              <a:effectRef idx="0">
-                <a:schemeClr val="accent1"/>
-              </a:effectRef>
-              <a:fontRef idx="minor">
-                <a:schemeClr val="lt1"/>
-              </a:fontRef>
-            </p:style>
-            <p:txBody>
-              <a:bodyPr rtlCol="0" anchor="ctr"/>
-              <a:lstStyle/>
-              <a:p>
-                <a:pPr algn="ctr"/>
-                <a:endParaRPr lang="zh-CN" altLang="en-US" dirty="0"/>
-              </a:p>
-            </p:txBody>
-          </p:sp>
-        </p:grpSp>
-        <p:grpSp>
-          <p:nvGrpSpPr>
-            <p:cNvPr id="95" name="组合 94"/>
-            <p:cNvGrpSpPr/>
-            <p:nvPr/>
-          </p:nvGrpSpPr>
-          <p:grpSpPr>
-            <a:xfrm>
-              <a:off x="7674532" y="3079318"/>
-              <a:ext cx="2862681" cy="216000"/>
-              <a:chOff x="7674532" y="3079318"/>
-              <a:chExt cx="2862681" cy="216000"/>
-            </a:xfrm>
-          </p:grpSpPr>
-          <p:sp>
-            <p:nvSpPr>
-              <p:cNvPr id="86" name="矩形 85"/>
-              <p:cNvSpPr/>
-              <p:nvPr/>
-            </p:nvSpPr>
-            <p:spPr>
-              <a:xfrm>
-                <a:off x="7674532" y="3079318"/>
-                <a:ext cx="216000" cy="216000"/>
-              </a:xfrm>
-              <a:prstGeom prst="rect">
-                <a:avLst/>
-              </a:prstGeom>
-              <a:solidFill>
-                <a:srgbClr val="A83EA3"/>
-              </a:solidFill>
-              <a:ln w="28575">
-                <a:solidFill>
-                  <a:srgbClr val="A83EA3"/>
-                </a:solidFill>
-              </a:ln>
-            </p:spPr>
-            <p:style>
-              <a:lnRef idx="2">
-                <a:schemeClr val="accent1">
-                  <a:shade val="50000"/>
-                </a:schemeClr>
-              </a:lnRef>
-              <a:fillRef idx="1">
-                <a:schemeClr val="accent1"/>
-              </a:fillRef>
-              <a:effectRef idx="0">
-                <a:schemeClr val="accent1"/>
-              </a:effectRef>
-              <a:fontRef idx="minor">
-                <a:schemeClr val="lt1"/>
-              </a:fontRef>
-            </p:style>
-            <p:txBody>
-              <a:bodyPr rtlCol="0" anchor="ctr"/>
-              <a:lstStyle/>
-              <a:p>
-                <a:pPr algn="ctr"/>
-                <a:endParaRPr lang="zh-CN" altLang="en-US" dirty="0"/>
-              </a:p>
-            </p:txBody>
-          </p:sp>
-          <p:sp>
-            <p:nvSpPr>
-              <p:cNvPr id="87" name="矩形 86"/>
-              <p:cNvSpPr/>
-              <p:nvPr/>
-            </p:nvSpPr>
-            <p:spPr>
-              <a:xfrm>
-                <a:off x="8052629" y="3079318"/>
-                <a:ext cx="216000" cy="216000"/>
-              </a:xfrm>
-              <a:prstGeom prst="rect">
-                <a:avLst/>
-              </a:prstGeom>
-              <a:solidFill>
-                <a:srgbClr val="A83EA3"/>
-              </a:solidFill>
-              <a:ln w="28575">
-                <a:solidFill>
-                  <a:srgbClr val="A83EA3"/>
-                </a:solidFill>
-              </a:ln>
-            </p:spPr>
-            <p:style>
-              <a:lnRef idx="2">
-                <a:schemeClr val="accent1">
-                  <a:shade val="50000"/>
-                </a:schemeClr>
-              </a:lnRef>
-              <a:fillRef idx="1">
-                <a:schemeClr val="accent1"/>
-              </a:fillRef>
-              <a:effectRef idx="0">
-                <a:schemeClr val="accent1"/>
-              </a:effectRef>
-              <a:fontRef idx="minor">
-                <a:schemeClr val="lt1"/>
-              </a:fontRef>
-            </p:style>
-            <p:txBody>
-              <a:bodyPr rtlCol="0" anchor="ctr"/>
-              <a:lstStyle/>
-              <a:p>
-                <a:pPr algn="ctr"/>
-                <a:endParaRPr lang="zh-CN" altLang="en-US" dirty="0"/>
-              </a:p>
-            </p:txBody>
-          </p:sp>
-          <p:sp>
-            <p:nvSpPr>
-              <p:cNvPr id="88" name="矩形 87"/>
-              <p:cNvSpPr/>
-              <p:nvPr/>
-            </p:nvSpPr>
-            <p:spPr>
-              <a:xfrm>
-                <a:off x="8430726" y="3079318"/>
-                <a:ext cx="216000" cy="216000"/>
-              </a:xfrm>
-              <a:prstGeom prst="rect">
-                <a:avLst/>
-              </a:prstGeom>
-              <a:solidFill>
-                <a:srgbClr val="A83EA3"/>
-              </a:solidFill>
-              <a:ln w="28575">
-                <a:solidFill>
-                  <a:srgbClr val="A83EA3"/>
-                </a:solidFill>
-              </a:ln>
-            </p:spPr>
-            <p:style>
-              <a:lnRef idx="2">
-                <a:schemeClr val="accent1">
-                  <a:shade val="50000"/>
-                </a:schemeClr>
-              </a:lnRef>
-              <a:fillRef idx="1">
-                <a:schemeClr val="accent1"/>
-              </a:fillRef>
-              <a:effectRef idx="0">
-                <a:schemeClr val="accent1"/>
-              </a:effectRef>
-              <a:fontRef idx="minor">
-                <a:schemeClr val="lt1"/>
-              </a:fontRef>
-            </p:style>
-            <p:txBody>
-              <a:bodyPr rtlCol="0" anchor="ctr"/>
-              <a:lstStyle/>
-              <a:p>
-                <a:pPr algn="ctr"/>
-                <a:endParaRPr lang="zh-CN" altLang="en-US" dirty="0"/>
-              </a:p>
-            </p:txBody>
-          </p:sp>
-          <p:sp>
-            <p:nvSpPr>
-              <p:cNvPr id="89" name="矩形 88"/>
-              <p:cNvSpPr/>
-              <p:nvPr/>
-            </p:nvSpPr>
-            <p:spPr>
-              <a:xfrm>
-                <a:off x="8808824" y="3079318"/>
-                <a:ext cx="216000" cy="216000"/>
-              </a:xfrm>
-              <a:prstGeom prst="rect">
-                <a:avLst/>
-              </a:prstGeom>
-              <a:solidFill>
-                <a:srgbClr val="A83EA3"/>
-              </a:solidFill>
-              <a:ln w="28575">
-                <a:solidFill>
-                  <a:srgbClr val="A83EA3"/>
-                </a:solidFill>
-              </a:ln>
-            </p:spPr>
-            <p:style>
-              <a:lnRef idx="2">
-                <a:schemeClr val="accent1">
-                  <a:shade val="50000"/>
-                </a:schemeClr>
-              </a:lnRef>
-              <a:fillRef idx="1">
-                <a:schemeClr val="accent1"/>
-              </a:fillRef>
-              <a:effectRef idx="0">
-                <a:schemeClr val="accent1"/>
-              </a:effectRef>
-              <a:fontRef idx="minor">
-                <a:schemeClr val="lt1"/>
-              </a:fontRef>
-            </p:style>
-            <p:txBody>
-              <a:bodyPr rtlCol="0" anchor="ctr"/>
-              <a:lstStyle/>
-              <a:p>
-                <a:pPr algn="ctr"/>
-                <a:endParaRPr lang="zh-CN" altLang="en-US" dirty="0"/>
-              </a:p>
-            </p:txBody>
-          </p:sp>
-          <p:sp>
-            <p:nvSpPr>
-              <p:cNvPr id="90" name="矩形 89"/>
-              <p:cNvSpPr/>
-              <p:nvPr/>
-            </p:nvSpPr>
-            <p:spPr>
-              <a:xfrm>
-                <a:off x="9186921" y="3079318"/>
-                <a:ext cx="216000" cy="216000"/>
-              </a:xfrm>
-              <a:prstGeom prst="rect">
-                <a:avLst/>
-              </a:prstGeom>
-              <a:solidFill>
-                <a:srgbClr val="A83EA3"/>
-              </a:solidFill>
-              <a:ln w="28575">
-                <a:solidFill>
-                  <a:srgbClr val="A83EA3"/>
-                </a:solidFill>
-              </a:ln>
-            </p:spPr>
-            <p:style>
-              <a:lnRef idx="2">
-                <a:schemeClr val="accent1">
-                  <a:shade val="50000"/>
-                </a:schemeClr>
-              </a:lnRef>
-              <a:fillRef idx="1">
-                <a:schemeClr val="accent1"/>
-              </a:fillRef>
-              <a:effectRef idx="0">
-                <a:schemeClr val="accent1"/>
-              </a:effectRef>
-              <a:fontRef idx="minor">
-                <a:schemeClr val="lt1"/>
-              </a:fontRef>
-            </p:style>
-            <p:txBody>
-              <a:bodyPr rtlCol="0" anchor="ctr"/>
-              <a:lstStyle/>
-              <a:p>
-                <a:pPr algn="ctr"/>
-                <a:endParaRPr lang="zh-CN" altLang="en-US" dirty="0"/>
-              </a:p>
-            </p:txBody>
-          </p:sp>
-          <p:sp>
-            <p:nvSpPr>
-              <p:cNvPr id="91" name="矩形 90"/>
-              <p:cNvSpPr/>
-              <p:nvPr/>
-            </p:nvSpPr>
-            <p:spPr>
-              <a:xfrm>
-                <a:off x="9565018" y="3079318"/>
-                <a:ext cx="216000" cy="216000"/>
-              </a:xfrm>
-              <a:prstGeom prst="rect">
-                <a:avLst/>
-              </a:prstGeom>
-              <a:solidFill>
-                <a:srgbClr val="A83EA3"/>
-              </a:solidFill>
-              <a:ln w="28575">
-                <a:solidFill>
-                  <a:srgbClr val="A83EA3"/>
-                </a:solidFill>
-              </a:ln>
-            </p:spPr>
-            <p:style>
-              <a:lnRef idx="2">
-                <a:schemeClr val="accent1">
-                  <a:shade val="50000"/>
-                </a:schemeClr>
-              </a:lnRef>
-              <a:fillRef idx="1">
-                <a:schemeClr val="accent1"/>
-              </a:fillRef>
-              <a:effectRef idx="0">
-                <a:schemeClr val="accent1"/>
-              </a:effectRef>
-              <a:fontRef idx="minor">
-                <a:schemeClr val="lt1"/>
-              </a:fontRef>
-            </p:style>
-            <p:txBody>
-              <a:bodyPr rtlCol="0" anchor="ctr"/>
-              <a:lstStyle/>
-              <a:p>
-                <a:pPr algn="ctr"/>
-                <a:endParaRPr lang="zh-CN" altLang="en-US" dirty="0"/>
-              </a:p>
-            </p:txBody>
-          </p:sp>
-          <p:sp>
-            <p:nvSpPr>
-              <p:cNvPr id="92" name="矩形 91"/>
-              <p:cNvSpPr/>
-              <p:nvPr/>
-            </p:nvSpPr>
-            <p:spPr>
-              <a:xfrm>
-                <a:off x="9943115" y="3079318"/>
-                <a:ext cx="216000" cy="216000"/>
-              </a:xfrm>
-              <a:prstGeom prst="rect">
-                <a:avLst/>
-              </a:prstGeom>
-              <a:solidFill>
-                <a:srgbClr val="A83EA3"/>
-              </a:solidFill>
-              <a:ln w="28575">
-                <a:solidFill>
-                  <a:srgbClr val="A83EA3"/>
-                </a:solidFill>
-              </a:ln>
-            </p:spPr>
-            <p:style>
-              <a:lnRef idx="2">
-                <a:schemeClr val="accent1">
-                  <a:shade val="50000"/>
-                </a:schemeClr>
-              </a:lnRef>
-              <a:fillRef idx="1">
-                <a:schemeClr val="accent1"/>
-              </a:fillRef>
-              <a:effectRef idx="0">
-                <a:schemeClr val="accent1"/>
-              </a:effectRef>
-              <a:fontRef idx="minor">
-                <a:schemeClr val="lt1"/>
-              </a:fontRef>
-            </p:style>
-            <p:txBody>
-              <a:bodyPr rtlCol="0" anchor="ctr"/>
-              <a:lstStyle/>
-              <a:p>
-                <a:pPr algn="ctr"/>
-                <a:endParaRPr lang="zh-CN" altLang="en-US" dirty="0"/>
-              </a:p>
-            </p:txBody>
-          </p:sp>
-          <p:sp>
-            <p:nvSpPr>
-              <p:cNvPr id="93" name="矩形 92"/>
-              <p:cNvSpPr/>
-              <p:nvPr/>
-            </p:nvSpPr>
-            <p:spPr>
-              <a:xfrm>
-                <a:off x="10321213" y="3079318"/>
-                <a:ext cx="216000" cy="216000"/>
-              </a:xfrm>
-              <a:prstGeom prst="rect">
-                <a:avLst/>
-              </a:prstGeom>
-              <a:solidFill>
-                <a:srgbClr val="A83EA3"/>
-              </a:solidFill>
-              <a:ln w="28575">
-                <a:solidFill>
-                  <a:srgbClr val="A83EA3"/>
-                </a:solidFill>
-              </a:ln>
-            </p:spPr>
-            <p:style>
-              <a:lnRef idx="2">
-                <a:schemeClr val="accent1">
-                  <a:shade val="50000"/>
-                </a:schemeClr>
-              </a:lnRef>
-              <a:fillRef idx="1">
-                <a:schemeClr val="accent1"/>
-              </a:fillRef>
-              <a:effectRef idx="0">
-                <a:schemeClr val="accent1"/>
-              </a:effectRef>
-              <a:fontRef idx="minor">
-                <a:schemeClr val="lt1"/>
-              </a:fontRef>
-            </p:style>
-            <p:txBody>
-              <a:bodyPr rtlCol="0" anchor="ctr"/>
-              <a:lstStyle/>
-              <a:p>
-                <a:pPr algn="ctr"/>
-                <a:endParaRPr lang="zh-CN" altLang="en-US" dirty="0"/>
-              </a:p>
-            </p:txBody>
-          </p:sp>
-        </p:grpSp>
+            </a:ln>
+          </p:spPr>
+          <p:style>
+            <a:lnRef idx="2">
+              <a:schemeClr val="accent1">
+                <a:shade val="50000"/>
+              </a:schemeClr>
+            </a:lnRef>
+            <a:fillRef idx="1">
+              <a:schemeClr val="accent1"/>
+            </a:fillRef>
+            <a:effectRef idx="0">
+              <a:schemeClr val="accent1"/>
+            </a:effectRef>
+            <a:fontRef idx="minor">
+              <a:schemeClr val="lt1"/>
+            </a:fontRef>
+          </p:style>
+          <p:txBody>
+            <a:bodyPr rtlCol="0" anchor="ctr"/>
+            <a:lstStyle/>
+            <a:p>
+              <a:pPr algn="ctr"/>
+              <a:endParaRPr lang="zh-CN" altLang="en-US"/>
+            </a:p>
+          </p:txBody>
+        </p:sp>
       </p:grpSp>
     </p:spTree>
     <p:extLst>
@@ -5897,7 +5894,7 @@
       </p:cxnSp>
       <p:grpSp>
         <p:nvGrpSpPr>
-          <p:cNvPr id="97" name="组合 96"/>
+          <p:cNvPr id="50" name="组合 49"/>
           <p:cNvGrpSpPr/>
           <p:nvPr/>
         </p:nvGrpSpPr>
@@ -5905,34 +5902,34 @@
           <a:xfrm>
             <a:off x="7674532" y="3052814"/>
             <a:ext cx="2879994" cy="2808740"/>
-            <a:chOff x="7674532" y="3079318"/>
+            <a:chOff x="7674532" y="3052814"/>
             <a:chExt cx="2879994" cy="2808740"/>
           </a:xfrm>
         </p:grpSpPr>
         <p:grpSp>
           <p:nvGrpSpPr>
-            <p:cNvPr id="94" name="组合 93"/>
+            <p:cNvPr id="51" name="组合 50"/>
             <p:cNvGrpSpPr/>
             <p:nvPr/>
           </p:nvGrpSpPr>
           <p:grpSpPr>
             <a:xfrm>
-              <a:off x="7674532" y="3558363"/>
-              <a:ext cx="2879994" cy="1893749"/>
-              <a:chOff x="7674531" y="3800950"/>
-              <a:chExt cx="2879994" cy="1323432"/>
+              <a:off x="7674532" y="3052814"/>
+              <a:ext cx="2879994" cy="2808740"/>
+              <a:chOff x="7674532" y="3079318"/>
+              <a:chExt cx="2879994" cy="2808740"/>
             </a:xfrm>
           </p:grpSpPr>
           <p:sp>
             <p:nvSpPr>
-              <p:cNvPr id="33" name="矩形 32"/>
+              <p:cNvPr id="57" name="矩形 56"/>
               <p:cNvSpPr/>
               <p:nvPr/>
             </p:nvSpPr>
             <p:spPr>
-              <a:xfrm rot="10800000">
-                <a:off x="7674531" y="3800950"/>
-                <a:ext cx="2879994" cy="175050"/>
+              <a:xfrm>
+                <a:off x="7674532" y="5006610"/>
+                <a:ext cx="2879994" cy="445501"/>
               </a:xfrm>
               <a:prstGeom prst="rect">
                 <a:avLst/>
@@ -5969,943 +5966,940 @@
               </a:p>
             </p:txBody>
           </p:sp>
-          <p:sp>
-            <p:nvSpPr>
-              <p:cNvPr id="34" name="矩形 33"/>
-              <p:cNvSpPr/>
+          <p:grpSp>
+            <p:nvGrpSpPr>
+              <p:cNvPr id="58" name="组合 57"/>
+              <p:cNvGrpSpPr/>
               <p:nvPr/>
-            </p:nvSpPr>
-            <p:spPr>
-              <a:xfrm rot="10800000">
-                <a:off x="7674531" y="4194503"/>
-                <a:ext cx="2879994" cy="151402"/>
+            </p:nvGrpSpPr>
+            <p:grpSpPr>
+              <a:xfrm>
+                <a:off x="7674532" y="5672058"/>
+                <a:ext cx="2862681" cy="216000"/>
+                <a:chOff x="7687402" y="5621065"/>
+                <a:chExt cx="2862681" cy="216000"/>
               </a:xfrm>
-              <a:prstGeom prst="rect">
-                <a:avLst/>
-              </a:prstGeom>
-              <a:noFill/>
-              <a:ln w="28575">
+            </p:grpSpPr>
+            <p:sp>
+              <p:nvSpPr>
+                <p:cNvPr id="69" name="矩形 68"/>
+                <p:cNvSpPr/>
+                <p:nvPr/>
+              </p:nvSpPr>
+              <p:spPr>
+                <a:xfrm>
+                  <a:off x="7687402" y="5621065"/>
+                  <a:ext cx="216000" cy="216000"/>
+                </a:xfrm>
+                <a:prstGeom prst="rect">
+                  <a:avLst/>
+                </a:prstGeom>
                 <a:solidFill>
                   <a:srgbClr val="A83EA3"/>
                 </a:solidFill>
-              </a:ln>
-            </p:spPr>
-            <p:style>
-              <a:lnRef idx="2">
-                <a:schemeClr val="accent1">
-                  <a:shade val="50000"/>
-                </a:schemeClr>
-              </a:lnRef>
-              <a:fillRef idx="1">
-                <a:schemeClr val="accent1"/>
-              </a:fillRef>
-              <a:effectRef idx="0">
-                <a:schemeClr val="accent1"/>
-              </a:effectRef>
-              <a:fontRef idx="minor">
-                <a:schemeClr val="lt1"/>
-              </a:fontRef>
-            </p:style>
-            <p:txBody>
-              <a:bodyPr rtlCol="0" anchor="ctr"/>
-              <a:lstStyle/>
-              <a:p>
-                <a:pPr algn="ctr"/>
-                <a:endParaRPr lang="zh-CN" altLang="en-US"/>
-              </a:p>
-            </p:txBody>
-          </p:sp>
-          <p:sp>
-            <p:nvSpPr>
-              <p:cNvPr id="29" name="矩形 28"/>
-              <p:cNvSpPr/>
+                <a:ln w="28575">
+                  <a:solidFill>
+                    <a:srgbClr val="A83EA3"/>
+                  </a:solidFill>
+                </a:ln>
+              </p:spPr>
+              <p:style>
+                <a:lnRef idx="2">
+                  <a:schemeClr val="accent1">
+                    <a:shade val="50000"/>
+                  </a:schemeClr>
+                </a:lnRef>
+                <a:fillRef idx="1">
+                  <a:schemeClr val="accent1"/>
+                </a:fillRef>
+                <a:effectRef idx="0">
+                  <a:schemeClr val="accent1"/>
+                </a:effectRef>
+                <a:fontRef idx="minor">
+                  <a:schemeClr val="lt1"/>
+                </a:fontRef>
+              </p:style>
+              <p:txBody>
+                <a:bodyPr rtlCol="0" anchor="ctr"/>
+                <a:lstStyle/>
+                <a:p>
+                  <a:pPr algn="ctr"/>
+                  <a:endParaRPr lang="zh-CN" altLang="en-US" dirty="0"/>
+                </a:p>
+              </p:txBody>
+            </p:sp>
+            <p:sp>
+              <p:nvSpPr>
+                <p:cNvPr id="70" name="矩形 69"/>
+                <p:cNvSpPr/>
+                <p:nvPr/>
+              </p:nvSpPr>
+              <p:spPr>
+                <a:xfrm>
+                  <a:off x="8065499" y="5621065"/>
+                  <a:ext cx="216000" cy="216000"/>
+                </a:xfrm>
+                <a:prstGeom prst="rect">
+                  <a:avLst/>
+                </a:prstGeom>
+                <a:solidFill>
+                  <a:srgbClr val="A83EA3"/>
+                </a:solidFill>
+                <a:ln w="28575">
+                  <a:solidFill>
+                    <a:srgbClr val="A83EA3"/>
+                  </a:solidFill>
+                </a:ln>
+              </p:spPr>
+              <p:style>
+                <a:lnRef idx="2">
+                  <a:schemeClr val="accent1">
+                    <a:shade val="50000"/>
+                  </a:schemeClr>
+                </a:lnRef>
+                <a:fillRef idx="1">
+                  <a:schemeClr val="accent1"/>
+                </a:fillRef>
+                <a:effectRef idx="0">
+                  <a:schemeClr val="accent1"/>
+                </a:effectRef>
+                <a:fontRef idx="minor">
+                  <a:schemeClr val="lt1"/>
+                </a:fontRef>
+              </p:style>
+              <p:txBody>
+                <a:bodyPr rtlCol="0" anchor="ctr"/>
+                <a:lstStyle/>
+                <a:p>
+                  <a:pPr algn="ctr"/>
+                  <a:endParaRPr lang="zh-CN" altLang="en-US" dirty="0"/>
+                </a:p>
+              </p:txBody>
+            </p:sp>
+            <p:sp>
+              <p:nvSpPr>
+                <p:cNvPr id="71" name="矩形 70"/>
+                <p:cNvSpPr/>
+                <p:nvPr/>
+              </p:nvSpPr>
+              <p:spPr>
+                <a:xfrm>
+                  <a:off x="8443596" y="5621065"/>
+                  <a:ext cx="216000" cy="216000"/>
+                </a:xfrm>
+                <a:prstGeom prst="rect">
+                  <a:avLst/>
+                </a:prstGeom>
+                <a:solidFill>
+                  <a:srgbClr val="A83EA3"/>
+                </a:solidFill>
+                <a:ln w="28575">
+                  <a:solidFill>
+                    <a:srgbClr val="A83EA3"/>
+                  </a:solidFill>
+                </a:ln>
+              </p:spPr>
+              <p:style>
+                <a:lnRef idx="2">
+                  <a:schemeClr val="accent1">
+                    <a:shade val="50000"/>
+                  </a:schemeClr>
+                </a:lnRef>
+                <a:fillRef idx="1">
+                  <a:schemeClr val="accent1"/>
+                </a:fillRef>
+                <a:effectRef idx="0">
+                  <a:schemeClr val="accent1"/>
+                </a:effectRef>
+                <a:fontRef idx="minor">
+                  <a:schemeClr val="lt1"/>
+                </a:fontRef>
+              </p:style>
+              <p:txBody>
+                <a:bodyPr rtlCol="0" anchor="ctr"/>
+                <a:lstStyle/>
+                <a:p>
+                  <a:pPr algn="ctr"/>
+                  <a:endParaRPr lang="zh-CN" altLang="en-US" dirty="0"/>
+                </a:p>
+              </p:txBody>
+            </p:sp>
+            <p:sp>
+              <p:nvSpPr>
+                <p:cNvPr id="72" name="矩形 71"/>
+                <p:cNvSpPr/>
+                <p:nvPr/>
+              </p:nvSpPr>
+              <p:spPr>
+                <a:xfrm>
+                  <a:off x="8821694" y="5621065"/>
+                  <a:ext cx="216000" cy="216000"/>
+                </a:xfrm>
+                <a:prstGeom prst="rect">
+                  <a:avLst/>
+                </a:prstGeom>
+                <a:solidFill>
+                  <a:srgbClr val="A83EA3"/>
+                </a:solidFill>
+                <a:ln w="28575">
+                  <a:solidFill>
+                    <a:srgbClr val="A83EA3"/>
+                  </a:solidFill>
+                </a:ln>
+              </p:spPr>
+              <p:style>
+                <a:lnRef idx="2">
+                  <a:schemeClr val="accent1">
+                    <a:shade val="50000"/>
+                  </a:schemeClr>
+                </a:lnRef>
+                <a:fillRef idx="1">
+                  <a:schemeClr val="accent1"/>
+                </a:fillRef>
+                <a:effectRef idx="0">
+                  <a:schemeClr val="accent1"/>
+                </a:effectRef>
+                <a:fontRef idx="minor">
+                  <a:schemeClr val="lt1"/>
+                </a:fontRef>
+              </p:style>
+              <p:txBody>
+                <a:bodyPr rtlCol="0" anchor="ctr"/>
+                <a:lstStyle/>
+                <a:p>
+                  <a:pPr algn="ctr"/>
+                  <a:endParaRPr lang="zh-CN" altLang="en-US" dirty="0"/>
+                </a:p>
+              </p:txBody>
+            </p:sp>
+            <p:sp>
+              <p:nvSpPr>
+                <p:cNvPr id="73" name="矩形 72"/>
+                <p:cNvSpPr/>
+                <p:nvPr/>
+              </p:nvSpPr>
+              <p:spPr>
+                <a:xfrm>
+                  <a:off x="9199791" y="5621065"/>
+                  <a:ext cx="216000" cy="216000"/>
+                </a:xfrm>
+                <a:prstGeom prst="rect">
+                  <a:avLst/>
+                </a:prstGeom>
+                <a:solidFill>
+                  <a:srgbClr val="A83EA3"/>
+                </a:solidFill>
+                <a:ln w="28575">
+                  <a:solidFill>
+                    <a:srgbClr val="A83EA3"/>
+                  </a:solidFill>
+                </a:ln>
+              </p:spPr>
+              <p:style>
+                <a:lnRef idx="2">
+                  <a:schemeClr val="accent1">
+                    <a:shade val="50000"/>
+                  </a:schemeClr>
+                </a:lnRef>
+                <a:fillRef idx="1">
+                  <a:schemeClr val="accent1"/>
+                </a:fillRef>
+                <a:effectRef idx="0">
+                  <a:schemeClr val="accent1"/>
+                </a:effectRef>
+                <a:fontRef idx="minor">
+                  <a:schemeClr val="lt1"/>
+                </a:fontRef>
+              </p:style>
+              <p:txBody>
+                <a:bodyPr rtlCol="0" anchor="ctr"/>
+                <a:lstStyle/>
+                <a:p>
+                  <a:pPr algn="ctr"/>
+                  <a:endParaRPr lang="zh-CN" altLang="en-US" dirty="0"/>
+                </a:p>
+              </p:txBody>
+            </p:sp>
+            <p:sp>
+              <p:nvSpPr>
+                <p:cNvPr id="82" name="矩形 81"/>
+                <p:cNvSpPr/>
+                <p:nvPr/>
+              </p:nvSpPr>
+              <p:spPr>
+                <a:xfrm>
+                  <a:off x="9577888" y="5621065"/>
+                  <a:ext cx="216000" cy="216000"/>
+                </a:xfrm>
+                <a:prstGeom prst="rect">
+                  <a:avLst/>
+                </a:prstGeom>
+                <a:solidFill>
+                  <a:srgbClr val="A83EA3"/>
+                </a:solidFill>
+                <a:ln w="28575">
+                  <a:solidFill>
+                    <a:srgbClr val="A83EA3"/>
+                  </a:solidFill>
+                </a:ln>
+              </p:spPr>
+              <p:style>
+                <a:lnRef idx="2">
+                  <a:schemeClr val="accent1">
+                    <a:shade val="50000"/>
+                  </a:schemeClr>
+                </a:lnRef>
+                <a:fillRef idx="1">
+                  <a:schemeClr val="accent1"/>
+                </a:fillRef>
+                <a:effectRef idx="0">
+                  <a:schemeClr val="accent1"/>
+                </a:effectRef>
+                <a:fontRef idx="minor">
+                  <a:schemeClr val="lt1"/>
+                </a:fontRef>
+              </p:style>
+              <p:txBody>
+                <a:bodyPr rtlCol="0" anchor="ctr"/>
+                <a:lstStyle/>
+                <a:p>
+                  <a:pPr algn="ctr"/>
+                  <a:endParaRPr lang="zh-CN" altLang="en-US" dirty="0"/>
+                </a:p>
+              </p:txBody>
+            </p:sp>
+            <p:sp>
+              <p:nvSpPr>
+                <p:cNvPr id="83" name="矩形 82"/>
+                <p:cNvSpPr/>
+                <p:nvPr/>
+              </p:nvSpPr>
+              <p:spPr>
+                <a:xfrm>
+                  <a:off x="9955985" y="5621065"/>
+                  <a:ext cx="216000" cy="216000"/>
+                </a:xfrm>
+                <a:prstGeom prst="rect">
+                  <a:avLst/>
+                </a:prstGeom>
+                <a:solidFill>
+                  <a:srgbClr val="A83EA3"/>
+                </a:solidFill>
+                <a:ln w="28575">
+                  <a:solidFill>
+                    <a:srgbClr val="A83EA3"/>
+                  </a:solidFill>
+                </a:ln>
+              </p:spPr>
+              <p:style>
+                <a:lnRef idx="2">
+                  <a:schemeClr val="accent1">
+                    <a:shade val="50000"/>
+                  </a:schemeClr>
+                </a:lnRef>
+                <a:fillRef idx="1">
+                  <a:schemeClr val="accent1"/>
+                </a:fillRef>
+                <a:effectRef idx="0">
+                  <a:schemeClr val="accent1"/>
+                </a:effectRef>
+                <a:fontRef idx="minor">
+                  <a:schemeClr val="lt1"/>
+                </a:fontRef>
+              </p:style>
+              <p:txBody>
+                <a:bodyPr rtlCol="0" anchor="ctr"/>
+                <a:lstStyle/>
+                <a:p>
+                  <a:pPr algn="ctr"/>
+                  <a:endParaRPr lang="zh-CN" altLang="en-US" dirty="0"/>
+                </a:p>
+              </p:txBody>
+            </p:sp>
+            <p:sp>
+              <p:nvSpPr>
+                <p:cNvPr id="84" name="矩形 83"/>
+                <p:cNvSpPr/>
+                <p:nvPr/>
+              </p:nvSpPr>
+              <p:spPr>
+                <a:xfrm>
+                  <a:off x="10334083" y="5621065"/>
+                  <a:ext cx="216000" cy="216000"/>
+                </a:xfrm>
+                <a:prstGeom prst="rect">
+                  <a:avLst/>
+                </a:prstGeom>
+                <a:solidFill>
+                  <a:srgbClr val="A83EA3"/>
+                </a:solidFill>
+                <a:ln w="28575">
+                  <a:solidFill>
+                    <a:srgbClr val="A83EA3"/>
+                  </a:solidFill>
+                </a:ln>
+              </p:spPr>
+              <p:style>
+                <a:lnRef idx="2">
+                  <a:schemeClr val="accent1">
+                    <a:shade val="50000"/>
+                  </a:schemeClr>
+                </a:lnRef>
+                <a:fillRef idx="1">
+                  <a:schemeClr val="accent1"/>
+                </a:fillRef>
+                <a:effectRef idx="0">
+                  <a:schemeClr val="accent1"/>
+                </a:effectRef>
+                <a:fontRef idx="minor">
+                  <a:schemeClr val="lt1"/>
+                </a:fontRef>
+              </p:style>
+              <p:txBody>
+                <a:bodyPr rtlCol="0" anchor="ctr"/>
+                <a:lstStyle/>
+                <a:p>
+                  <a:pPr algn="ctr"/>
+                  <a:endParaRPr lang="zh-CN" altLang="en-US" dirty="0"/>
+                </a:p>
+              </p:txBody>
+            </p:sp>
+          </p:grpSp>
+          <p:grpSp>
+            <p:nvGrpSpPr>
+              <p:cNvPr id="59" name="组合 58"/>
+              <p:cNvGrpSpPr/>
               <p:nvPr/>
-            </p:nvSpPr>
-            <p:spPr>
+            </p:nvGrpSpPr>
+            <p:grpSpPr>
               <a:xfrm>
-                <a:off x="7674531" y="4949332"/>
-                <a:ext cx="2879994" cy="175050"/>
+                <a:off x="7674532" y="3079318"/>
+                <a:ext cx="2862681" cy="216000"/>
+                <a:chOff x="7674532" y="3079318"/>
+                <a:chExt cx="2862681" cy="216000"/>
               </a:xfrm>
-              <a:prstGeom prst="rect">
-                <a:avLst/>
-              </a:prstGeom>
-              <a:noFill/>
-              <a:ln w="28575">
+            </p:grpSpPr>
+            <p:sp>
+              <p:nvSpPr>
+                <p:cNvPr id="60" name="矩形 59"/>
+                <p:cNvSpPr/>
+                <p:nvPr/>
+              </p:nvSpPr>
+              <p:spPr>
+                <a:xfrm>
+                  <a:off x="7674532" y="3079318"/>
+                  <a:ext cx="216000" cy="216000"/>
+                </a:xfrm>
+                <a:prstGeom prst="rect">
+                  <a:avLst/>
+                </a:prstGeom>
                 <a:solidFill>
                   <a:srgbClr val="A83EA3"/>
                 </a:solidFill>
-              </a:ln>
-            </p:spPr>
-            <p:style>
-              <a:lnRef idx="2">
-                <a:schemeClr val="accent1">
-                  <a:shade val="50000"/>
-                </a:schemeClr>
-              </a:lnRef>
-              <a:fillRef idx="1">
-                <a:schemeClr val="accent1"/>
-              </a:fillRef>
-              <a:effectRef idx="0">
-                <a:schemeClr val="accent1"/>
-              </a:effectRef>
-              <a:fontRef idx="minor">
-                <a:schemeClr val="lt1"/>
-              </a:fontRef>
-            </p:style>
-            <p:txBody>
-              <a:bodyPr rtlCol="0" anchor="ctr"/>
-              <a:lstStyle/>
-              <a:p>
-                <a:pPr algn="ctr"/>
-                <a:endParaRPr lang="zh-CN" altLang="en-US"/>
-              </a:p>
-            </p:txBody>
-          </p:sp>
-          <p:sp>
-            <p:nvSpPr>
-              <p:cNvPr id="30" name="矩形 29"/>
-              <p:cNvSpPr/>
-              <p:nvPr/>
-            </p:nvSpPr>
-            <p:spPr>
-              <a:xfrm>
-                <a:off x="7674531" y="4565187"/>
-                <a:ext cx="2879994" cy="164857"/>
-              </a:xfrm>
-              <a:prstGeom prst="rect">
-                <a:avLst/>
-              </a:prstGeom>
-              <a:noFill/>
-              <a:ln w="28575">
+                <a:ln w="28575">
+                  <a:solidFill>
+                    <a:srgbClr val="A83EA3"/>
+                  </a:solidFill>
+                </a:ln>
+              </p:spPr>
+              <p:style>
+                <a:lnRef idx="2">
+                  <a:schemeClr val="accent1">
+                    <a:shade val="50000"/>
+                  </a:schemeClr>
+                </a:lnRef>
+                <a:fillRef idx="1">
+                  <a:schemeClr val="accent1"/>
+                </a:fillRef>
+                <a:effectRef idx="0">
+                  <a:schemeClr val="accent1"/>
+                </a:effectRef>
+                <a:fontRef idx="minor">
+                  <a:schemeClr val="lt1"/>
+                </a:fontRef>
+              </p:style>
+              <p:txBody>
+                <a:bodyPr rtlCol="0" anchor="ctr"/>
+                <a:lstStyle/>
+                <a:p>
+                  <a:pPr algn="ctr"/>
+                  <a:endParaRPr lang="zh-CN" altLang="en-US" dirty="0"/>
+                </a:p>
+              </p:txBody>
+            </p:sp>
+            <p:sp>
+              <p:nvSpPr>
+                <p:cNvPr id="61" name="矩形 60"/>
+                <p:cNvSpPr/>
+                <p:nvPr/>
+              </p:nvSpPr>
+              <p:spPr>
+                <a:xfrm>
+                  <a:off x="8052629" y="3079318"/>
+                  <a:ext cx="216000" cy="216000"/>
+                </a:xfrm>
+                <a:prstGeom prst="rect">
+                  <a:avLst/>
+                </a:prstGeom>
                 <a:solidFill>
                   <a:srgbClr val="A83EA3"/>
                 </a:solidFill>
-              </a:ln>
-            </p:spPr>
-            <p:style>
-              <a:lnRef idx="2">
-                <a:schemeClr val="accent1">
-                  <a:shade val="50000"/>
-                </a:schemeClr>
-              </a:lnRef>
-              <a:fillRef idx="1">
-                <a:schemeClr val="accent1"/>
-              </a:fillRef>
-              <a:effectRef idx="0">
-                <a:schemeClr val="accent1"/>
-              </a:effectRef>
-              <a:fontRef idx="minor">
-                <a:schemeClr val="lt1"/>
-              </a:fontRef>
-            </p:style>
-            <p:txBody>
-              <a:bodyPr rtlCol="0" anchor="ctr"/>
-              <a:lstStyle/>
-              <a:p>
-                <a:pPr algn="ctr"/>
-                <a:endParaRPr lang="zh-CN" altLang="en-US"/>
-              </a:p>
-            </p:txBody>
-          </p:sp>
+                <a:ln w="28575">
+                  <a:solidFill>
+                    <a:srgbClr val="A83EA3"/>
+                  </a:solidFill>
+                </a:ln>
+              </p:spPr>
+              <p:style>
+                <a:lnRef idx="2">
+                  <a:schemeClr val="accent1">
+                    <a:shade val="50000"/>
+                  </a:schemeClr>
+                </a:lnRef>
+                <a:fillRef idx="1">
+                  <a:schemeClr val="accent1"/>
+                </a:fillRef>
+                <a:effectRef idx="0">
+                  <a:schemeClr val="accent1"/>
+                </a:effectRef>
+                <a:fontRef idx="minor">
+                  <a:schemeClr val="lt1"/>
+                </a:fontRef>
+              </p:style>
+              <p:txBody>
+                <a:bodyPr rtlCol="0" anchor="ctr"/>
+                <a:lstStyle/>
+                <a:p>
+                  <a:pPr algn="ctr"/>
+                  <a:endParaRPr lang="zh-CN" altLang="en-US" dirty="0"/>
+                </a:p>
+              </p:txBody>
+            </p:sp>
+            <p:sp>
+              <p:nvSpPr>
+                <p:cNvPr id="62" name="矩形 61"/>
+                <p:cNvSpPr/>
+                <p:nvPr/>
+              </p:nvSpPr>
+              <p:spPr>
+                <a:xfrm>
+                  <a:off x="8430726" y="3079318"/>
+                  <a:ext cx="216000" cy="216000"/>
+                </a:xfrm>
+                <a:prstGeom prst="rect">
+                  <a:avLst/>
+                </a:prstGeom>
+                <a:solidFill>
+                  <a:srgbClr val="A83EA3"/>
+                </a:solidFill>
+                <a:ln w="28575">
+                  <a:solidFill>
+                    <a:srgbClr val="A83EA3"/>
+                  </a:solidFill>
+                </a:ln>
+              </p:spPr>
+              <p:style>
+                <a:lnRef idx="2">
+                  <a:schemeClr val="accent1">
+                    <a:shade val="50000"/>
+                  </a:schemeClr>
+                </a:lnRef>
+                <a:fillRef idx="1">
+                  <a:schemeClr val="accent1"/>
+                </a:fillRef>
+                <a:effectRef idx="0">
+                  <a:schemeClr val="accent1"/>
+                </a:effectRef>
+                <a:fontRef idx="minor">
+                  <a:schemeClr val="lt1"/>
+                </a:fontRef>
+              </p:style>
+              <p:txBody>
+                <a:bodyPr rtlCol="0" anchor="ctr"/>
+                <a:lstStyle/>
+                <a:p>
+                  <a:pPr algn="ctr"/>
+                  <a:endParaRPr lang="zh-CN" altLang="en-US" dirty="0"/>
+                </a:p>
+              </p:txBody>
+            </p:sp>
+            <p:sp>
+              <p:nvSpPr>
+                <p:cNvPr id="63" name="矩形 62"/>
+                <p:cNvSpPr/>
+                <p:nvPr/>
+              </p:nvSpPr>
+              <p:spPr>
+                <a:xfrm>
+                  <a:off x="8808824" y="3079318"/>
+                  <a:ext cx="216000" cy="216000"/>
+                </a:xfrm>
+                <a:prstGeom prst="rect">
+                  <a:avLst/>
+                </a:prstGeom>
+                <a:solidFill>
+                  <a:srgbClr val="A83EA3"/>
+                </a:solidFill>
+                <a:ln w="28575">
+                  <a:solidFill>
+                    <a:srgbClr val="A83EA3"/>
+                  </a:solidFill>
+                </a:ln>
+              </p:spPr>
+              <p:style>
+                <a:lnRef idx="2">
+                  <a:schemeClr val="accent1">
+                    <a:shade val="50000"/>
+                  </a:schemeClr>
+                </a:lnRef>
+                <a:fillRef idx="1">
+                  <a:schemeClr val="accent1"/>
+                </a:fillRef>
+                <a:effectRef idx="0">
+                  <a:schemeClr val="accent1"/>
+                </a:effectRef>
+                <a:fontRef idx="minor">
+                  <a:schemeClr val="lt1"/>
+                </a:fontRef>
+              </p:style>
+              <p:txBody>
+                <a:bodyPr rtlCol="0" anchor="ctr"/>
+                <a:lstStyle/>
+                <a:p>
+                  <a:pPr algn="ctr"/>
+                  <a:endParaRPr lang="zh-CN" altLang="en-US" dirty="0"/>
+                </a:p>
+              </p:txBody>
+            </p:sp>
+            <p:sp>
+              <p:nvSpPr>
+                <p:cNvPr id="64" name="矩形 63"/>
+                <p:cNvSpPr/>
+                <p:nvPr/>
+              </p:nvSpPr>
+              <p:spPr>
+                <a:xfrm>
+                  <a:off x="9186921" y="3079318"/>
+                  <a:ext cx="216000" cy="216000"/>
+                </a:xfrm>
+                <a:prstGeom prst="rect">
+                  <a:avLst/>
+                </a:prstGeom>
+                <a:solidFill>
+                  <a:srgbClr val="A83EA3"/>
+                </a:solidFill>
+                <a:ln w="28575">
+                  <a:solidFill>
+                    <a:srgbClr val="A83EA3"/>
+                  </a:solidFill>
+                </a:ln>
+              </p:spPr>
+              <p:style>
+                <a:lnRef idx="2">
+                  <a:schemeClr val="accent1">
+                    <a:shade val="50000"/>
+                  </a:schemeClr>
+                </a:lnRef>
+                <a:fillRef idx="1">
+                  <a:schemeClr val="accent1"/>
+                </a:fillRef>
+                <a:effectRef idx="0">
+                  <a:schemeClr val="accent1"/>
+                </a:effectRef>
+                <a:fontRef idx="minor">
+                  <a:schemeClr val="lt1"/>
+                </a:fontRef>
+              </p:style>
+              <p:txBody>
+                <a:bodyPr rtlCol="0" anchor="ctr"/>
+                <a:lstStyle/>
+                <a:p>
+                  <a:pPr algn="ctr"/>
+                  <a:endParaRPr lang="zh-CN" altLang="en-US" dirty="0"/>
+                </a:p>
+              </p:txBody>
+            </p:sp>
+            <p:sp>
+              <p:nvSpPr>
+                <p:cNvPr id="66" name="矩形 65"/>
+                <p:cNvSpPr/>
+                <p:nvPr/>
+              </p:nvSpPr>
+              <p:spPr>
+                <a:xfrm>
+                  <a:off x="9565018" y="3079318"/>
+                  <a:ext cx="216000" cy="216000"/>
+                </a:xfrm>
+                <a:prstGeom prst="rect">
+                  <a:avLst/>
+                </a:prstGeom>
+                <a:solidFill>
+                  <a:srgbClr val="A83EA3"/>
+                </a:solidFill>
+                <a:ln w="28575">
+                  <a:solidFill>
+                    <a:srgbClr val="A83EA3"/>
+                  </a:solidFill>
+                </a:ln>
+              </p:spPr>
+              <p:style>
+                <a:lnRef idx="2">
+                  <a:schemeClr val="accent1">
+                    <a:shade val="50000"/>
+                  </a:schemeClr>
+                </a:lnRef>
+                <a:fillRef idx="1">
+                  <a:schemeClr val="accent1"/>
+                </a:fillRef>
+                <a:effectRef idx="0">
+                  <a:schemeClr val="accent1"/>
+                </a:effectRef>
+                <a:fontRef idx="minor">
+                  <a:schemeClr val="lt1"/>
+                </a:fontRef>
+              </p:style>
+              <p:txBody>
+                <a:bodyPr rtlCol="0" anchor="ctr"/>
+                <a:lstStyle/>
+                <a:p>
+                  <a:pPr algn="ctr"/>
+                  <a:endParaRPr lang="zh-CN" altLang="en-US" dirty="0"/>
+                </a:p>
+              </p:txBody>
+            </p:sp>
+            <p:sp>
+              <p:nvSpPr>
+                <p:cNvPr id="67" name="矩形 66"/>
+                <p:cNvSpPr/>
+                <p:nvPr/>
+              </p:nvSpPr>
+              <p:spPr>
+                <a:xfrm>
+                  <a:off x="9943115" y="3079318"/>
+                  <a:ext cx="216000" cy="216000"/>
+                </a:xfrm>
+                <a:prstGeom prst="rect">
+                  <a:avLst/>
+                </a:prstGeom>
+                <a:solidFill>
+                  <a:srgbClr val="A83EA3"/>
+                </a:solidFill>
+                <a:ln w="28575">
+                  <a:solidFill>
+                    <a:srgbClr val="A83EA3"/>
+                  </a:solidFill>
+                </a:ln>
+              </p:spPr>
+              <p:style>
+                <a:lnRef idx="2">
+                  <a:schemeClr val="accent1">
+                    <a:shade val="50000"/>
+                  </a:schemeClr>
+                </a:lnRef>
+                <a:fillRef idx="1">
+                  <a:schemeClr val="accent1"/>
+                </a:fillRef>
+                <a:effectRef idx="0">
+                  <a:schemeClr val="accent1"/>
+                </a:effectRef>
+                <a:fontRef idx="minor">
+                  <a:schemeClr val="lt1"/>
+                </a:fontRef>
+              </p:style>
+              <p:txBody>
+                <a:bodyPr rtlCol="0" anchor="ctr"/>
+                <a:lstStyle/>
+                <a:p>
+                  <a:pPr algn="ctr"/>
+                  <a:endParaRPr lang="zh-CN" altLang="en-US" dirty="0"/>
+                </a:p>
+              </p:txBody>
+            </p:sp>
+            <p:sp>
+              <p:nvSpPr>
+                <p:cNvPr id="68" name="矩形 67"/>
+                <p:cNvSpPr/>
+                <p:nvPr/>
+              </p:nvSpPr>
+              <p:spPr>
+                <a:xfrm>
+                  <a:off x="10321213" y="3079318"/>
+                  <a:ext cx="216000" cy="216000"/>
+                </a:xfrm>
+                <a:prstGeom prst="rect">
+                  <a:avLst/>
+                </a:prstGeom>
+                <a:solidFill>
+                  <a:srgbClr val="A83EA3"/>
+                </a:solidFill>
+                <a:ln w="28575">
+                  <a:solidFill>
+                    <a:srgbClr val="A83EA3"/>
+                  </a:solidFill>
+                </a:ln>
+              </p:spPr>
+              <p:style>
+                <a:lnRef idx="2">
+                  <a:schemeClr val="accent1">
+                    <a:shade val="50000"/>
+                  </a:schemeClr>
+                </a:lnRef>
+                <a:fillRef idx="1">
+                  <a:schemeClr val="accent1"/>
+                </a:fillRef>
+                <a:effectRef idx="0">
+                  <a:schemeClr val="accent1"/>
+                </a:effectRef>
+                <a:fontRef idx="minor">
+                  <a:schemeClr val="lt1"/>
+                </a:fontRef>
+              </p:style>
+              <p:txBody>
+                <a:bodyPr rtlCol="0" anchor="ctr"/>
+                <a:lstStyle/>
+                <a:p>
+                  <a:pPr algn="ctr"/>
+                  <a:endParaRPr lang="zh-CN" altLang="en-US" dirty="0"/>
+                </a:p>
+              </p:txBody>
+            </p:sp>
+          </p:grpSp>
         </p:grpSp>
-        <p:grpSp>
-          <p:nvGrpSpPr>
-            <p:cNvPr id="96" name="组合 95"/>
-            <p:cNvGrpSpPr/>
+        <p:sp>
+          <p:nvSpPr>
+            <p:cNvPr id="52" name="文本框 51"/>
+            <p:cNvSpPr txBox="1"/>
             <p:nvPr/>
-          </p:nvGrpSpPr>
-          <p:grpSpPr>
+          </p:nvSpPr>
+          <p:spPr>
+            <a:xfrm rot="5400000">
+              <a:off x="8533761" y="4143091"/>
+              <a:ext cx="1473200" cy="646331"/>
+            </a:xfrm>
+            <a:prstGeom prst="rect">
+              <a:avLst/>
+            </a:prstGeom>
+            <a:noFill/>
+          </p:spPr>
+          <p:txBody>
+            <a:bodyPr wrap="square" rtlCol="0">
+              <a:spAutoFit/>
+            </a:bodyPr>
+            <a:lstStyle/>
+            <a:p>
+              <a:pPr algn="ctr"/>
+              <a:r>
+                <a:rPr lang="en-US" altLang="zh-CN" sz="3600" b="1" dirty="0" smtClean="0">
+                  <a:solidFill>
+                    <a:srgbClr val="A83EA3"/>
+                  </a:solidFill>
+                  <a:latin typeface="Calibri" panose="020F0502020204030204" pitchFamily="34" charset="0"/>
+                  <a:ea typeface="Calibri" panose="020F0502020204030204" pitchFamily="34" charset="0"/>
+                  <a:cs typeface="Calibri" panose="020F0502020204030204" pitchFamily="34" charset="0"/>
+                </a:rPr>
+                <a:t>…… </a:t>
+              </a:r>
+              <a:endParaRPr lang="zh-CN" altLang="en-US" sz="3600" b="1" dirty="0">
+                <a:solidFill>
+                  <a:srgbClr val="A83EA3"/>
+                </a:solidFill>
+                <a:latin typeface="Calibri" panose="020F0502020204030204" pitchFamily="34" charset="0"/>
+                <a:ea typeface="Calibri" panose="020F0502020204030204" pitchFamily="34" charset="0"/>
+                <a:cs typeface="Calibri" panose="020F0502020204030204" pitchFamily="34" charset="0"/>
+              </a:endParaRPr>
+            </a:p>
+          </p:txBody>
+        </p:sp>
+        <p:sp>
+          <p:nvSpPr>
+            <p:cNvPr id="53" name="矩形 52"/>
+            <p:cNvSpPr/>
+            <p:nvPr/>
+          </p:nvSpPr>
+          <p:spPr>
             <a:xfrm>
-              <a:off x="7674532" y="5672058"/>
-              <a:ext cx="2862681" cy="216000"/>
-              <a:chOff x="7687402" y="5621065"/>
-              <a:chExt cx="2862681" cy="216000"/>
+              <a:off x="9386901" y="4087351"/>
+              <a:ext cx="718466" cy="646331"/>
             </a:xfrm>
-          </p:grpSpPr>
-          <p:sp>
-            <p:nvSpPr>
-              <p:cNvPr id="74" name="矩形 73"/>
-              <p:cNvSpPr/>
-              <p:nvPr/>
-            </p:nvSpPr>
-            <p:spPr>
-              <a:xfrm>
-                <a:off x="7687402" y="5621065"/>
-                <a:ext cx="216000" cy="216000"/>
-              </a:xfrm>
-              <a:prstGeom prst="rect">
-                <a:avLst/>
-              </a:prstGeom>
+            <a:prstGeom prst="rect">
+              <a:avLst/>
+            </a:prstGeom>
+          </p:spPr>
+          <p:txBody>
+            <a:bodyPr wrap="none">
+              <a:spAutoFit/>
+            </a:bodyPr>
+            <a:lstStyle/>
+            <a:p>
+              <a:pPr algn="ctr"/>
+              <a:r>
+                <a:rPr lang="en-US" altLang="zh-CN" sz="3600" b="1" dirty="0">
+                  <a:solidFill>
+                    <a:srgbClr val="A83EA3"/>
+                  </a:solidFill>
+                  <a:latin typeface="Calibri" panose="020F0502020204030204" pitchFamily="34" charset="0"/>
+                  <a:ea typeface="Calibri" panose="020F0502020204030204" pitchFamily="34" charset="0"/>
+                  <a:cs typeface="Calibri" panose="020F0502020204030204" pitchFamily="34" charset="0"/>
+                </a:rPr>
+                <a:t>×N</a:t>
+              </a:r>
+              <a:endParaRPr lang="zh-CN" altLang="en-US" sz="3600" b="1" dirty="0">
+                <a:solidFill>
+                  <a:srgbClr val="A83EA3"/>
+                </a:solidFill>
+                <a:latin typeface="Calibri" panose="020F0502020204030204" pitchFamily="34" charset="0"/>
+                <a:ea typeface="Calibri" panose="020F0502020204030204" pitchFamily="34" charset="0"/>
+                <a:cs typeface="Calibri" panose="020F0502020204030204" pitchFamily="34" charset="0"/>
+              </a:endParaRPr>
+            </a:p>
+          </p:txBody>
+        </p:sp>
+        <p:sp>
+          <p:nvSpPr>
+            <p:cNvPr id="55" name="矩形 54"/>
+            <p:cNvSpPr/>
+            <p:nvPr/>
+          </p:nvSpPr>
+          <p:spPr>
+            <a:xfrm>
+              <a:off x="7674532" y="3470833"/>
+              <a:ext cx="2879994" cy="445501"/>
+            </a:xfrm>
+            <a:prstGeom prst="rect">
+              <a:avLst/>
+            </a:prstGeom>
+            <a:noFill/>
+            <a:ln w="28575">
               <a:solidFill>
                 <a:srgbClr val="A83EA3"/>
               </a:solidFill>
-              <a:ln w="28575">
-                <a:solidFill>
-                  <a:srgbClr val="A83EA3"/>
-                </a:solidFill>
-              </a:ln>
-            </p:spPr>
-            <p:style>
-              <a:lnRef idx="2">
-                <a:schemeClr val="accent1">
-                  <a:shade val="50000"/>
-                </a:schemeClr>
-              </a:lnRef>
-              <a:fillRef idx="1">
-                <a:schemeClr val="accent1"/>
-              </a:fillRef>
-              <a:effectRef idx="0">
-                <a:schemeClr val="accent1"/>
-              </a:effectRef>
-              <a:fontRef idx="minor">
-                <a:schemeClr val="lt1"/>
-              </a:fontRef>
-            </p:style>
-            <p:txBody>
-              <a:bodyPr rtlCol="0" anchor="ctr"/>
-              <a:lstStyle/>
-              <a:p>
-                <a:pPr algn="ctr"/>
-                <a:endParaRPr lang="zh-CN" altLang="en-US" dirty="0"/>
-              </a:p>
-            </p:txBody>
-          </p:sp>
-          <p:sp>
-            <p:nvSpPr>
-              <p:cNvPr id="75" name="矩形 74"/>
-              <p:cNvSpPr/>
-              <p:nvPr/>
-            </p:nvSpPr>
-            <p:spPr>
-              <a:xfrm>
-                <a:off x="8065499" y="5621065"/>
-                <a:ext cx="216000" cy="216000"/>
-              </a:xfrm>
-              <a:prstGeom prst="rect">
-                <a:avLst/>
-              </a:prstGeom>
-              <a:solidFill>
-                <a:srgbClr val="A83EA3"/>
-              </a:solidFill>
-              <a:ln w="28575">
-                <a:solidFill>
-                  <a:srgbClr val="A83EA3"/>
-                </a:solidFill>
-              </a:ln>
-            </p:spPr>
-            <p:style>
-              <a:lnRef idx="2">
-                <a:schemeClr val="accent1">
-                  <a:shade val="50000"/>
-                </a:schemeClr>
-              </a:lnRef>
-              <a:fillRef idx="1">
-                <a:schemeClr val="accent1"/>
-              </a:fillRef>
-              <a:effectRef idx="0">
-                <a:schemeClr val="accent1"/>
-              </a:effectRef>
-              <a:fontRef idx="minor">
-                <a:schemeClr val="lt1"/>
-              </a:fontRef>
-            </p:style>
-            <p:txBody>
-              <a:bodyPr rtlCol="0" anchor="ctr"/>
-              <a:lstStyle/>
-              <a:p>
-                <a:pPr algn="ctr"/>
-                <a:endParaRPr lang="zh-CN" altLang="en-US" dirty="0"/>
-              </a:p>
-            </p:txBody>
-          </p:sp>
-          <p:sp>
-            <p:nvSpPr>
-              <p:cNvPr id="76" name="矩形 75"/>
-              <p:cNvSpPr/>
-              <p:nvPr/>
-            </p:nvSpPr>
-            <p:spPr>
-              <a:xfrm>
-                <a:off x="8443596" y="5621065"/>
-                <a:ext cx="216000" cy="216000"/>
-              </a:xfrm>
-              <a:prstGeom prst="rect">
-                <a:avLst/>
-              </a:prstGeom>
-              <a:solidFill>
-                <a:srgbClr val="A83EA3"/>
-              </a:solidFill>
-              <a:ln w="28575">
-                <a:solidFill>
-                  <a:srgbClr val="A83EA3"/>
-                </a:solidFill>
-              </a:ln>
-            </p:spPr>
-            <p:style>
-              <a:lnRef idx="2">
-                <a:schemeClr val="accent1">
-                  <a:shade val="50000"/>
-                </a:schemeClr>
-              </a:lnRef>
-              <a:fillRef idx="1">
-                <a:schemeClr val="accent1"/>
-              </a:fillRef>
-              <a:effectRef idx="0">
-                <a:schemeClr val="accent1"/>
-              </a:effectRef>
-              <a:fontRef idx="minor">
-                <a:schemeClr val="lt1"/>
-              </a:fontRef>
-            </p:style>
-            <p:txBody>
-              <a:bodyPr rtlCol="0" anchor="ctr"/>
-              <a:lstStyle/>
-              <a:p>
-                <a:pPr algn="ctr"/>
-                <a:endParaRPr lang="zh-CN" altLang="en-US" dirty="0"/>
-              </a:p>
-            </p:txBody>
-          </p:sp>
-          <p:sp>
-            <p:nvSpPr>
-              <p:cNvPr id="77" name="矩形 76"/>
-              <p:cNvSpPr/>
-              <p:nvPr/>
-            </p:nvSpPr>
-            <p:spPr>
-              <a:xfrm>
-                <a:off x="8821694" y="5621065"/>
-                <a:ext cx="216000" cy="216000"/>
-              </a:xfrm>
-              <a:prstGeom prst="rect">
-                <a:avLst/>
-              </a:prstGeom>
-              <a:solidFill>
-                <a:srgbClr val="A83EA3"/>
-              </a:solidFill>
-              <a:ln w="28575">
-                <a:solidFill>
-                  <a:srgbClr val="A83EA3"/>
-                </a:solidFill>
-              </a:ln>
-            </p:spPr>
-            <p:style>
-              <a:lnRef idx="2">
-                <a:schemeClr val="accent1">
-                  <a:shade val="50000"/>
-                </a:schemeClr>
-              </a:lnRef>
-              <a:fillRef idx="1">
-                <a:schemeClr val="accent1"/>
-              </a:fillRef>
-              <a:effectRef idx="0">
-                <a:schemeClr val="accent1"/>
-              </a:effectRef>
-              <a:fontRef idx="minor">
-                <a:schemeClr val="lt1"/>
-              </a:fontRef>
-            </p:style>
-            <p:txBody>
-              <a:bodyPr rtlCol="0" anchor="ctr"/>
-              <a:lstStyle/>
-              <a:p>
-                <a:pPr algn="ctr"/>
-                <a:endParaRPr lang="zh-CN" altLang="en-US" dirty="0"/>
-              </a:p>
-            </p:txBody>
-          </p:sp>
-          <p:sp>
-            <p:nvSpPr>
-              <p:cNvPr id="78" name="矩形 77"/>
-              <p:cNvSpPr/>
-              <p:nvPr/>
-            </p:nvSpPr>
-            <p:spPr>
-              <a:xfrm>
-                <a:off x="9199791" y="5621065"/>
-                <a:ext cx="216000" cy="216000"/>
-              </a:xfrm>
-              <a:prstGeom prst="rect">
-                <a:avLst/>
-              </a:prstGeom>
-              <a:solidFill>
-                <a:srgbClr val="A83EA3"/>
-              </a:solidFill>
-              <a:ln w="28575">
-                <a:solidFill>
-                  <a:srgbClr val="A83EA3"/>
-                </a:solidFill>
-              </a:ln>
-            </p:spPr>
-            <p:style>
-              <a:lnRef idx="2">
-                <a:schemeClr val="accent1">
-                  <a:shade val="50000"/>
-                </a:schemeClr>
-              </a:lnRef>
-              <a:fillRef idx="1">
-                <a:schemeClr val="accent1"/>
-              </a:fillRef>
-              <a:effectRef idx="0">
-                <a:schemeClr val="accent1"/>
-              </a:effectRef>
-              <a:fontRef idx="minor">
-                <a:schemeClr val="lt1"/>
-              </a:fontRef>
-            </p:style>
-            <p:txBody>
-              <a:bodyPr rtlCol="0" anchor="ctr"/>
-              <a:lstStyle/>
-              <a:p>
-                <a:pPr algn="ctr"/>
-                <a:endParaRPr lang="zh-CN" altLang="en-US" dirty="0"/>
-              </a:p>
-            </p:txBody>
-          </p:sp>
-          <p:sp>
-            <p:nvSpPr>
-              <p:cNvPr id="79" name="矩形 78"/>
-              <p:cNvSpPr/>
-              <p:nvPr/>
-            </p:nvSpPr>
-            <p:spPr>
-              <a:xfrm>
-                <a:off x="9577888" y="5621065"/>
-                <a:ext cx="216000" cy="216000"/>
-              </a:xfrm>
-              <a:prstGeom prst="rect">
-                <a:avLst/>
-              </a:prstGeom>
-              <a:solidFill>
-                <a:srgbClr val="A83EA3"/>
-              </a:solidFill>
-              <a:ln w="28575">
-                <a:solidFill>
-                  <a:srgbClr val="A83EA3"/>
-                </a:solidFill>
-              </a:ln>
-            </p:spPr>
-            <p:style>
-              <a:lnRef idx="2">
-                <a:schemeClr val="accent1">
-                  <a:shade val="50000"/>
-                </a:schemeClr>
-              </a:lnRef>
-              <a:fillRef idx="1">
-                <a:schemeClr val="accent1"/>
-              </a:fillRef>
-              <a:effectRef idx="0">
-                <a:schemeClr val="accent1"/>
-              </a:effectRef>
-              <a:fontRef idx="minor">
-                <a:schemeClr val="lt1"/>
-              </a:fontRef>
-            </p:style>
-            <p:txBody>
-              <a:bodyPr rtlCol="0" anchor="ctr"/>
-              <a:lstStyle/>
-              <a:p>
-                <a:pPr algn="ctr"/>
-                <a:endParaRPr lang="zh-CN" altLang="en-US" dirty="0"/>
-              </a:p>
-            </p:txBody>
-          </p:sp>
-          <p:sp>
-            <p:nvSpPr>
-              <p:cNvPr id="80" name="矩形 79"/>
-              <p:cNvSpPr/>
-              <p:nvPr/>
-            </p:nvSpPr>
-            <p:spPr>
-              <a:xfrm>
-                <a:off x="9955985" y="5621065"/>
-                <a:ext cx="216000" cy="216000"/>
-              </a:xfrm>
-              <a:prstGeom prst="rect">
-                <a:avLst/>
-              </a:prstGeom>
-              <a:solidFill>
-                <a:srgbClr val="A83EA3"/>
-              </a:solidFill>
-              <a:ln w="28575">
-                <a:solidFill>
-                  <a:srgbClr val="A83EA3"/>
-                </a:solidFill>
-              </a:ln>
-            </p:spPr>
-            <p:style>
-              <a:lnRef idx="2">
-                <a:schemeClr val="accent1">
-                  <a:shade val="50000"/>
-                </a:schemeClr>
-              </a:lnRef>
-              <a:fillRef idx="1">
-                <a:schemeClr val="accent1"/>
-              </a:fillRef>
-              <a:effectRef idx="0">
-                <a:schemeClr val="accent1"/>
-              </a:effectRef>
-              <a:fontRef idx="minor">
-                <a:schemeClr val="lt1"/>
-              </a:fontRef>
-            </p:style>
-            <p:txBody>
-              <a:bodyPr rtlCol="0" anchor="ctr"/>
-              <a:lstStyle/>
-              <a:p>
-                <a:pPr algn="ctr"/>
-                <a:endParaRPr lang="zh-CN" altLang="en-US" dirty="0"/>
-              </a:p>
-            </p:txBody>
-          </p:sp>
-          <p:sp>
-            <p:nvSpPr>
-              <p:cNvPr id="81" name="矩形 80"/>
-              <p:cNvSpPr/>
-              <p:nvPr/>
-            </p:nvSpPr>
-            <p:spPr>
-              <a:xfrm>
-                <a:off x="10334083" y="5621065"/>
-                <a:ext cx="216000" cy="216000"/>
-              </a:xfrm>
-              <a:prstGeom prst="rect">
-                <a:avLst/>
-              </a:prstGeom>
-              <a:solidFill>
-                <a:srgbClr val="A83EA3"/>
-              </a:solidFill>
-              <a:ln w="28575">
-                <a:solidFill>
-                  <a:srgbClr val="A83EA3"/>
-                </a:solidFill>
-              </a:ln>
-            </p:spPr>
-            <p:style>
-              <a:lnRef idx="2">
-                <a:schemeClr val="accent1">
-                  <a:shade val="50000"/>
-                </a:schemeClr>
-              </a:lnRef>
-              <a:fillRef idx="1">
-                <a:schemeClr val="accent1"/>
-              </a:fillRef>
-              <a:effectRef idx="0">
-                <a:schemeClr val="accent1"/>
-              </a:effectRef>
-              <a:fontRef idx="minor">
-                <a:schemeClr val="lt1"/>
-              </a:fontRef>
-            </p:style>
-            <p:txBody>
-              <a:bodyPr rtlCol="0" anchor="ctr"/>
-              <a:lstStyle/>
-              <a:p>
-                <a:pPr algn="ctr"/>
-                <a:endParaRPr lang="zh-CN" altLang="en-US" dirty="0"/>
-              </a:p>
-            </p:txBody>
-          </p:sp>
-        </p:grpSp>
-        <p:grpSp>
-          <p:nvGrpSpPr>
-            <p:cNvPr id="95" name="组合 94"/>
-            <p:cNvGrpSpPr/>
-            <p:nvPr/>
-          </p:nvGrpSpPr>
-          <p:grpSpPr>
-            <a:xfrm>
-              <a:off x="7674532" y="3079318"/>
-              <a:ext cx="2862681" cy="216000"/>
-              <a:chOff x="7674532" y="3079318"/>
-              <a:chExt cx="2862681" cy="216000"/>
-            </a:xfrm>
-          </p:grpSpPr>
-          <p:sp>
-            <p:nvSpPr>
-              <p:cNvPr id="86" name="矩形 85"/>
-              <p:cNvSpPr/>
-              <p:nvPr/>
-            </p:nvSpPr>
-            <p:spPr>
-              <a:xfrm>
-                <a:off x="7674532" y="3079318"/>
-                <a:ext cx="216000" cy="216000"/>
-              </a:xfrm>
-              <a:prstGeom prst="rect">
-                <a:avLst/>
-              </a:prstGeom>
-              <a:solidFill>
-                <a:srgbClr val="A83EA3"/>
-              </a:solidFill>
-              <a:ln w="28575">
-                <a:solidFill>
-                  <a:srgbClr val="A83EA3"/>
-                </a:solidFill>
-              </a:ln>
-            </p:spPr>
-            <p:style>
-              <a:lnRef idx="2">
-                <a:schemeClr val="accent1">
-                  <a:shade val="50000"/>
-                </a:schemeClr>
-              </a:lnRef>
-              <a:fillRef idx="1">
-                <a:schemeClr val="accent1"/>
-              </a:fillRef>
-              <a:effectRef idx="0">
-                <a:schemeClr val="accent1"/>
-              </a:effectRef>
-              <a:fontRef idx="minor">
-                <a:schemeClr val="lt1"/>
-              </a:fontRef>
-            </p:style>
-            <p:txBody>
-              <a:bodyPr rtlCol="0" anchor="ctr"/>
-              <a:lstStyle/>
-              <a:p>
-                <a:pPr algn="ctr"/>
-                <a:endParaRPr lang="zh-CN" altLang="en-US" dirty="0"/>
-              </a:p>
-            </p:txBody>
-          </p:sp>
-          <p:sp>
-            <p:nvSpPr>
-              <p:cNvPr id="87" name="矩形 86"/>
-              <p:cNvSpPr/>
-              <p:nvPr/>
-            </p:nvSpPr>
-            <p:spPr>
-              <a:xfrm>
-                <a:off x="8052629" y="3079318"/>
-                <a:ext cx="216000" cy="216000"/>
-              </a:xfrm>
-              <a:prstGeom prst="rect">
-                <a:avLst/>
-              </a:prstGeom>
-              <a:solidFill>
-                <a:srgbClr val="A83EA3"/>
-              </a:solidFill>
-              <a:ln w="28575">
-                <a:solidFill>
-                  <a:srgbClr val="A83EA3"/>
-                </a:solidFill>
-              </a:ln>
-            </p:spPr>
-            <p:style>
-              <a:lnRef idx="2">
-                <a:schemeClr val="accent1">
-                  <a:shade val="50000"/>
-                </a:schemeClr>
-              </a:lnRef>
-              <a:fillRef idx="1">
-                <a:schemeClr val="accent1"/>
-              </a:fillRef>
-              <a:effectRef idx="0">
-                <a:schemeClr val="accent1"/>
-              </a:effectRef>
-              <a:fontRef idx="minor">
-                <a:schemeClr val="lt1"/>
-              </a:fontRef>
-            </p:style>
-            <p:txBody>
-              <a:bodyPr rtlCol="0" anchor="ctr"/>
-              <a:lstStyle/>
-              <a:p>
-                <a:pPr algn="ctr"/>
-                <a:endParaRPr lang="zh-CN" altLang="en-US" dirty="0"/>
-              </a:p>
-            </p:txBody>
-          </p:sp>
-          <p:sp>
-            <p:nvSpPr>
-              <p:cNvPr id="88" name="矩形 87"/>
-              <p:cNvSpPr/>
-              <p:nvPr/>
-            </p:nvSpPr>
-            <p:spPr>
-              <a:xfrm>
-                <a:off x="8430726" y="3079318"/>
-                <a:ext cx="216000" cy="216000"/>
-              </a:xfrm>
-              <a:prstGeom prst="rect">
-                <a:avLst/>
-              </a:prstGeom>
-              <a:solidFill>
-                <a:srgbClr val="A83EA3"/>
-              </a:solidFill>
-              <a:ln w="28575">
-                <a:solidFill>
-                  <a:srgbClr val="A83EA3"/>
-                </a:solidFill>
-              </a:ln>
-            </p:spPr>
-            <p:style>
-              <a:lnRef idx="2">
-                <a:schemeClr val="accent1">
-                  <a:shade val="50000"/>
-                </a:schemeClr>
-              </a:lnRef>
-              <a:fillRef idx="1">
-                <a:schemeClr val="accent1"/>
-              </a:fillRef>
-              <a:effectRef idx="0">
-                <a:schemeClr val="accent1"/>
-              </a:effectRef>
-              <a:fontRef idx="minor">
-                <a:schemeClr val="lt1"/>
-              </a:fontRef>
-            </p:style>
-            <p:txBody>
-              <a:bodyPr rtlCol="0" anchor="ctr"/>
-              <a:lstStyle/>
-              <a:p>
-                <a:pPr algn="ctr"/>
-                <a:endParaRPr lang="zh-CN" altLang="en-US" dirty="0"/>
-              </a:p>
-            </p:txBody>
-          </p:sp>
-          <p:sp>
-            <p:nvSpPr>
-              <p:cNvPr id="89" name="矩形 88"/>
-              <p:cNvSpPr/>
-              <p:nvPr/>
-            </p:nvSpPr>
-            <p:spPr>
-              <a:xfrm>
-                <a:off x="8808824" y="3079318"/>
-                <a:ext cx="216000" cy="216000"/>
-              </a:xfrm>
-              <a:prstGeom prst="rect">
-                <a:avLst/>
-              </a:prstGeom>
-              <a:solidFill>
-                <a:srgbClr val="A83EA3"/>
-              </a:solidFill>
-              <a:ln w="28575">
-                <a:solidFill>
-                  <a:srgbClr val="A83EA3"/>
-                </a:solidFill>
-              </a:ln>
-            </p:spPr>
-            <p:style>
-              <a:lnRef idx="2">
-                <a:schemeClr val="accent1">
-                  <a:shade val="50000"/>
-                </a:schemeClr>
-              </a:lnRef>
-              <a:fillRef idx="1">
-                <a:schemeClr val="accent1"/>
-              </a:fillRef>
-              <a:effectRef idx="0">
-                <a:schemeClr val="accent1"/>
-              </a:effectRef>
-              <a:fontRef idx="minor">
-                <a:schemeClr val="lt1"/>
-              </a:fontRef>
-            </p:style>
-            <p:txBody>
-              <a:bodyPr rtlCol="0" anchor="ctr"/>
-              <a:lstStyle/>
-              <a:p>
-                <a:pPr algn="ctr"/>
-                <a:endParaRPr lang="zh-CN" altLang="en-US" dirty="0"/>
-              </a:p>
-            </p:txBody>
-          </p:sp>
-          <p:sp>
-            <p:nvSpPr>
-              <p:cNvPr id="90" name="矩形 89"/>
-              <p:cNvSpPr/>
-              <p:nvPr/>
-            </p:nvSpPr>
-            <p:spPr>
-              <a:xfrm>
-                <a:off x="9186921" y="3079318"/>
-                <a:ext cx="216000" cy="216000"/>
-              </a:xfrm>
-              <a:prstGeom prst="rect">
-                <a:avLst/>
-              </a:prstGeom>
-              <a:solidFill>
-                <a:srgbClr val="A83EA3"/>
-              </a:solidFill>
-              <a:ln w="28575">
-                <a:solidFill>
-                  <a:srgbClr val="A83EA3"/>
-                </a:solidFill>
-              </a:ln>
-            </p:spPr>
-            <p:style>
-              <a:lnRef idx="2">
-                <a:schemeClr val="accent1">
-                  <a:shade val="50000"/>
-                </a:schemeClr>
-              </a:lnRef>
-              <a:fillRef idx="1">
-                <a:schemeClr val="accent1"/>
-              </a:fillRef>
-              <a:effectRef idx="0">
-                <a:schemeClr val="accent1"/>
-              </a:effectRef>
-              <a:fontRef idx="minor">
-                <a:schemeClr val="lt1"/>
-              </a:fontRef>
-            </p:style>
-            <p:txBody>
-              <a:bodyPr rtlCol="0" anchor="ctr"/>
-              <a:lstStyle/>
-              <a:p>
-                <a:pPr algn="ctr"/>
-                <a:endParaRPr lang="zh-CN" altLang="en-US" dirty="0"/>
-              </a:p>
-            </p:txBody>
-          </p:sp>
-          <p:sp>
-            <p:nvSpPr>
-              <p:cNvPr id="91" name="矩形 90"/>
-              <p:cNvSpPr/>
-              <p:nvPr/>
-            </p:nvSpPr>
-            <p:spPr>
-              <a:xfrm>
-                <a:off x="9565018" y="3079318"/>
-                <a:ext cx="216000" cy="216000"/>
-              </a:xfrm>
-              <a:prstGeom prst="rect">
-                <a:avLst/>
-              </a:prstGeom>
-              <a:solidFill>
-                <a:srgbClr val="A83EA3"/>
-              </a:solidFill>
-              <a:ln w="28575">
-                <a:solidFill>
-                  <a:srgbClr val="A83EA3"/>
-                </a:solidFill>
-              </a:ln>
-            </p:spPr>
-            <p:style>
-              <a:lnRef idx="2">
-                <a:schemeClr val="accent1">
-                  <a:shade val="50000"/>
-                </a:schemeClr>
-              </a:lnRef>
-              <a:fillRef idx="1">
-                <a:schemeClr val="accent1"/>
-              </a:fillRef>
-              <a:effectRef idx="0">
-                <a:schemeClr val="accent1"/>
-              </a:effectRef>
-              <a:fontRef idx="minor">
-                <a:schemeClr val="lt1"/>
-              </a:fontRef>
-            </p:style>
-            <p:txBody>
-              <a:bodyPr rtlCol="0" anchor="ctr"/>
-              <a:lstStyle/>
-              <a:p>
-                <a:pPr algn="ctr"/>
-                <a:endParaRPr lang="zh-CN" altLang="en-US" dirty="0"/>
-              </a:p>
-            </p:txBody>
-          </p:sp>
-          <p:sp>
-            <p:nvSpPr>
-              <p:cNvPr id="92" name="矩形 91"/>
-              <p:cNvSpPr/>
-              <p:nvPr/>
-            </p:nvSpPr>
-            <p:spPr>
-              <a:xfrm>
-                <a:off x="9943115" y="3079318"/>
-                <a:ext cx="216000" cy="216000"/>
-              </a:xfrm>
-              <a:prstGeom prst="rect">
-                <a:avLst/>
-              </a:prstGeom>
-              <a:solidFill>
-                <a:srgbClr val="A83EA3"/>
-              </a:solidFill>
-              <a:ln w="28575">
-                <a:solidFill>
-                  <a:srgbClr val="A83EA3"/>
-                </a:solidFill>
-              </a:ln>
-            </p:spPr>
-            <p:style>
-              <a:lnRef idx="2">
-                <a:schemeClr val="accent1">
-                  <a:shade val="50000"/>
-                </a:schemeClr>
-              </a:lnRef>
-              <a:fillRef idx="1">
-                <a:schemeClr val="accent1"/>
-              </a:fillRef>
-              <a:effectRef idx="0">
-                <a:schemeClr val="accent1"/>
-              </a:effectRef>
-              <a:fontRef idx="minor">
-                <a:schemeClr val="lt1"/>
-              </a:fontRef>
-            </p:style>
-            <p:txBody>
-              <a:bodyPr rtlCol="0" anchor="ctr"/>
-              <a:lstStyle/>
-              <a:p>
-                <a:pPr algn="ctr"/>
-                <a:endParaRPr lang="zh-CN" altLang="en-US" dirty="0"/>
-              </a:p>
-            </p:txBody>
-          </p:sp>
-          <p:sp>
-            <p:nvSpPr>
-              <p:cNvPr id="93" name="矩形 92"/>
-              <p:cNvSpPr/>
-              <p:nvPr/>
-            </p:nvSpPr>
-            <p:spPr>
-              <a:xfrm>
-                <a:off x="10321213" y="3079318"/>
-                <a:ext cx="216000" cy="216000"/>
-              </a:xfrm>
-              <a:prstGeom prst="rect">
-                <a:avLst/>
-              </a:prstGeom>
-              <a:solidFill>
-                <a:srgbClr val="A83EA3"/>
-              </a:solidFill>
-              <a:ln w="28575">
-                <a:solidFill>
-                  <a:srgbClr val="A83EA3"/>
-                </a:solidFill>
-              </a:ln>
-            </p:spPr>
-            <p:style>
-              <a:lnRef idx="2">
-                <a:schemeClr val="accent1">
-                  <a:shade val="50000"/>
-                </a:schemeClr>
-              </a:lnRef>
-              <a:fillRef idx="1">
-                <a:schemeClr val="accent1"/>
-              </a:fillRef>
-              <a:effectRef idx="0">
-                <a:schemeClr val="accent1"/>
-              </a:effectRef>
-              <a:fontRef idx="minor">
-                <a:schemeClr val="lt1"/>
-              </a:fontRef>
-            </p:style>
-            <p:txBody>
-              <a:bodyPr rtlCol="0" anchor="ctr"/>
-              <a:lstStyle/>
-              <a:p>
-                <a:pPr algn="ctr"/>
-                <a:endParaRPr lang="zh-CN" altLang="en-US" dirty="0"/>
-              </a:p>
-            </p:txBody>
-          </p:sp>
-        </p:grpSp>
+            </a:ln>
+          </p:spPr>
+          <p:style>
+            <a:lnRef idx="2">
+              <a:schemeClr val="accent1">
+                <a:shade val="50000"/>
+              </a:schemeClr>
+            </a:lnRef>
+            <a:fillRef idx="1">
+              <a:schemeClr val="accent1"/>
+            </a:fillRef>
+            <a:effectRef idx="0">
+              <a:schemeClr val="accent1"/>
+            </a:effectRef>
+            <a:fontRef idx="minor">
+              <a:schemeClr val="lt1"/>
+            </a:fontRef>
+          </p:style>
+          <p:txBody>
+            <a:bodyPr rtlCol="0" anchor="ctr"/>
+            <a:lstStyle/>
+            <a:p>
+              <a:pPr algn="ctr"/>
+              <a:endParaRPr lang="zh-CN" altLang="en-US"/>
+            </a:p>
+          </p:txBody>
+        </p:sp>
       </p:grpSp>
     </p:spTree>
     <p:extLst>

</xml_diff>